<commit_message>
update the introdection presentation
</commit_message>
<xml_diff>
--- a/Baraglaaim.pptx
+++ b/Baraglaaim.pptx
@@ -5,20 +5,32 @@
     <p:sldMasterId id="2147483650" r:id="rId1"/>
   </p:sldMasterIdLst>
   <p:notesMasterIdLst>
-    <p:notesMasterId r:id="rId13"/>
+    <p:notesMasterId r:id="rId25"/>
   </p:notesMasterIdLst>
   <p:sldIdLst>
     <p:sldId id="278" r:id="rId2"/>
     <p:sldId id="294" r:id="rId3"/>
     <p:sldId id="279" r:id="rId4"/>
     <p:sldId id="280" r:id="rId5"/>
-    <p:sldId id="295" r:id="rId6"/>
-    <p:sldId id="281" r:id="rId7"/>
-    <p:sldId id="296" r:id="rId8"/>
-    <p:sldId id="297" r:id="rId9"/>
-    <p:sldId id="298" r:id="rId10"/>
-    <p:sldId id="299" r:id="rId11"/>
-    <p:sldId id="292" r:id="rId12"/>
+    <p:sldId id="301" r:id="rId6"/>
+    <p:sldId id="295" r:id="rId7"/>
+    <p:sldId id="281" r:id="rId8"/>
+    <p:sldId id="296" r:id="rId9"/>
+    <p:sldId id="297" r:id="rId10"/>
+    <p:sldId id="298" r:id="rId11"/>
+    <p:sldId id="299" r:id="rId12"/>
+    <p:sldId id="303" r:id="rId13"/>
+    <p:sldId id="304" r:id="rId14"/>
+    <p:sldId id="305" r:id="rId15"/>
+    <p:sldId id="306" r:id="rId16"/>
+    <p:sldId id="307" r:id="rId17"/>
+    <p:sldId id="300" r:id="rId18"/>
+    <p:sldId id="302" r:id="rId19"/>
+    <p:sldId id="308" r:id="rId20"/>
+    <p:sldId id="309" r:id="rId21"/>
+    <p:sldId id="310" r:id="rId22"/>
+    <p:sldId id="311" r:id="rId23"/>
+    <p:sldId id="292" r:id="rId24"/>
   </p:sldIdLst>
   <p:sldSz cx="12192000" cy="6858000"/>
   <p:notesSz cx="13716000" cy="24384000"/>
@@ -265,7 +277,7 @@
 <file path=ppt/revisionInfo.xml><?xml version="1.0" encoding="utf-8"?>
 <p1510:revInfo xmlns:a="http://schemas.openxmlformats.org/drawingml/2006/main" xmlns:r="http://schemas.openxmlformats.org/officeDocument/2006/relationships" xmlns:p1510="http://schemas.microsoft.com/office/powerpoint/2015/10/main">
   <p1510:revLst>
-    <p1510:client id="{E6D8F55F-E273-473A-A222-18407CE4338B}" v="25" dt="2023-03-22T12:52:22.777"/>
+    <p1510:client id="{E6D8F55F-E273-473A-A222-18407CE4338B}" v="61" dt="2023-03-22T16:36:26.448"/>
   </p1510:revLst>
 </p1510:revInfo>
 </file>
@@ -275,7 +287,7 @@
   <pc:docChgLst>
     <pc:chgData name="דודו ברינה" userId="581ad2f1418d4d63" providerId="LiveId" clId="{E6D8F55F-E273-473A-A222-18407CE4338B}"/>
     <pc:docChg chg="undo custSel addSld delSld modSld sldOrd">
-      <pc:chgData name="דודו ברינה" userId="581ad2f1418d4d63" providerId="LiveId" clId="{E6D8F55F-E273-473A-A222-18407CE4338B}" dt="2023-03-22T12:53:39.544" v="4495" actId="20577"/>
+      <pc:chgData name="דודו ברינה" userId="581ad2f1418d4d63" providerId="LiveId" clId="{E6D8F55F-E273-473A-A222-18407CE4338B}" dt="2023-03-22T16:36:28.789" v="11980" actId="1076"/>
       <pc:docMkLst>
         <pc:docMk/>
       </pc:docMkLst>
@@ -295,13 +307,13 @@
         </pc:spChg>
       </pc:sldChg>
       <pc:sldChg chg="addSp modSp mod">
-        <pc:chgData name="דודו ברינה" userId="581ad2f1418d4d63" providerId="LiveId" clId="{E6D8F55F-E273-473A-A222-18407CE4338B}" dt="2023-03-22T11:55:59.404" v="1624" actId="207"/>
+        <pc:chgData name="דודו ברינה" userId="581ad2f1418d4d63" providerId="LiveId" clId="{E6D8F55F-E273-473A-A222-18407CE4338B}" dt="2023-03-22T13:26:35.723" v="4813" actId="20577"/>
         <pc:sldMkLst>
           <pc:docMk/>
           <pc:sldMk cId="3855531800" sldId="279"/>
         </pc:sldMkLst>
         <pc:spChg chg="mod">
-          <ac:chgData name="דודו ברינה" userId="581ad2f1418d4d63" providerId="LiveId" clId="{E6D8F55F-E273-473A-A222-18407CE4338B}" dt="2023-03-22T11:49:49.742" v="1277" actId="14100"/>
+          <ac:chgData name="דודו ברינה" userId="581ad2f1418d4d63" providerId="LiveId" clId="{E6D8F55F-E273-473A-A222-18407CE4338B}" dt="2023-03-22T13:26:35.723" v="4813" actId="20577"/>
           <ac:spMkLst>
             <pc:docMk/>
             <pc:sldMk cId="3855531800" sldId="279"/>
@@ -326,13 +338,13 @@
         </pc:spChg>
       </pc:sldChg>
       <pc:sldChg chg="addSp delSp modSp mod modClrScheme chgLayout">
-        <pc:chgData name="דודו ברינה" userId="581ad2f1418d4d63" providerId="LiveId" clId="{E6D8F55F-E273-473A-A222-18407CE4338B}" dt="2023-03-22T12:51:36.206" v="4458" actId="20577"/>
+        <pc:chgData name="דודו ברינה" userId="581ad2f1418d4d63" providerId="LiveId" clId="{E6D8F55F-E273-473A-A222-18407CE4338B}" dt="2023-03-22T15:44:57.227" v="6984" actId="20577"/>
         <pc:sldMkLst>
           <pc:docMk/>
           <pc:sldMk cId="979622006" sldId="280"/>
         </pc:sldMkLst>
         <pc:spChg chg="mod ord">
-          <ac:chgData name="דודו ברינה" userId="581ad2f1418d4d63" providerId="LiveId" clId="{E6D8F55F-E273-473A-A222-18407CE4338B}" dt="2023-03-22T11:50:01.847" v="1291" actId="20577"/>
+          <ac:chgData name="דודו ברינה" userId="581ad2f1418d4d63" providerId="LiveId" clId="{E6D8F55F-E273-473A-A222-18407CE4338B}" dt="2023-03-22T13:26:46.731" v="4816"/>
           <ac:spMkLst>
             <pc:docMk/>
             <pc:sldMk cId="979622006" sldId="280"/>
@@ -340,7 +352,7 @@
           </ac:spMkLst>
         </pc:spChg>
         <pc:spChg chg="mod ord">
-          <ac:chgData name="דודו ברינה" userId="581ad2f1418d4d63" providerId="LiveId" clId="{E6D8F55F-E273-473A-A222-18407CE4338B}" dt="2023-03-22T12:51:36.206" v="4458" actId="20577"/>
+          <ac:chgData name="דודו ברינה" userId="581ad2f1418d4d63" providerId="LiveId" clId="{E6D8F55F-E273-473A-A222-18407CE4338B}" dt="2023-03-22T15:44:57.227" v="6984" actId="20577"/>
           <ac:spMkLst>
             <pc:docMk/>
             <pc:sldMk cId="979622006" sldId="280"/>
@@ -405,11 +417,19 @@
         </pc:spChg>
       </pc:sldChg>
       <pc:sldChg chg="addSp delSp modSp mod modClrScheme chgLayout">
-        <pc:chgData name="דודו ברינה" userId="581ad2f1418d4d63" providerId="LiveId" clId="{E6D8F55F-E273-473A-A222-18407CE4338B}" dt="2023-03-22T11:59:24.202" v="1828" actId="20577"/>
+        <pc:chgData name="דודו ברינה" userId="581ad2f1418d4d63" providerId="LiveId" clId="{E6D8F55F-E273-473A-A222-18407CE4338B}" dt="2023-03-22T13:40:13.393" v="5660" actId="5793"/>
         <pc:sldMkLst>
           <pc:docMk/>
           <pc:sldMk cId="2952923800" sldId="281"/>
         </pc:sldMkLst>
+        <pc:spChg chg="add del mod ord">
+          <ac:chgData name="דודו ברינה" userId="581ad2f1418d4d63" providerId="LiveId" clId="{E6D8F55F-E273-473A-A222-18407CE4338B}" dt="2023-03-22T13:39:30.400" v="5652" actId="700"/>
+          <ac:spMkLst>
+            <pc:docMk/>
+            <pc:sldMk cId="2952923800" sldId="281"/>
+            <ac:spMk id="2" creationId="{B321CE09-0EBE-3ECD-2C5C-CC6CE421E468}"/>
+          </ac:spMkLst>
+        </pc:spChg>
         <pc:spChg chg="del mod ord">
           <ac:chgData name="דודו ברינה" userId="581ad2f1418d4d63" providerId="LiveId" clId="{E6D8F55F-E273-473A-A222-18407CE4338B}" dt="2023-03-22T11:53:21.324" v="1367" actId="478"/>
           <ac:spMkLst>
@@ -419,7 +439,7 @@
           </ac:spMkLst>
         </pc:spChg>
         <pc:spChg chg="mod ord">
-          <ac:chgData name="דודו ברינה" userId="581ad2f1418d4d63" providerId="LiveId" clId="{E6D8F55F-E273-473A-A222-18407CE4338B}" dt="2023-03-22T11:59:24.202" v="1828" actId="20577"/>
+          <ac:chgData name="דודו ברינה" userId="581ad2f1418d4d63" providerId="LiveId" clId="{E6D8F55F-E273-473A-A222-18407CE4338B}" dt="2023-03-22T13:40:13.393" v="5660" actId="5793"/>
           <ac:spMkLst>
             <pc:docMk/>
             <pc:sldMk cId="2952923800" sldId="281"/>
@@ -554,8 +574,8 @@
           <pc:sldMk cId="249904479" sldId="291"/>
         </pc:sldMkLst>
       </pc:sldChg>
-      <pc:sldChg chg="delSp modSp mod">
-        <pc:chgData name="דודו ברינה" userId="581ad2f1418d4d63" providerId="LiveId" clId="{E6D8F55F-E273-473A-A222-18407CE4338B}" dt="2023-03-22T12:53:39.544" v="4495" actId="20577"/>
+      <pc:sldChg chg="addSp delSp modSp mod">
+        <pc:chgData name="דודו ברינה" userId="581ad2f1418d4d63" providerId="LiveId" clId="{E6D8F55F-E273-473A-A222-18407CE4338B}" dt="2023-03-22T16:36:28.789" v="11980" actId="1076"/>
         <pc:sldMkLst>
           <pc:docMk/>
           <pc:sldMk cId="94818171" sldId="292"/>
@@ -569,11 +589,19 @@
           </ac:spMkLst>
         </pc:spChg>
         <pc:spChg chg="mod">
-          <ac:chgData name="דודו ברינה" userId="581ad2f1418d4d63" providerId="LiveId" clId="{E6D8F55F-E273-473A-A222-18407CE4338B}" dt="2023-03-22T12:53:39.544" v="4495" actId="20577"/>
+          <ac:chgData name="דודו ברינה" userId="581ad2f1418d4d63" providerId="LiveId" clId="{E6D8F55F-E273-473A-A222-18407CE4338B}" dt="2023-03-22T16:35:58.042" v="11972" actId="20577"/>
           <ac:spMkLst>
             <pc:docMk/>
             <pc:sldMk cId="94818171" sldId="292"/>
             <ac:spMk id="3" creationId="{2BE8FDE3-DBA4-6A04-C75D-E56FE92EF368}"/>
+          </ac:spMkLst>
+        </pc:spChg>
+        <pc:spChg chg="add mod">
+          <ac:chgData name="דודו ברינה" userId="581ad2f1418d4d63" providerId="LiveId" clId="{E6D8F55F-E273-473A-A222-18407CE4338B}" dt="2023-03-22T16:36:28.789" v="11980" actId="1076"/>
+          <ac:spMkLst>
+            <pc:docMk/>
+            <pc:sldMk cId="94818171" sldId="292"/>
+            <ac:spMk id="4" creationId="{547140F8-272C-1106-0F88-9C8C3F4D7705}"/>
           </ac:spMkLst>
         </pc:spChg>
         <pc:spChg chg="del">
@@ -601,7 +629,7 @@
         </pc:sldMkLst>
       </pc:sldChg>
       <pc:sldChg chg="modSp add mod modClrScheme chgLayout">
-        <pc:chgData name="דודו ברינה" userId="581ad2f1418d4d63" providerId="LiveId" clId="{E6D8F55F-E273-473A-A222-18407CE4338B}" dt="2023-03-22T11:51:04.267" v="1326" actId="3626"/>
+        <pc:chgData name="דודו ברינה" userId="581ad2f1418d4d63" providerId="LiveId" clId="{E6D8F55F-E273-473A-A222-18407CE4338B}" dt="2023-03-22T16:36:07.393" v="11978" actId="20577"/>
         <pc:sldMkLst>
           <pc:docMk/>
           <pc:sldMk cId="1036433725" sldId="294"/>
@@ -615,7 +643,7 @@
           </ac:spMkLst>
         </pc:spChg>
         <pc:spChg chg="mod ord">
-          <ac:chgData name="דודו ברינה" userId="581ad2f1418d4d63" providerId="LiveId" clId="{E6D8F55F-E273-473A-A222-18407CE4338B}" dt="2023-03-22T11:51:04.267" v="1326" actId="3626"/>
+          <ac:chgData name="דודו ברינה" userId="581ad2f1418d4d63" providerId="LiveId" clId="{E6D8F55F-E273-473A-A222-18407CE4338B}" dt="2023-03-22T16:36:07.393" v="11978" actId="20577"/>
           <ac:spMkLst>
             <pc:docMk/>
             <pc:sldMk cId="1036433725" sldId="294"/>
@@ -631,7 +659,7 @@
         </pc:sldMkLst>
       </pc:sldChg>
       <pc:sldChg chg="addSp modSp add mod ord">
-        <pc:chgData name="דודו ברינה" userId="581ad2f1418d4d63" providerId="LiveId" clId="{E6D8F55F-E273-473A-A222-18407CE4338B}" dt="2023-03-22T12:52:24.978" v="4459" actId="113"/>
+        <pc:chgData name="דודו ברינה" userId="581ad2f1418d4d63" providerId="LiveId" clId="{E6D8F55F-E273-473A-A222-18407CE4338B}" dt="2023-03-22T13:05:25.199" v="4496" actId="1076"/>
         <pc:sldMkLst>
           <pc:docMk/>
           <pc:sldMk cId="641375081" sldId="295"/>
@@ -645,7 +673,7 @@
           </ac:spMkLst>
         </pc:spChg>
         <pc:spChg chg="mod">
-          <ac:chgData name="דודו ברינה" userId="581ad2f1418d4d63" providerId="LiveId" clId="{E6D8F55F-E273-473A-A222-18407CE4338B}" dt="2023-03-22T12:52:24.978" v="4459" actId="113"/>
+          <ac:chgData name="דודו ברינה" userId="581ad2f1418d4d63" providerId="LiveId" clId="{E6D8F55F-E273-473A-A222-18407CE4338B}" dt="2023-03-22T13:05:25.199" v="4496" actId="1076"/>
           <ac:spMkLst>
             <pc:docMk/>
             <pc:sldMk cId="641375081" sldId="295"/>
@@ -661,14 +689,14 @@
           </ac:spMkLst>
         </pc:spChg>
       </pc:sldChg>
-      <pc:sldChg chg="modSp add mod">
-        <pc:chgData name="דודו ברינה" userId="581ad2f1418d4d63" providerId="LiveId" clId="{E6D8F55F-E273-473A-A222-18407CE4338B}" dt="2023-03-22T12:03:45.031" v="2275" actId="20577"/>
+      <pc:sldChg chg="modSp add mod modClrScheme chgLayout">
+        <pc:chgData name="דודו ברינה" userId="581ad2f1418d4d63" providerId="LiveId" clId="{E6D8F55F-E273-473A-A222-18407CE4338B}" dt="2023-03-22T13:40:45.721" v="5666" actId="5793"/>
         <pc:sldMkLst>
           <pc:docMk/>
           <pc:sldMk cId="3407969357" sldId="296"/>
         </pc:sldMkLst>
-        <pc:spChg chg="mod">
-          <ac:chgData name="דודו ברינה" userId="581ad2f1418d4d63" providerId="LiveId" clId="{E6D8F55F-E273-473A-A222-18407CE4338B}" dt="2023-03-22T12:03:45.031" v="2275" actId="20577"/>
+        <pc:spChg chg="mod ord">
+          <ac:chgData name="דודו ברינה" userId="581ad2f1418d4d63" providerId="LiveId" clId="{E6D8F55F-E273-473A-A222-18407CE4338B}" dt="2023-03-22T13:40:45.721" v="5666" actId="5793"/>
           <ac:spMkLst>
             <pc:docMk/>
             <pc:sldMk cId="3407969357" sldId="296"/>
@@ -676,14 +704,14 @@
           </ac:spMkLst>
         </pc:spChg>
       </pc:sldChg>
-      <pc:sldChg chg="modSp add mod">
-        <pc:chgData name="דודו ברינה" userId="581ad2f1418d4d63" providerId="LiveId" clId="{E6D8F55F-E273-473A-A222-18407CE4338B}" dt="2023-03-22T12:26:52.986" v="3001" actId="207"/>
+      <pc:sldChg chg="modSp add mod modClrScheme chgLayout">
+        <pc:chgData name="דודו ברינה" userId="581ad2f1418d4d63" providerId="LiveId" clId="{E6D8F55F-E273-473A-A222-18407CE4338B}" dt="2023-03-22T13:41:16.606" v="5672" actId="5793"/>
         <pc:sldMkLst>
           <pc:docMk/>
           <pc:sldMk cId="1157700990" sldId="297"/>
         </pc:sldMkLst>
-        <pc:spChg chg="mod">
-          <ac:chgData name="דודו ברינה" userId="581ad2f1418d4d63" providerId="LiveId" clId="{E6D8F55F-E273-473A-A222-18407CE4338B}" dt="2023-03-22T12:26:52.986" v="3001" actId="207"/>
+        <pc:spChg chg="mod ord">
+          <ac:chgData name="דודו ברינה" userId="581ad2f1418d4d63" providerId="LiveId" clId="{E6D8F55F-E273-473A-A222-18407CE4338B}" dt="2023-03-22T13:41:16.606" v="5672" actId="5793"/>
           <ac:spMkLst>
             <pc:docMk/>
             <pc:sldMk cId="1157700990" sldId="297"/>
@@ -691,14 +719,14 @@
           </ac:spMkLst>
         </pc:spChg>
       </pc:sldChg>
-      <pc:sldChg chg="modSp add mod">
-        <pc:chgData name="דודו ברינה" userId="581ad2f1418d4d63" providerId="LiveId" clId="{E6D8F55F-E273-473A-A222-18407CE4338B}" dt="2023-03-22T12:45:59.370" v="4032" actId="20577"/>
+      <pc:sldChg chg="modSp add mod modClrScheme chgLayout">
+        <pc:chgData name="דודו ברינה" userId="581ad2f1418d4d63" providerId="LiveId" clId="{E6D8F55F-E273-473A-A222-18407CE4338B}" dt="2023-03-22T13:42:05.874" v="5677" actId="1076"/>
         <pc:sldMkLst>
           <pc:docMk/>
           <pc:sldMk cId="2057766082" sldId="298"/>
         </pc:sldMkLst>
-        <pc:spChg chg="mod">
-          <ac:chgData name="דודו ברינה" userId="581ad2f1418d4d63" providerId="LiveId" clId="{E6D8F55F-E273-473A-A222-18407CE4338B}" dt="2023-03-22T12:45:59.370" v="4032" actId="20577"/>
+        <pc:spChg chg="mod ord">
+          <ac:chgData name="דודו ברינה" userId="581ad2f1418d4d63" providerId="LiveId" clId="{E6D8F55F-E273-473A-A222-18407CE4338B}" dt="2023-03-22T13:42:05.874" v="5677" actId="1076"/>
           <ac:spMkLst>
             <pc:docMk/>
             <pc:sldMk cId="2057766082" sldId="298"/>
@@ -722,17 +750,252 @@
           </ac:spMkLst>
         </pc:spChg>
       </pc:sldChg>
-      <pc:sldChg chg="modSp add mod">
-        <pc:chgData name="דודו ברינה" userId="581ad2f1418d4d63" providerId="LiveId" clId="{E6D8F55F-E273-473A-A222-18407CE4338B}" dt="2023-03-22T12:49:21.365" v="4388" actId="20577"/>
+      <pc:sldChg chg="modSp add mod modClrScheme chgLayout">
+        <pc:chgData name="דודו ברינה" userId="581ad2f1418d4d63" providerId="LiveId" clId="{E6D8F55F-E273-473A-A222-18407CE4338B}" dt="2023-03-22T15:54:23.815" v="7238" actId="5793"/>
         <pc:sldMkLst>
           <pc:docMk/>
           <pc:sldMk cId="2092407866" sldId="299"/>
         </pc:sldMkLst>
-        <pc:spChg chg="mod">
-          <ac:chgData name="דודו ברינה" userId="581ad2f1418d4d63" providerId="LiveId" clId="{E6D8F55F-E273-473A-A222-18407CE4338B}" dt="2023-03-22T12:49:21.365" v="4388" actId="20577"/>
+        <pc:spChg chg="mod ord">
+          <ac:chgData name="דודו ברינה" userId="581ad2f1418d4d63" providerId="LiveId" clId="{E6D8F55F-E273-473A-A222-18407CE4338B}" dt="2023-03-22T15:54:23.815" v="7238" actId="5793"/>
           <ac:spMkLst>
             <pc:docMk/>
             <pc:sldMk cId="2092407866" sldId="299"/>
+            <ac:spMk id="3" creationId="{A2E339BF-E6D7-DD0E-AF02-6813852EE723}"/>
+          </ac:spMkLst>
+        </pc:spChg>
+      </pc:sldChg>
+      <pc:sldChg chg="modSp add mod ord">
+        <pc:chgData name="דודו ברינה" userId="581ad2f1418d4d63" providerId="LiveId" clId="{E6D8F55F-E273-473A-A222-18407CE4338B}" dt="2023-03-22T16:29:30.082" v="11130" actId="113"/>
+        <pc:sldMkLst>
+          <pc:docMk/>
+          <pc:sldMk cId="3786928211" sldId="300"/>
+        </pc:sldMkLst>
+        <pc:spChg chg="mod">
+          <ac:chgData name="דודו ברינה" userId="581ad2f1418d4d63" providerId="LiveId" clId="{E6D8F55F-E273-473A-A222-18407CE4338B}" dt="2023-03-22T15:43:04.625" v="6959" actId="20577"/>
+          <ac:spMkLst>
+            <pc:docMk/>
+            <pc:sldMk cId="3786928211" sldId="300"/>
+            <ac:spMk id="2" creationId="{D53B219B-7E3A-7E84-6386-37313F0CFB09}"/>
+          </ac:spMkLst>
+        </pc:spChg>
+        <pc:spChg chg="mod">
+          <ac:chgData name="דודו ברינה" userId="581ad2f1418d4d63" providerId="LiveId" clId="{E6D8F55F-E273-473A-A222-18407CE4338B}" dt="2023-03-22T16:29:30.082" v="11130" actId="113"/>
+          <ac:spMkLst>
+            <pc:docMk/>
+            <pc:sldMk cId="3786928211" sldId="300"/>
+            <ac:spMk id="3" creationId="{A2E339BF-E6D7-DD0E-AF02-6813852EE723}"/>
+          </ac:spMkLst>
+        </pc:spChg>
+      </pc:sldChg>
+      <pc:sldChg chg="modSp add mod">
+        <pc:chgData name="דודו ברינה" userId="581ad2f1418d4d63" providerId="LiveId" clId="{E6D8F55F-E273-473A-A222-18407CE4338B}" dt="2023-03-22T15:45:28.227" v="6990" actId="20577"/>
+        <pc:sldMkLst>
+          <pc:docMk/>
+          <pc:sldMk cId="266929864" sldId="301"/>
+        </pc:sldMkLst>
+        <pc:spChg chg="mod">
+          <ac:chgData name="דודו ברינה" userId="581ad2f1418d4d63" providerId="LiveId" clId="{E6D8F55F-E273-473A-A222-18407CE4338B}" dt="2023-03-22T13:33:23.035" v="5307" actId="20577"/>
+          <ac:spMkLst>
+            <pc:docMk/>
+            <pc:sldMk cId="266929864" sldId="301"/>
+            <ac:spMk id="2" creationId="{4A940BC6-9DA0-FB4D-8879-DC8B3958C07C}"/>
+          </ac:spMkLst>
+        </pc:spChg>
+        <pc:spChg chg="mod">
+          <ac:chgData name="דודו ברינה" userId="581ad2f1418d4d63" providerId="LiveId" clId="{E6D8F55F-E273-473A-A222-18407CE4338B}" dt="2023-03-22T15:45:28.227" v="6990" actId="20577"/>
+          <ac:spMkLst>
+            <pc:docMk/>
+            <pc:sldMk cId="266929864" sldId="301"/>
+            <ac:spMk id="3" creationId="{1E0B8C4B-3A3C-9FD1-59FB-1666C1F09376}"/>
+          </ac:spMkLst>
+        </pc:spChg>
+      </pc:sldChg>
+      <pc:sldChg chg="modSp add mod ord modClrScheme chgLayout">
+        <pc:chgData name="דודו ברינה" userId="581ad2f1418d4d63" providerId="LiveId" clId="{E6D8F55F-E273-473A-A222-18407CE4338B}" dt="2023-03-22T16:22:19.767" v="10497" actId="3626"/>
+        <pc:sldMkLst>
+          <pc:docMk/>
+          <pc:sldMk cId="735728314" sldId="302"/>
+        </pc:sldMkLst>
+        <pc:spChg chg="mod ord">
+          <ac:chgData name="דודו ברינה" userId="581ad2f1418d4d63" providerId="LiveId" clId="{E6D8F55F-E273-473A-A222-18407CE4338B}" dt="2023-03-22T15:54:02.584" v="7237" actId="20577"/>
+          <ac:spMkLst>
+            <pc:docMk/>
+            <pc:sldMk cId="735728314" sldId="302"/>
+            <ac:spMk id="3" creationId="{A2E339BF-E6D7-DD0E-AF02-6813852EE723}"/>
+          </ac:spMkLst>
+        </pc:spChg>
+        <pc:spChg chg="mod">
+          <ac:chgData name="דודו ברינה" userId="581ad2f1418d4d63" providerId="LiveId" clId="{E6D8F55F-E273-473A-A222-18407CE4338B}" dt="2023-03-22T16:22:19.767" v="10497" actId="3626"/>
+          <ac:spMkLst>
+            <pc:docMk/>
+            <pc:sldMk cId="735728314" sldId="302"/>
+            <ac:spMk id="4" creationId="{AEB6937C-FCF7-EC5D-F2EF-B0F23A28F5DF}"/>
+          </ac:spMkLst>
+        </pc:spChg>
+      </pc:sldChg>
+      <pc:sldChg chg="add del">
+        <pc:chgData name="דודו ברינה" userId="581ad2f1418d4d63" providerId="LiveId" clId="{E6D8F55F-E273-473A-A222-18407CE4338B}" dt="2023-03-22T15:43:47.159" v="6974"/>
+        <pc:sldMkLst>
+          <pc:docMk/>
+          <pc:sldMk cId="3724410284" sldId="303"/>
+        </pc:sldMkLst>
+      </pc:sldChg>
+      <pc:sldChg chg="modSp add mod ord">
+        <pc:chgData name="דודו ברינה" userId="581ad2f1418d4d63" providerId="LiveId" clId="{E6D8F55F-E273-473A-A222-18407CE4338B}" dt="2023-03-22T16:12:36.918" v="9520" actId="113"/>
+        <pc:sldMkLst>
+          <pc:docMk/>
+          <pc:sldMk cId="4292942800" sldId="303"/>
+        </pc:sldMkLst>
+        <pc:spChg chg="mod">
+          <ac:chgData name="דודו ברינה" userId="581ad2f1418d4d63" providerId="LiveId" clId="{E6D8F55F-E273-473A-A222-18407CE4338B}" dt="2023-03-22T15:49:55.591" v="7038" actId="20577"/>
+          <ac:spMkLst>
+            <pc:docMk/>
+            <pc:sldMk cId="4292942800" sldId="303"/>
+            <ac:spMk id="2" creationId="{D53B219B-7E3A-7E84-6386-37313F0CFB09}"/>
+          </ac:spMkLst>
+        </pc:spChg>
+        <pc:spChg chg="mod">
+          <ac:chgData name="דודו ברינה" userId="581ad2f1418d4d63" providerId="LiveId" clId="{E6D8F55F-E273-473A-A222-18407CE4338B}" dt="2023-03-22T16:12:36.918" v="9520" actId="113"/>
+          <ac:spMkLst>
+            <pc:docMk/>
+            <pc:sldMk cId="4292942800" sldId="303"/>
+            <ac:spMk id="3" creationId="{A2E339BF-E6D7-DD0E-AF02-6813852EE723}"/>
+          </ac:spMkLst>
+        </pc:spChg>
+      </pc:sldChg>
+      <pc:sldChg chg="modSp add mod">
+        <pc:chgData name="דודו ברינה" userId="581ad2f1418d4d63" providerId="LiveId" clId="{E6D8F55F-E273-473A-A222-18407CE4338B}" dt="2023-03-22T15:59:35.666" v="7850" actId="3626"/>
+        <pc:sldMkLst>
+          <pc:docMk/>
+          <pc:sldMk cId="1486103832" sldId="304"/>
+        </pc:sldMkLst>
+        <pc:spChg chg="mod">
+          <ac:chgData name="דודו ברינה" userId="581ad2f1418d4d63" providerId="LiveId" clId="{E6D8F55F-E273-473A-A222-18407CE4338B}" dt="2023-03-22T15:59:05.308" v="7848" actId="20577"/>
+          <ac:spMkLst>
+            <pc:docMk/>
+            <pc:sldMk cId="1486103832" sldId="304"/>
+            <ac:spMk id="3" creationId="{A2E339BF-E6D7-DD0E-AF02-6813852EE723}"/>
+          </ac:spMkLst>
+        </pc:spChg>
+        <pc:spChg chg="mod">
+          <ac:chgData name="דודו ברינה" userId="581ad2f1418d4d63" providerId="LiveId" clId="{E6D8F55F-E273-473A-A222-18407CE4338B}" dt="2023-03-22T15:59:35.666" v="7850" actId="3626"/>
+          <ac:spMkLst>
+            <pc:docMk/>
+            <pc:sldMk cId="1486103832" sldId="304"/>
+            <ac:spMk id="4" creationId="{AEB6937C-FCF7-EC5D-F2EF-B0F23A28F5DF}"/>
+          </ac:spMkLst>
+        </pc:spChg>
+      </pc:sldChg>
+      <pc:sldChg chg="modSp add mod">
+        <pc:chgData name="דודו ברינה" userId="581ad2f1418d4d63" providerId="LiveId" clId="{E6D8F55F-E273-473A-A222-18407CE4338B}" dt="2023-03-22T16:05:18.056" v="8718" actId="20577"/>
+        <pc:sldMkLst>
+          <pc:docMk/>
+          <pc:sldMk cId="4161905624" sldId="305"/>
+        </pc:sldMkLst>
+        <pc:spChg chg="mod">
+          <ac:chgData name="דודו ברינה" userId="581ad2f1418d4d63" providerId="LiveId" clId="{E6D8F55F-E273-473A-A222-18407CE4338B}" dt="2023-03-22T16:05:18.056" v="8718" actId="20577"/>
+          <ac:spMkLst>
+            <pc:docMk/>
+            <pc:sldMk cId="4161905624" sldId="305"/>
+            <ac:spMk id="3" creationId="{A2E339BF-E6D7-DD0E-AF02-6813852EE723}"/>
+          </ac:spMkLst>
+        </pc:spChg>
+      </pc:sldChg>
+      <pc:sldChg chg="modSp add mod">
+        <pc:chgData name="דודו ברינה" userId="581ad2f1418d4d63" providerId="LiveId" clId="{E6D8F55F-E273-473A-A222-18407CE4338B}" dt="2023-03-22T16:10:02.251" v="9183" actId="20577"/>
+        <pc:sldMkLst>
+          <pc:docMk/>
+          <pc:sldMk cId="1945280162" sldId="306"/>
+        </pc:sldMkLst>
+        <pc:spChg chg="mod">
+          <ac:chgData name="דודו ברינה" userId="581ad2f1418d4d63" providerId="LiveId" clId="{E6D8F55F-E273-473A-A222-18407CE4338B}" dt="2023-03-22T16:10:02.251" v="9183" actId="20577"/>
+          <ac:spMkLst>
+            <pc:docMk/>
+            <pc:sldMk cId="1945280162" sldId="306"/>
+            <ac:spMk id="3" creationId="{A2E339BF-E6D7-DD0E-AF02-6813852EE723}"/>
+          </ac:spMkLst>
+        </pc:spChg>
+      </pc:sldChg>
+      <pc:sldChg chg="modSp add mod">
+        <pc:chgData name="דודו ברינה" userId="581ad2f1418d4d63" providerId="LiveId" clId="{E6D8F55F-E273-473A-A222-18407CE4338B}" dt="2023-03-22T16:12:11.356" v="9518" actId="20577"/>
+        <pc:sldMkLst>
+          <pc:docMk/>
+          <pc:sldMk cId="1401800161" sldId="307"/>
+        </pc:sldMkLst>
+        <pc:spChg chg="mod">
+          <ac:chgData name="דודו ברינה" userId="581ad2f1418d4d63" providerId="LiveId" clId="{E6D8F55F-E273-473A-A222-18407CE4338B}" dt="2023-03-22T16:12:11.356" v="9518" actId="20577"/>
+          <ac:spMkLst>
+            <pc:docMk/>
+            <pc:sldMk cId="1401800161" sldId="307"/>
+            <ac:spMk id="3" creationId="{A2E339BF-E6D7-DD0E-AF02-6813852EE723}"/>
+          </ac:spMkLst>
+        </pc:spChg>
+      </pc:sldChg>
+      <pc:sldChg chg="modSp add mod">
+        <pc:chgData name="דודו ברינה" userId="581ad2f1418d4d63" providerId="LiveId" clId="{E6D8F55F-E273-473A-A222-18407CE4338B}" dt="2023-03-22T16:16:36.442" v="10017" actId="20577"/>
+        <pc:sldMkLst>
+          <pc:docMk/>
+          <pc:sldMk cId="3467108644" sldId="308"/>
+        </pc:sldMkLst>
+        <pc:spChg chg="mod">
+          <ac:chgData name="דודו ברינה" userId="581ad2f1418d4d63" providerId="LiveId" clId="{E6D8F55F-E273-473A-A222-18407CE4338B}" dt="2023-03-22T16:16:36.442" v="10017" actId="20577"/>
+          <ac:spMkLst>
+            <pc:docMk/>
+            <pc:sldMk cId="3467108644" sldId="308"/>
+            <ac:spMk id="3" creationId="{A2E339BF-E6D7-DD0E-AF02-6813852EE723}"/>
+          </ac:spMkLst>
+        </pc:spChg>
+      </pc:sldChg>
+      <pc:sldChg chg="modSp add mod">
+        <pc:chgData name="דודו ברינה" userId="581ad2f1418d4d63" providerId="LiveId" clId="{E6D8F55F-E273-473A-A222-18407CE4338B}" dt="2023-03-22T16:20:55.382" v="10492" actId="20577"/>
+        <pc:sldMkLst>
+          <pc:docMk/>
+          <pc:sldMk cId="1658071313" sldId="309"/>
+        </pc:sldMkLst>
+        <pc:spChg chg="mod">
+          <ac:chgData name="דודו ברינה" userId="581ad2f1418d4d63" providerId="LiveId" clId="{E6D8F55F-E273-473A-A222-18407CE4338B}" dt="2023-03-22T16:20:55.382" v="10492" actId="20577"/>
+          <ac:spMkLst>
+            <pc:docMk/>
+            <pc:sldMk cId="1658071313" sldId="309"/>
+            <ac:spMk id="3" creationId="{A2E339BF-E6D7-DD0E-AF02-6813852EE723}"/>
+          </ac:spMkLst>
+        </pc:spChg>
+      </pc:sldChg>
+      <pc:sldChg chg="modSp add mod">
+        <pc:chgData name="דודו ברינה" userId="581ad2f1418d4d63" providerId="LiveId" clId="{E6D8F55F-E273-473A-A222-18407CE4338B}" dt="2023-03-22T16:28:38.155" v="11102" actId="20577"/>
+        <pc:sldMkLst>
+          <pc:docMk/>
+          <pc:sldMk cId="4124249273" sldId="310"/>
+        </pc:sldMkLst>
+        <pc:spChg chg="mod">
+          <ac:chgData name="דודו ברינה" userId="581ad2f1418d4d63" providerId="LiveId" clId="{E6D8F55F-E273-473A-A222-18407CE4338B}" dt="2023-03-22T16:28:38.155" v="11102" actId="20577"/>
+          <ac:spMkLst>
+            <pc:docMk/>
+            <pc:sldMk cId="4124249273" sldId="310"/>
+            <ac:spMk id="3" creationId="{A2E339BF-E6D7-DD0E-AF02-6813852EE723}"/>
+          </ac:spMkLst>
+        </pc:spChg>
+        <pc:spChg chg="mod">
+          <ac:chgData name="דודו ברינה" userId="581ad2f1418d4d63" providerId="LiveId" clId="{E6D8F55F-E273-473A-A222-18407CE4338B}" dt="2023-03-22T16:23:28.053" v="10498" actId="20577"/>
+          <ac:spMkLst>
+            <pc:docMk/>
+            <pc:sldMk cId="4124249273" sldId="310"/>
+            <ac:spMk id="4" creationId="{AEB6937C-FCF7-EC5D-F2EF-B0F23A28F5DF}"/>
+          </ac:spMkLst>
+        </pc:spChg>
+      </pc:sldChg>
+      <pc:sldChg chg="modSp add mod">
+        <pc:chgData name="דודו ברינה" userId="581ad2f1418d4d63" providerId="LiveId" clId="{E6D8F55F-E273-473A-A222-18407CE4338B}" dt="2023-03-22T16:34:09.046" v="11670" actId="20577"/>
+        <pc:sldMkLst>
+          <pc:docMk/>
+          <pc:sldMk cId="2181116205" sldId="311"/>
+        </pc:sldMkLst>
+        <pc:spChg chg="mod">
+          <ac:chgData name="דודו ברינה" userId="581ad2f1418d4d63" providerId="LiveId" clId="{E6D8F55F-E273-473A-A222-18407CE4338B}" dt="2023-03-22T16:34:09.046" v="11670" actId="20577"/>
+          <ac:spMkLst>
+            <pc:docMk/>
+            <pc:sldMk cId="2181116205" sldId="311"/>
             <ac:spMk id="3" creationId="{A2E339BF-E6D7-DD0E-AF02-6813852EE723}"/>
           </ac:spMkLst>
         </pc:spChg>
@@ -23744,26 +24007,28 @@
             <a:spLocks noGrp="1"/>
           </p:cNvSpPr>
           <p:nvPr>
-            <p:ph idx="1"/>
+            <p:ph idx="4294967295"/>
           </p:nvPr>
         </p:nvSpPr>
         <p:spPr>
           <a:xfrm>
-            <a:off x="1453896" y="0"/>
-            <a:ext cx="6219444" cy="6332220"/>
+            <a:off x="2255520" y="396240"/>
+            <a:ext cx="9364980" cy="6987223"/>
           </a:xfrm>
         </p:spPr>
         <p:txBody>
           <a:bodyPr/>
           <a:lstStyle/>
           <a:p>
-            <a:pPr algn="r" rtl="1"/>
+            <a:pPr marL="0" indent="0" algn="r" rtl="1">
+              <a:buNone/>
+            </a:pPr>
             <a:r>
               <a:rPr lang="he-IL" b="1" u="sng" dirty="0">
                 <a:latin typeface="Sabon Next LT" panose="02000500000000000000" pitchFamily="2" charset="0"/>
                 <a:cs typeface="Sabon Next LT" panose="02000500000000000000" pitchFamily="2" charset="0"/>
               </a:rPr>
-              <a:t>3.5 – חיפוש קבוצת הליכה </a:t>
+              <a:t>3.4 – אפשרות רישום</a:t>
             </a:r>
           </a:p>
           <a:p>
@@ -23773,7 +24038,47 @@
                 <a:latin typeface="Sabon Next LT" panose="02000500000000000000" pitchFamily="2" charset="0"/>
                 <a:cs typeface="Sabon Next LT" panose="02000500000000000000" pitchFamily="2" charset="0"/>
               </a:rPr>
-              <a:t>על ההורה/התלמיד להתחבר לאפליקציה, לאחר ההתחברות האפליקציה תשאל האם התלמיד מעוניין במסלול עצמי או בטיול עם חברים.</a:t>
+              <a:t>על ההורה/התלמיד להתחבר לקהילת בית הספר שלהם ולמלא את הפרטים הבאים:</a:t>
+            </a:r>
+          </a:p>
+          <a:p>
+            <a:pPr marL="1028700" lvl="2" indent="-342900" algn="r" rtl="1"/>
+            <a:r>
+              <a:rPr lang="he-IL" sz="2000" dirty="0">
+                <a:latin typeface="Sabon Next LT" panose="02000500000000000000" pitchFamily="2" charset="0"/>
+                <a:cs typeface="Sabon Next LT" panose="02000500000000000000" pitchFamily="2" charset="0"/>
+              </a:rPr>
+              <a:t>שם/כינוי</a:t>
+            </a:r>
+          </a:p>
+          <a:p>
+            <a:pPr marL="1028700" lvl="2" indent="-342900" algn="r" rtl="1"/>
+            <a:r>
+              <a:rPr lang="he-IL" sz="2000" dirty="0">
+                <a:solidFill>
+                  <a:srgbClr val="FF0000"/>
+                </a:solidFill>
+                <a:latin typeface="Sabon Next LT" panose="02000500000000000000" pitchFamily="2" charset="0"/>
+                <a:cs typeface="Sabon Next LT" panose="02000500000000000000" pitchFamily="2" charset="0"/>
+              </a:rPr>
+              <a:t>כתובת המגורים </a:t>
+            </a:r>
+            <a:r>
+              <a:rPr lang="he-IL" sz="2000" dirty="0">
+                <a:latin typeface="Sabon Next LT" panose="02000500000000000000" pitchFamily="2" charset="0"/>
+                <a:cs typeface="Sabon Next LT" panose="02000500000000000000" pitchFamily="2" charset="0"/>
+              </a:rPr>
+              <a:t>ממנה מגיעים לבית הספר – (אבטחת מידע?)</a:t>
+            </a:r>
+          </a:p>
+          <a:p>
+            <a:pPr marL="1028700" lvl="2" indent="-342900" algn="r" rtl="1"/>
+            <a:r>
+              <a:rPr lang="he-IL" sz="2000" dirty="0">
+                <a:latin typeface="Sabon Next LT" panose="02000500000000000000" pitchFamily="2" charset="0"/>
+                <a:cs typeface="Sabon Next LT" panose="02000500000000000000" pitchFamily="2" charset="0"/>
+              </a:rPr>
+              <a:t>כיתה – מבין האופציות שמולאו על ידי נציג בית הספר. (ראה 3.3 – רישום בית ספר)</a:t>
             </a:r>
           </a:p>
           <a:p>
@@ -23783,7 +24088,17 @@
                 <a:latin typeface="Sabon Next LT" panose="02000500000000000000" pitchFamily="2" charset="0"/>
                 <a:cs typeface="Sabon Next LT" panose="02000500000000000000" pitchFamily="2" charset="0"/>
               </a:rPr>
-              <a:t>התלמיד יראה על המפה ובאמצעות ביצוע חיפוש ייעודי את התלמידים הנמצאים קרוב אליו על מנת שיוכל לחבור אליהם להליכה משותפת לבית הספר ו/או בחזרה.</a:t>
+              <a:t>צריך לדאוג שלהורה יהיה אפשרות לרשום יותר מילד אחד</a:t>
+            </a:r>
+          </a:p>
+          <a:p>
+            <a:pPr algn="r" rtl="1"/>
+            <a:r>
+              <a:rPr lang="he-IL" dirty="0">
+                <a:latin typeface="Sabon Next LT" panose="02000500000000000000" pitchFamily="2" charset="0"/>
+                <a:cs typeface="Sabon Next LT" panose="02000500000000000000" pitchFamily="2" charset="0"/>
+              </a:rPr>
+              <a:t>על ההרשמה להיות מאושרת על ידי איש הקשר מטעם בית הספר.</a:t>
             </a:r>
           </a:p>
         </p:txBody>
@@ -23883,7 +24198,7 @@
     </p:spTree>
     <p:extLst>
       <p:ext uri="{BB962C8B-B14F-4D97-AF65-F5344CB8AC3E}">
-        <p14:creationId xmlns:p14="http://schemas.microsoft.com/office/powerpoint/2010/main" val="2092407866"/>
+        <p14:creationId xmlns:p14="http://schemas.microsoft.com/office/powerpoint/2010/main" val="2057766082"/>
       </p:ext>
     </p:extLst>
   </p:cSld>
@@ -23912,10 +24227,191 @@
       </p:grpSpPr>
       <p:sp>
         <p:nvSpPr>
+          <p:cNvPr id="3" name="Text Placeholder 2">
+            <a:extLst>
+              <a:ext uri="{FF2B5EF4-FFF2-40B4-BE49-F238E27FC236}">
+                <a16:creationId xmlns:a16="http://schemas.microsoft.com/office/drawing/2014/main" id="{A2E339BF-E6D7-DD0E-AF02-6813852EE723}"/>
+              </a:ext>
+            </a:extLst>
+          </p:cNvPr>
+          <p:cNvSpPr>
+            <a:spLocks noGrp="1"/>
+          </p:cNvSpPr>
+          <p:nvPr>
+            <p:ph idx="4294967295"/>
+          </p:nvPr>
+        </p:nvSpPr>
+        <p:spPr>
+          <a:xfrm>
+            <a:off x="2575561" y="297180"/>
+            <a:ext cx="9136380" cy="6654360"/>
+          </a:xfrm>
+        </p:spPr>
+        <p:txBody>
+          <a:bodyPr/>
+          <a:lstStyle/>
+          <a:p>
+            <a:pPr marL="0" indent="0" algn="r" rtl="1">
+              <a:buNone/>
+            </a:pPr>
+            <a:r>
+              <a:rPr lang="he-IL" b="1" u="sng" dirty="0">
+                <a:latin typeface="Sabon Next LT" panose="02000500000000000000" pitchFamily="2" charset="0"/>
+                <a:cs typeface="Sabon Next LT" panose="02000500000000000000" pitchFamily="2" charset="0"/>
+              </a:rPr>
+              <a:t>3.5 – חיפוש קבוצת הליכה </a:t>
+            </a:r>
+          </a:p>
+          <a:p>
+            <a:pPr algn="r" rtl="1"/>
+            <a:r>
+              <a:rPr lang="he-IL" dirty="0">
+                <a:latin typeface="Sabon Next LT" panose="02000500000000000000" pitchFamily="2" charset="0"/>
+                <a:cs typeface="Sabon Next LT" panose="02000500000000000000" pitchFamily="2" charset="0"/>
+              </a:rPr>
+              <a:t>על ההורה/התלמיד להתחבר לאפליקציה, לאחר ההתחברות האפליקציה תשאל האם התלמיד מעוניין במסלול עצמי או בטיול עם חברים.</a:t>
+            </a:r>
+          </a:p>
+          <a:p>
+            <a:pPr algn="r" rtl="1"/>
+            <a:r>
+              <a:rPr lang="he-IL" dirty="0">
+                <a:latin typeface="Sabon Next LT" panose="02000500000000000000" pitchFamily="2" charset="0"/>
+                <a:cs typeface="Sabon Next LT" panose="02000500000000000000" pitchFamily="2" charset="0"/>
+              </a:rPr>
+              <a:t>התלמיד יראה על המפה ובאמצעות ביצוע חיפוש ייעודי את התלמידים הנמצאים קרוב אליו על מנת שיוכל לחבור אליהם להליכה משותפת לבית הספר ו/או בחזרה.</a:t>
+            </a:r>
+          </a:p>
+        </p:txBody>
+      </p:sp>
+      <p:sp>
+        <p:nvSpPr>
+          <p:cNvPr id="4" name="TextBox 3">
+            <a:extLst>
+              <a:ext uri="{FF2B5EF4-FFF2-40B4-BE49-F238E27FC236}">
+                <a16:creationId xmlns:a16="http://schemas.microsoft.com/office/drawing/2014/main" id="{AEB6937C-FCF7-EC5D-F2EF-B0F23A28F5DF}"/>
+              </a:ext>
+            </a:extLst>
+          </p:cNvPr>
+          <p:cNvSpPr txBox="1"/>
+          <p:nvPr/>
+        </p:nvSpPr>
+        <p:spPr>
+          <a:xfrm>
+            <a:off x="655320" y="5254687"/>
+            <a:ext cx="1371600" cy="369332"/>
+          </a:xfrm>
+          <a:prstGeom prst="rect">
+            <a:avLst/>
+          </a:prstGeom>
+          <a:noFill/>
+        </p:spPr>
+        <p:txBody>
+          <a:bodyPr wrap="square" rtlCol="0">
+            <a:spAutoFit/>
+          </a:bodyPr>
+          <a:lstStyle/>
+          <a:p>
+            <a:pPr algn="r"/>
+            <a:r>
+              <a:rPr lang="he-IL" dirty="0">
+                <a:solidFill>
+                  <a:srgbClr val="FF0000"/>
+                </a:solidFill>
+                <a:hlinkClick r:id="rId2" action="ppaction://hlinksldjump"/>
+              </a:rPr>
+              <a:t>חזור לנושא 3</a:t>
+            </a:r>
+            <a:endParaRPr lang="en-IL" dirty="0">
+              <a:solidFill>
+                <a:srgbClr val="FF0000"/>
+              </a:solidFill>
+            </a:endParaRPr>
+          </a:p>
+        </p:txBody>
+      </p:sp>
+      <p:sp>
+        <p:nvSpPr>
+          <p:cNvPr id="5" name="TextBox 4">
+            <a:extLst>
+              <a:ext uri="{FF2B5EF4-FFF2-40B4-BE49-F238E27FC236}">
+                <a16:creationId xmlns:a16="http://schemas.microsoft.com/office/drawing/2014/main" id="{06D4E037-6AD0-B1E0-8F52-7CA04149C04D}"/>
+              </a:ext>
+            </a:extLst>
+          </p:cNvPr>
+          <p:cNvSpPr txBox="1"/>
+          <p:nvPr/>
+        </p:nvSpPr>
+        <p:spPr>
+          <a:xfrm>
+            <a:off x="716280" y="5592667"/>
+            <a:ext cx="1249680" cy="646331"/>
+          </a:xfrm>
+          <a:prstGeom prst="rect">
+            <a:avLst/>
+          </a:prstGeom>
+          <a:noFill/>
+        </p:spPr>
+        <p:txBody>
+          <a:bodyPr wrap="square" rtlCol="0">
+            <a:spAutoFit/>
+          </a:bodyPr>
+          <a:lstStyle/>
+          <a:p>
+            <a:pPr algn="r"/>
+            <a:r>
+              <a:rPr lang="he-IL" dirty="0">
+                <a:solidFill>
+                  <a:srgbClr val="FF0000"/>
+                </a:solidFill>
+                <a:hlinkClick r:id="rId3" action="ppaction://hlinksldjump"/>
+              </a:rPr>
+              <a:t>חזור לתוכן עניינים</a:t>
+            </a:r>
+            <a:endParaRPr lang="en-IL" dirty="0">
+              <a:solidFill>
+                <a:srgbClr val="FF0000"/>
+              </a:solidFill>
+            </a:endParaRPr>
+          </a:p>
+        </p:txBody>
+      </p:sp>
+    </p:spTree>
+    <p:extLst>
+      <p:ext uri="{BB962C8B-B14F-4D97-AF65-F5344CB8AC3E}">
+        <p14:creationId xmlns:p14="http://schemas.microsoft.com/office/powerpoint/2010/main" val="2092407866"/>
+      </p:ext>
+    </p:extLst>
+  </p:cSld>
+  <p:clrMapOvr>
+    <a:masterClrMapping/>
+  </p:clrMapOvr>
+</p:sld>
+</file>
+
+<file path=ppt/slides/slide12.xml><?xml version="1.0" encoding="utf-8"?>
+<p:sld xmlns:a="http://schemas.openxmlformats.org/drawingml/2006/main" xmlns:r="http://schemas.openxmlformats.org/officeDocument/2006/relationships" xmlns:p="http://schemas.openxmlformats.org/presentationml/2006/main">
+  <p:cSld>
+    <p:spTree>
+      <p:nvGrpSpPr>
+        <p:cNvPr id="1" name=""/>
+        <p:cNvGrpSpPr/>
+        <p:nvPr/>
+      </p:nvGrpSpPr>
+      <p:grpSpPr>
+        <a:xfrm>
+          <a:off x="0" y="0"/>
+          <a:ext cx="0" cy="0"/>
+          <a:chOff x="0" y="0"/>
+          <a:chExt cx="0" cy="0"/>
+        </a:xfrm>
+      </p:grpSpPr>
+      <p:sp>
+        <p:nvSpPr>
           <p:cNvPr id="2" name="Title 1">
             <a:extLst>
               <a:ext uri="{FF2B5EF4-FFF2-40B4-BE49-F238E27FC236}">
-                <a16:creationId xmlns:a16="http://schemas.microsoft.com/office/drawing/2014/main" id="{B83F7D2E-080D-DBDD-73C4-3C38A2B77908}"/>
+                <a16:creationId xmlns:a16="http://schemas.microsoft.com/office/drawing/2014/main" id="{D53B219B-7E3A-7E84-6386-37313F0CFB09}"/>
               </a:ext>
             </a:extLst>
           </p:cNvPr>
@@ -23926,29 +24422,40 @@
             <p:ph type="title"/>
           </p:nvPr>
         </p:nvSpPr>
-        <p:spPr/>
+        <p:spPr>
+          <a:xfrm>
+            <a:off x="1499616" y="962152"/>
+            <a:ext cx="5693664" cy="768096"/>
+          </a:xfrm>
+        </p:spPr>
         <p:txBody>
           <a:bodyPr/>
           <a:lstStyle/>
           <a:p>
-            <a:pPr algn="r"/>
-            <a:r>
-              <a:rPr lang="he-IL" dirty="0"/>
-              <a:t>סיכום</a:t>
-            </a:r>
-            <a:r>
-              <a:rPr lang="en-US" dirty="0"/>
-              <a:t> </a:t>
-            </a:r>
+            <a:pPr algn="r" rtl="1"/>
+            <a:r>
+              <a:rPr lang="he-IL" dirty="0">
+                <a:latin typeface="Arial Black" panose="020B0604020202020204" pitchFamily="34" charset="0"/>
+                <a:cs typeface="Arial Black" panose="020B0604020202020204" pitchFamily="34" charset="0"/>
+              </a:rPr>
+              <a:t>נושא 4 – קשיים נוכחיים</a:t>
+            </a:r>
+            <a:endParaRPr lang="en-US" sz="4400" b="1" dirty="0">
+              <a:solidFill>
+                <a:schemeClr val="accent6"/>
+              </a:solidFill>
+              <a:latin typeface="Arial Black" panose="020B0604020202020204" pitchFamily="34" charset="0"/>
+              <a:cs typeface="Arial Black" panose="020B0604020202020204" pitchFamily="34" charset="0"/>
+            </a:endParaRPr>
           </a:p>
         </p:txBody>
       </p:sp>
       <p:sp>
         <p:nvSpPr>
-          <p:cNvPr id="3" name="Content Placeholder 2">
+          <p:cNvPr id="3" name="Text Placeholder 2">
             <a:extLst>
               <a:ext uri="{FF2B5EF4-FFF2-40B4-BE49-F238E27FC236}">
-                <a16:creationId xmlns:a16="http://schemas.microsoft.com/office/drawing/2014/main" id="{2BE8FDE3-DBA4-6A04-C75D-E56FE92EF368}"/>
+                <a16:creationId xmlns:a16="http://schemas.microsoft.com/office/drawing/2014/main" id="{A2E339BF-E6D7-DD0E-AF02-6813852EE723}"/>
               </a:ext>
             </a:extLst>
           </p:cNvPr>
@@ -23961,27 +24468,1780 @@
         </p:nvSpPr>
         <p:spPr>
           <a:xfrm>
-            <a:off x="1508760" y="2837688"/>
-            <a:ext cx="6880860" cy="2700528"/>
+            <a:off x="1600200" y="1883664"/>
+            <a:ext cx="5693664" cy="4453128"/>
           </a:xfrm>
         </p:spPr>
         <p:txBody>
           <a:bodyPr/>
           <a:lstStyle/>
           <a:p>
+            <a:pPr marL="457200" indent="-457200" algn="r" rtl="1">
+              <a:buFont typeface="Arial" panose="020B0604020202020204" pitchFamily="34" charset="0"/>
+              <a:buChar char="•"/>
+            </a:pPr>
+            <a:r>
+              <a:rPr lang="he-IL" b="1" dirty="0">
+                <a:latin typeface="Sabon Next LT" panose="02000500000000000000" pitchFamily="2" charset="0"/>
+                <a:cs typeface="Sabon Next LT" panose="02000500000000000000" pitchFamily="2" charset="0"/>
+                <a:hlinkClick r:id="rId2" action="ppaction://hlinksldjump"/>
+              </a:rPr>
+              <a:t>אבטחת מידע</a:t>
+            </a:r>
+            <a:endParaRPr lang="he-IL" b="1" dirty="0">
+              <a:latin typeface="Sabon Next LT" panose="02000500000000000000" pitchFamily="2" charset="0"/>
+              <a:cs typeface="Sabon Next LT" panose="02000500000000000000" pitchFamily="2" charset="0"/>
+            </a:endParaRPr>
+          </a:p>
+          <a:p>
+            <a:pPr marL="457200" indent="-457200" algn="r" rtl="1">
+              <a:buFont typeface="Arial" panose="020B0604020202020204" pitchFamily="34" charset="0"/>
+              <a:buChar char="•"/>
+            </a:pPr>
+            <a:r>
+              <a:rPr lang="he-IL" b="1" dirty="0">
+                <a:latin typeface="Sabon Next LT" panose="02000500000000000000" pitchFamily="2" charset="0"/>
+                <a:cs typeface="Sabon Next LT" panose="02000500000000000000" pitchFamily="2" charset="0"/>
+                <a:hlinkClick r:id="rId3" action="ppaction://hlinksldjump"/>
+              </a:rPr>
+              <a:t>שימוש בפונקציונאליות קיימת</a:t>
+            </a:r>
+            <a:endParaRPr lang="he-IL" b="1" dirty="0">
+              <a:latin typeface="Sabon Next LT" panose="02000500000000000000" pitchFamily="2" charset="0"/>
+              <a:cs typeface="Sabon Next LT" panose="02000500000000000000" pitchFamily="2" charset="0"/>
+            </a:endParaRPr>
+          </a:p>
+          <a:p>
+            <a:pPr marL="457200" indent="-457200" algn="r" rtl="1">
+              <a:buFont typeface="Arial" panose="020B0604020202020204" pitchFamily="34" charset="0"/>
+              <a:buChar char="•"/>
+            </a:pPr>
+            <a:r>
+              <a:rPr lang="he-IL" b="1" dirty="0">
+                <a:latin typeface="Sabon Next LT" panose="02000500000000000000" pitchFamily="2" charset="0"/>
+                <a:cs typeface="Sabon Next LT" panose="02000500000000000000" pitchFamily="2" charset="0"/>
+                <a:hlinkClick r:id="rId4" action="ppaction://hlinksldjump"/>
+              </a:rPr>
+              <a:t>ווידוא הליכה</a:t>
+            </a:r>
+            <a:endParaRPr lang="he-IL" b="1" dirty="0">
+              <a:latin typeface="Sabon Next LT" panose="02000500000000000000" pitchFamily="2" charset="0"/>
+              <a:cs typeface="Sabon Next LT" panose="02000500000000000000" pitchFamily="2" charset="0"/>
+            </a:endParaRPr>
+          </a:p>
+          <a:p>
+            <a:pPr marL="457200" indent="-457200" algn="r" rtl="1">
+              <a:buFont typeface="Arial" panose="020B0604020202020204" pitchFamily="34" charset="0"/>
+              <a:buChar char="•"/>
+            </a:pPr>
+            <a:r>
+              <a:rPr lang="he-IL" b="1" dirty="0">
+                <a:latin typeface="Sabon Next LT" panose="02000500000000000000" pitchFamily="2" charset="0"/>
+                <a:cs typeface="Sabon Next LT" panose="02000500000000000000" pitchFamily="2" charset="0"/>
+                <a:hlinkClick r:id="rId5" action="ppaction://hlinksldjump"/>
+              </a:rPr>
+              <a:t>בסיס נתונים</a:t>
+            </a:r>
+            <a:endParaRPr lang="he-IL" b="1" dirty="0">
+              <a:latin typeface="Sabon Next LT" panose="02000500000000000000" pitchFamily="2" charset="0"/>
+              <a:cs typeface="Sabon Next LT" panose="02000500000000000000" pitchFamily="2" charset="0"/>
+            </a:endParaRPr>
+          </a:p>
+          <a:p>
+            <a:pPr marL="457200" indent="-457200" algn="r" rtl="1">
+              <a:buFont typeface="Arial" panose="020B0604020202020204" pitchFamily="34" charset="0"/>
+              <a:buChar char="•"/>
+            </a:pPr>
+            <a:endParaRPr lang="he-IL" dirty="0">
+              <a:latin typeface="Sabon Next LT" panose="02000500000000000000" pitchFamily="2" charset="0"/>
+              <a:cs typeface="Sabon Next LT" panose="02000500000000000000" pitchFamily="2" charset="0"/>
+            </a:endParaRPr>
+          </a:p>
+          <a:p>
+            <a:pPr marL="457200" indent="-457200" algn="r" rtl="1">
+              <a:buFont typeface="Arial" panose="020B0604020202020204" pitchFamily="34" charset="0"/>
+              <a:buChar char="•"/>
+            </a:pPr>
+            <a:endParaRPr lang="he-IL" dirty="0">
+              <a:latin typeface="Sabon Next LT" panose="02000500000000000000" pitchFamily="2" charset="0"/>
+              <a:cs typeface="Sabon Next LT" panose="02000500000000000000" pitchFamily="2" charset="0"/>
+            </a:endParaRPr>
+          </a:p>
+        </p:txBody>
+      </p:sp>
+      <p:sp>
+        <p:nvSpPr>
+          <p:cNvPr id="4" name="TextBox 3">
+            <a:extLst>
+              <a:ext uri="{FF2B5EF4-FFF2-40B4-BE49-F238E27FC236}">
+                <a16:creationId xmlns:a16="http://schemas.microsoft.com/office/drawing/2014/main" id="{24ABCB0D-C5F0-F6B1-CBCF-BAB393E9AB2B}"/>
+              </a:ext>
+            </a:extLst>
+          </p:cNvPr>
+          <p:cNvSpPr txBox="1"/>
+          <p:nvPr/>
+        </p:nvSpPr>
+        <p:spPr>
+          <a:xfrm>
+            <a:off x="350520" y="5895848"/>
+            <a:ext cx="1249680" cy="646331"/>
+          </a:xfrm>
+          <a:prstGeom prst="rect">
+            <a:avLst/>
+          </a:prstGeom>
+          <a:noFill/>
+        </p:spPr>
+        <p:txBody>
+          <a:bodyPr wrap="square" rtlCol="0">
+            <a:spAutoFit/>
+          </a:bodyPr>
+          <a:lstStyle/>
+          <a:p>
             <a:pPr algn="r"/>
             <a:r>
-              <a:rPr lang="he-IL" sz="2400"/>
-              <a:t>השלם כאן.</a:t>
-            </a:r>
-            <a:endParaRPr lang="en-US" sz="2400" dirty="0"/>
+              <a:rPr lang="he-IL" dirty="0">
+                <a:solidFill>
+                  <a:srgbClr val="FF0000"/>
+                </a:solidFill>
+                <a:hlinkClick r:id="rId6" action="ppaction://hlinksldjump"/>
+              </a:rPr>
+              <a:t>חזור לתוכן עניינים</a:t>
+            </a:r>
+            <a:endParaRPr lang="en-IL" dirty="0">
+              <a:solidFill>
+                <a:srgbClr val="FF0000"/>
+              </a:solidFill>
+            </a:endParaRPr>
           </a:p>
         </p:txBody>
       </p:sp>
     </p:spTree>
     <p:extLst>
       <p:ext uri="{BB962C8B-B14F-4D97-AF65-F5344CB8AC3E}">
-        <p14:creationId xmlns:p14="http://schemas.microsoft.com/office/powerpoint/2010/main" val="94818171"/>
+        <p14:creationId xmlns:p14="http://schemas.microsoft.com/office/powerpoint/2010/main" val="4292942800"/>
+      </p:ext>
+    </p:extLst>
+  </p:cSld>
+  <p:clrMapOvr>
+    <a:masterClrMapping/>
+  </p:clrMapOvr>
+</p:sld>
+</file>
+
+<file path=ppt/slides/slide13.xml><?xml version="1.0" encoding="utf-8"?>
+<p:sld xmlns:a="http://schemas.openxmlformats.org/drawingml/2006/main" xmlns:r="http://schemas.openxmlformats.org/officeDocument/2006/relationships" xmlns:p="http://schemas.openxmlformats.org/presentationml/2006/main">
+  <p:cSld>
+    <p:spTree>
+      <p:nvGrpSpPr>
+        <p:cNvPr id="1" name=""/>
+        <p:cNvGrpSpPr/>
+        <p:nvPr/>
+      </p:nvGrpSpPr>
+      <p:grpSpPr>
+        <a:xfrm>
+          <a:off x="0" y="0"/>
+          <a:ext cx="0" cy="0"/>
+          <a:chOff x="0" y="0"/>
+          <a:chExt cx="0" cy="0"/>
+        </a:xfrm>
+      </p:grpSpPr>
+      <p:sp>
+        <p:nvSpPr>
+          <p:cNvPr id="3" name="Text Placeholder 2">
+            <a:extLst>
+              <a:ext uri="{FF2B5EF4-FFF2-40B4-BE49-F238E27FC236}">
+                <a16:creationId xmlns:a16="http://schemas.microsoft.com/office/drawing/2014/main" id="{A2E339BF-E6D7-DD0E-AF02-6813852EE723}"/>
+              </a:ext>
+            </a:extLst>
+          </p:cNvPr>
+          <p:cNvSpPr>
+            <a:spLocks noGrp="1"/>
+          </p:cNvSpPr>
+          <p:nvPr>
+            <p:ph idx="4294967295"/>
+          </p:nvPr>
+        </p:nvSpPr>
+        <p:spPr>
+          <a:xfrm>
+            <a:off x="2575561" y="297180"/>
+            <a:ext cx="9136380" cy="6654360"/>
+          </a:xfrm>
+        </p:spPr>
+        <p:txBody>
+          <a:bodyPr/>
+          <a:lstStyle/>
+          <a:p>
+            <a:pPr marL="0" indent="0" algn="r" rtl="1">
+              <a:buNone/>
+            </a:pPr>
+            <a:r>
+              <a:rPr lang="he-IL" b="1" u="sng" dirty="0">
+                <a:latin typeface="Sabon Next LT" panose="02000500000000000000" pitchFamily="2" charset="0"/>
+                <a:cs typeface="Sabon Next LT" panose="02000500000000000000" pitchFamily="2" charset="0"/>
+              </a:rPr>
+              <a:t>4.1 – אבטחת מידע </a:t>
+            </a:r>
+          </a:p>
+          <a:p>
+            <a:pPr marL="0" indent="0" algn="r" rtl="1">
+              <a:buNone/>
+            </a:pPr>
+            <a:r>
+              <a:rPr lang="he-IL" dirty="0">
+                <a:latin typeface="Sabon Next LT" panose="02000500000000000000" pitchFamily="2" charset="0"/>
+                <a:cs typeface="Sabon Next LT" panose="02000500000000000000" pitchFamily="2" charset="0"/>
+              </a:rPr>
+              <a:t>האפליקציה כפי שהוצגה ע"פ הדרישות הראשוניות עושה שימוש במידע אישי אודות התלמידים העושים שימוש באפליקציה ולכן נדרש ביצוע של אבטחת מידע.</a:t>
+            </a:r>
+          </a:p>
+          <a:p>
+            <a:pPr marL="0" indent="0" algn="r" rtl="1">
+              <a:buNone/>
+            </a:pPr>
+            <a:endParaRPr lang="he-IL" dirty="0">
+              <a:latin typeface="Sabon Next LT" panose="02000500000000000000" pitchFamily="2" charset="0"/>
+              <a:cs typeface="Sabon Next LT" panose="02000500000000000000" pitchFamily="2" charset="0"/>
+            </a:endParaRPr>
+          </a:p>
+          <a:p>
+            <a:pPr marL="0" indent="0" algn="r" rtl="1">
+              <a:buNone/>
+            </a:pPr>
+            <a:r>
+              <a:rPr lang="he-IL" dirty="0">
+                <a:latin typeface="Sabon Next LT" panose="02000500000000000000" pitchFamily="2" charset="0"/>
+                <a:cs typeface="Sabon Next LT" panose="02000500000000000000" pitchFamily="2" charset="0"/>
+              </a:rPr>
+              <a:t>האפליקציה בשלב זה נבנית בידי סטודנטים ולכן הידע באבטחת מידע אינו מספק את הנדרש באפליקציה.</a:t>
+            </a:r>
+          </a:p>
+          <a:p>
+            <a:pPr marL="0" indent="0" algn="r" rtl="1">
+              <a:buNone/>
+            </a:pPr>
+            <a:endParaRPr lang="he-IL" dirty="0">
+              <a:latin typeface="Sabon Next LT" panose="02000500000000000000" pitchFamily="2" charset="0"/>
+              <a:cs typeface="Sabon Next LT" panose="02000500000000000000" pitchFamily="2" charset="0"/>
+            </a:endParaRPr>
+          </a:p>
+          <a:p>
+            <a:pPr marL="0" indent="0" algn="r" rtl="1">
+              <a:buNone/>
+            </a:pPr>
+            <a:r>
+              <a:rPr lang="he-IL" dirty="0">
+                <a:latin typeface="Sabon Next LT" panose="02000500000000000000" pitchFamily="2" charset="0"/>
+                <a:cs typeface="Sabon Next LT" panose="02000500000000000000" pitchFamily="2" charset="0"/>
+              </a:rPr>
+              <a:t>נדרש לבדוק אפשרות לשת"פ או לבניית אב-טיפוס ראשוני שאינו כולל התעסקות עם אבטחת מידע – האם זה ייצור יותר סיבוך מבחינת שילוב האבטחה בשלב עתידי?</a:t>
+            </a:r>
+          </a:p>
+        </p:txBody>
+      </p:sp>
+      <p:sp>
+        <p:nvSpPr>
+          <p:cNvPr id="4" name="TextBox 3">
+            <a:extLst>
+              <a:ext uri="{FF2B5EF4-FFF2-40B4-BE49-F238E27FC236}">
+                <a16:creationId xmlns:a16="http://schemas.microsoft.com/office/drawing/2014/main" id="{AEB6937C-FCF7-EC5D-F2EF-B0F23A28F5DF}"/>
+              </a:ext>
+            </a:extLst>
+          </p:cNvPr>
+          <p:cNvSpPr txBox="1"/>
+          <p:nvPr/>
+        </p:nvSpPr>
+        <p:spPr>
+          <a:xfrm>
+            <a:off x="655320" y="5254687"/>
+            <a:ext cx="1371600" cy="369332"/>
+          </a:xfrm>
+          <a:prstGeom prst="rect">
+            <a:avLst/>
+          </a:prstGeom>
+          <a:noFill/>
+        </p:spPr>
+        <p:txBody>
+          <a:bodyPr wrap="square" rtlCol="0">
+            <a:spAutoFit/>
+          </a:bodyPr>
+          <a:lstStyle/>
+          <a:p>
+            <a:pPr algn="r"/>
+            <a:r>
+              <a:rPr lang="he-IL" dirty="0">
+                <a:solidFill>
+                  <a:srgbClr val="FF0000"/>
+                </a:solidFill>
+                <a:hlinkClick r:id="rId2" action="ppaction://hlinksldjump"/>
+              </a:rPr>
+              <a:t>חזור לנושא 4</a:t>
+            </a:r>
+            <a:endParaRPr lang="en-IL" dirty="0">
+              <a:solidFill>
+                <a:srgbClr val="FF0000"/>
+              </a:solidFill>
+            </a:endParaRPr>
+          </a:p>
+        </p:txBody>
+      </p:sp>
+      <p:sp>
+        <p:nvSpPr>
+          <p:cNvPr id="5" name="TextBox 4">
+            <a:extLst>
+              <a:ext uri="{FF2B5EF4-FFF2-40B4-BE49-F238E27FC236}">
+                <a16:creationId xmlns:a16="http://schemas.microsoft.com/office/drawing/2014/main" id="{06D4E037-6AD0-B1E0-8F52-7CA04149C04D}"/>
+              </a:ext>
+            </a:extLst>
+          </p:cNvPr>
+          <p:cNvSpPr txBox="1"/>
+          <p:nvPr/>
+        </p:nvSpPr>
+        <p:spPr>
+          <a:xfrm>
+            <a:off x="716280" y="5592667"/>
+            <a:ext cx="1249680" cy="646331"/>
+          </a:xfrm>
+          <a:prstGeom prst="rect">
+            <a:avLst/>
+          </a:prstGeom>
+          <a:noFill/>
+        </p:spPr>
+        <p:txBody>
+          <a:bodyPr wrap="square" rtlCol="0">
+            <a:spAutoFit/>
+          </a:bodyPr>
+          <a:lstStyle/>
+          <a:p>
+            <a:pPr algn="r"/>
+            <a:r>
+              <a:rPr lang="he-IL" dirty="0">
+                <a:solidFill>
+                  <a:srgbClr val="FF0000"/>
+                </a:solidFill>
+                <a:hlinkClick r:id="rId3" action="ppaction://hlinksldjump"/>
+              </a:rPr>
+              <a:t>חזור לתוכן עניינים</a:t>
+            </a:r>
+            <a:endParaRPr lang="en-IL" dirty="0">
+              <a:solidFill>
+                <a:srgbClr val="FF0000"/>
+              </a:solidFill>
+            </a:endParaRPr>
+          </a:p>
+        </p:txBody>
+      </p:sp>
+    </p:spTree>
+    <p:extLst>
+      <p:ext uri="{BB962C8B-B14F-4D97-AF65-F5344CB8AC3E}">
+        <p14:creationId xmlns:p14="http://schemas.microsoft.com/office/powerpoint/2010/main" val="1486103832"/>
+      </p:ext>
+    </p:extLst>
+  </p:cSld>
+  <p:clrMapOvr>
+    <a:masterClrMapping/>
+  </p:clrMapOvr>
+</p:sld>
+</file>
+
+<file path=ppt/slides/slide14.xml><?xml version="1.0" encoding="utf-8"?>
+<p:sld xmlns:a="http://schemas.openxmlformats.org/drawingml/2006/main" xmlns:r="http://schemas.openxmlformats.org/officeDocument/2006/relationships" xmlns:p="http://schemas.openxmlformats.org/presentationml/2006/main">
+  <p:cSld>
+    <p:spTree>
+      <p:nvGrpSpPr>
+        <p:cNvPr id="1" name=""/>
+        <p:cNvGrpSpPr/>
+        <p:nvPr/>
+      </p:nvGrpSpPr>
+      <p:grpSpPr>
+        <a:xfrm>
+          <a:off x="0" y="0"/>
+          <a:ext cx="0" cy="0"/>
+          <a:chOff x="0" y="0"/>
+          <a:chExt cx="0" cy="0"/>
+        </a:xfrm>
+      </p:grpSpPr>
+      <p:sp>
+        <p:nvSpPr>
+          <p:cNvPr id="3" name="Text Placeholder 2">
+            <a:extLst>
+              <a:ext uri="{FF2B5EF4-FFF2-40B4-BE49-F238E27FC236}">
+                <a16:creationId xmlns:a16="http://schemas.microsoft.com/office/drawing/2014/main" id="{A2E339BF-E6D7-DD0E-AF02-6813852EE723}"/>
+              </a:ext>
+            </a:extLst>
+          </p:cNvPr>
+          <p:cNvSpPr>
+            <a:spLocks noGrp="1"/>
+          </p:cNvSpPr>
+          <p:nvPr>
+            <p:ph idx="4294967295"/>
+          </p:nvPr>
+        </p:nvSpPr>
+        <p:spPr>
+          <a:xfrm>
+            <a:off x="2575561" y="297180"/>
+            <a:ext cx="9136380" cy="6654360"/>
+          </a:xfrm>
+        </p:spPr>
+        <p:txBody>
+          <a:bodyPr/>
+          <a:lstStyle/>
+          <a:p>
+            <a:pPr marL="0" indent="0" algn="r" rtl="1">
+              <a:buNone/>
+            </a:pPr>
+            <a:r>
+              <a:rPr lang="he-IL" b="1" u="sng" dirty="0">
+                <a:latin typeface="Sabon Next LT" panose="02000500000000000000" pitchFamily="2" charset="0"/>
+                <a:cs typeface="Sabon Next LT" panose="02000500000000000000" pitchFamily="2" charset="0"/>
+              </a:rPr>
+              <a:t>4.2 – שימוש בפונקציונאליות קיימת</a:t>
+            </a:r>
+          </a:p>
+          <a:p>
+            <a:pPr marL="0" indent="0" algn="r" rtl="1">
+              <a:buNone/>
+            </a:pPr>
+            <a:r>
+              <a:rPr lang="he-IL" dirty="0">
+                <a:latin typeface="Sabon Next LT" panose="02000500000000000000" pitchFamily="2" charset="0"/>
+                <a:cs typeface="Sabon Next LT" panose="02000500000000000000" pitchFamily="2" charset="0"/>
+              </a:rPr>
+              <a:t>באפליקציה נדרש לממש פונקציונאליות של ספירת קילומטרים, וכן על האפליקציה לכלול מפה עם סימונים.</a:t>
+            </a:r>
+          </a:p>
+          <a:p>
+            <a:pPr marL="0" indent="0" algn="r" rtl="1">
+              <a:buNone/>
+            </a:pPr>
+            <a:endParaRPr lang="he-IL" dirty="0">
+              <a:latin typeface="Sabon Next LT" panose="02000500000000000000" pitchFamily="2" charset="0"/>
+              <a:cs typeface="Sabon Next LT" panose="02000500000000000000" pitchFamily="2" charset="0"/>
+            </a:endParaRPr>
+          </a:p>
+          <a:p>
+            <a:pPr marL="0" indent="0" algn="r" rtl="1">
+              <a:buNone/>
+            </a:pPr>
+            <a:r>
+              <a:rPr lang="he-IL" dirty="0">
+                <a:latin typeface="Sabon Next LT" panose="02000500000000000000" pitchFamily="2" charset="0"/>
+                <a:cs typeface="Sabon Next LT" panose="02000500000000000000" pitchFamily="2" charset="0"/>
+              </a:rPr>
+              <a:t>כמובן שבגדר הזמן המוגדר עבור הפרוייקט אין זמן (וכן גם לא נדרש) להמציא דברים אלו מאין, אנו צריכים לעשות שימוש בפונקציונאליות קיימת ולבנות עליה את התוספים הפרטיים שלנו.</a:t>
+            </a:r>
+          </a:p>
+          <a:p>
+            <a:pPr marL="0" indent="0" algn="r" rtl="1">
+              <a:buNone/>
+            </a:pPr>
+            <a:endParaRPr lang="he-IL" dirty="0">
+              <a:latin typeface="Sabon Next LT" panose="02000500000000000000" pitchFamily="2" charset="0"/>
+              <a:cs typeface="Sabon Next LT" panose="02000500000000000000" pitchFamily="2" charset="0"/>
+            </a:endParaRPr>
+          </a:p>
+          <a:p>
+            <a:pPr marL="0" indent="0" algn="r" rtl="1">
+              <a:buNone/>
+            </a:pPr>
+            <a:r>
+              <a:rPr lang="he-IL" dirty="0">
+                <a:latin typeface="Sabon Next LT" panose="02000500000000000000" pitchFamily="2" charset="0"/>
+                <a:cs typeface="Sabon Next LT" panose="02000500000000000000" pitchFamily="2" charset="0"/>
+              </a:rPr>
+              <a:t>אנו צריכים להבין כיצד ומאיפה אנו יכולים להשיג </a:t>
+            </a:r>
+            <a:r>
+              <a:rPr lang="en-US" dirty="0" err="1">
+                <a:latin typeface="Sabon Next LT" panose="02000500000000000000" pitchFamily="2" charset="0"/>
+                <a:cs typeface="Sabon Next LT" panose="02000500000000000000" pitchFamily="2" charset="0"/>
+              </a:rPr>
+              <a:t>api</a:t>
+            </a:r>
+            <a:r>
+              <a:rPr lang="he-IL" dirty="0">
+                <a:latin typeface="Sabon Next LT" panose="02000500000000000000" pitchFamily="2" charset="0"/>
+                <a:cs typeface="Sabon Next LT" panose="02000500000000000000" pitchFamily="2" charset="0"/>
+              </a:rPr>
+              <a:t> של אפליקציות כגון </a:t>
+            </a:r>
+            <a:r>
+              <a:rPr lang="en-US" dirty="0">
+                <a:latin typeface="Sabon Next LT" panose="02000500000000000000" pitchFamily="2" charset="0"/>
+                <a:cs typeface="Sabon Next LT" panose="02000500000000000000" pitchFamily="2" charset="0"/>
+              </a:rPr>
+              <a:t>google maps</a:t>
+            </a:r>
+            <a:r>
+              <a:rPr lang="he-IL" dirty="0">
+                <a:latin typeface="Sabon Next LT" panose="02000500000000000000" pitchFamily="2" charset="0"/>
+                <a:cs typeface="Sabon Next LT" panose="02000500000000000000" pitchFamily="2" charset="0"/>
+              </a:rPr>
+              <a:t> וכיצד משלבים אותן בצורה נכונה בקוד.</a:t>
+            </a:r>
+          </a:p>
+        </p:txBody>
+      </p:sp>
+      <p:sp>
+        <p:nvSpPr>
+          <p:cNvPr id="4" name="TextBox 3">
+            <a:extLst>
+              <a:ext uri="{FF2B5EF4-FFF2-40B4-BE49-F238E27FC236}">
+                <a16:creationId xmlns:a16="http://schemas.microsoft.com/office/drawing/2014/main" id="{AEB6937C-FCF7-EC5D-F2EF-B0F23A28F5DF}"/>
+              </a:ext>
+            </a:extLst>
+          </p:cNvPr>
+          <p:cNvSpPr txBox="1"/>
+          <p:nvPr/>
+        </p:nvSpPr>
+        <p:spPr>
+          <a:xfrm>
+            <a:off x="655320" y="5254687"/>
+            <a:ext cx="1371600" cy="369332"/>
+          </a:xfrm>
+          <a:prstGeom prst="rect">
+            <a:avLst/>
+          </a:prstGeom>
+          <a:noFill/>
+        </p:spPr>
+        <p:txBody>
+          <a:bodyPr wrap="square" rtlCol="0">
+            <a:spAutoFit/>
+          </a:bodyPr>
+          <a:lstStyle/>
+          <a:p>
+            <a:pPr algn="r"/>
+            <a:r>
+              <a:rPr lang="he-IL" dirty="0">
+                <a:solidFill>
+                  <a:srgbClr val="FF0000"/>
+                </a:solidFill>
+                <a:hlinkClick r:id="rId2" action="ppaction://hlinksldjump"/>
+              </a:rPr>
+              <a:t>חזור לנושא 4</a:t>
+            </a:r>
+            <a:endParaRPr lang="en-IL" dirty="0">
+              <a:solidFill>
+                <a:srgbClr val="FF0000"/>
+              </a:solidFill>
+            </a:endParaRPr>
+          </a:p>
+        </p:txBody>
+      </p:sp>
+      <p:sp>
+        <p:nvSpPr>
+          <p:cNvPr id="5" name="TextBox 4">
+            <a:extLst>
+              <a:ext uri="{FF2B5EF4-FFF2-40B4-BE49-F238E27FC236}">
+                <a16:creationId xmlns:a16="http://schemas.microsoft.com/office/drawing/2014/main" id="{06D4E037-6AD0-B1E0-8F52-7CA04149C04D}"/>
+              </a:ext>
+            </a:extLst>
+          </p:cNvPr>
+          <p:cNvSpPr txBox="1"/>
+          <p:nvPr/>
+        </p:nvSpPr>
+        <p:spPr>
+          <a:xfrm>
+            <a:off x="716280" y="5592667"/>
+            <a:ext cx="1249680" cy="646331"/>
+          </a:xfrm>
+          <a:prstGeom prst="rect">
+            <a:avLst/>
+          </a:prstGeom>
+          <a:noFill/>
+        </p:spPr>
+        <p:txBody>
+          <a:bodyPr wrap="square" rtlCol="0">
+            <a:spAutoFit/>
+          </a:bodyPr>
+          <a:lstStyle/>
+          <a:p>
+            <a:pPr algn="r"/>
+            <a:r>
+              <a:rPr lang="he-IL" dirty="0">
+                <a:solidFill>
+                  <a:srgbClr val="FF0000"/>
+                </a:solidFill>
+                <a:hlinkClick r:id="rId3" action="ppaction://hlinksldjump"/>
+              </a:rPr>
+              <a:t>חזור לתוכן עניינים</a:t>
+            </a:r>
+            <a:endParaRPr lang="en-IL" dirty="0">
+              <a:solidFill>
+                <a:srgbClr val="FF0000"/>
+              </a:solidFill>
+            </a:endParaRPr>
+          </a:p>
+        </p:txBody>
+      </p:sp>
+    </p:spTree>
+    <p:extLst>
+      <p:ext uri="{BB962C8B-B14F-4D97-AF65-F5344CB8AC3E}">
+        <p14:creationId xmlns:p14="http://schemas.microsoft.com/office/powerpoint/2010/main" val="4161905624"/>
+      </p:ext>
+    </p:extLst>
+  </p:cSld>
+  <p:clrMapOvr>
+    <a:masterClrMapping/>
+  </p:clrMapOvr>
+</p:sld>
+</file>
+
+<file path=ppt/slides/slide15.xml><?xml version="1.0" encoding="utf-8"?>
+<p:sld xmlns:a="http://schemas.openxmlformats.org/drawingml/2006/main" xmlns:r="http://schemas.openxmlformats.org/officeDocument/2006/relationships" xmlns:p="http://schemas.openxmlformats.org/presentationml/2006/main">
+  <p:cSld>
+    <p:spTree>
+      <p:nvGrpSpPr>
+        <p:cNvPr id="1" name=""/>
+        <p:cNvGrpSpPr/>
+        <p:nvPr/>
+      </p:nvGrpSpPr>
+      <p:grpSpPr>
+        <a:xfrm>
+          <a:off x="0" y="0"/>
+          <a:ext cx="0" cy="0"/>
+          <a:chOff x="0" y="0"/>
+          <a:chExt cx="0" cy="0"/>
+        </a:xfrm>
+      </p:grpSpPr>
+      <p:sp>
+        <p:nvSpPr>
+          <p:cNvPr id="3" name="Text Placeholder 2">
+            <a:extLst>
+              <a:ext uri="{FF2B5EF4-FFF2-40B4-BE49-F238E27FC236}">
+                <a16:creationId xmlns:a16="http://schemas.microsoft.com/office/drawing/2014/main" id="{A2E339BF-E6D7-DD0E-AF02-6813852EE723}"/>
+              </a:ext>
+            </a:extLst>
+          </p:cNvPr>
+          <p:cNvSpPr>
+            <a:spLocks noGrp="1"/>
+          </p:cNvSpPr>
+          <p:nvPr>
+            <p:ph idx="4294967295"/>
+          </p:nvPr>
+        </p:nvSpPr>
+        <p:spPr>
+          <a:xfrm>
+            <a:off x="2575561" y="297180"/>
+            <a:ext cx="9136380" cy="6654360"/>
+          </a:xfrm>
+        </p:spPr>
+        <p:txBody>
+          <a:bodyPr/>
+          <a:lstStyle/>
+          <a:p>
+            <a:pPr marL="0" indent="0" algn="r" rtl="1">
+              <a:buNone/>
+            </a:pPr>
+            <a:r>
+              <a:rPr lang="he-IL" b="1" u="sng" dirty="0">
+                <a:latin typeface="Sabon Next LT" panose="02000500000000000000" pitchFamily="2" charset="0"/>
+                <a:cs typeface="Sabon Next LT" panose="02000500000000000000" pitchFamily="2" charset="0"/>
+              </a:rPr>
+              <a:t>4.3 – כיצד לוודא הליכה</a:t>
+            </a:r>
+          </a:p>
+          <a:p>
+            <a:pPr marL="0" indent="0" algn="r" rtl="1">
+              <a:buNone/>
+            </a:pPr>
+            <a:r>
+              <a:rPr lang="he-IL" dirty="0">
+                <a:latin typeface="Sabon Next LT" panose="02000500000000000000" pitchFamily="2" charset="0"/>
+                <a:cs typeface="Sabon Next LT" panose="02000500000000000000" pitchFamily="2" charset="0"/>
+              </a:rPr>
+              <a:t>לכאורה ברגע שאנחנו משיגים כמות בקילומטרים שהתלמיד עבר בפרק זמן מסויים נוכל לקבוע אם מדובר במהירות ההגיונית להיות מוגדרת תחת "הליכה" רגלית.</a:t>
+            </a:r>
+          </a:p>
+          <a:p>
+            <a:pPr marL="0" indent="0" algn="r" rtl="1">
+              <a:buNone/>
+            </a:pPr>
+            <a:endParaRPr lang="he-IL" dirty="0">
+              <a:latin typeface="Sabon Next LT" panose="02000500000000000000" pitchFamily="2" charset="0"/>
+              <a:cs typeface="Sabon Next LT" panose="02000500000000000000" pitchFamily="2" charset="0"/>
+            </a:endParaRPr>
+          </a:p>
+          <a:p>
+            <a:pPr marL="0" indent="0" algn="r" rtl="1">
+              <a:buNone/>
+            </a:pPr>
+            <a:r>
+              <a:rPr lang="he-IL" dirty="0">
+                <a:latin typeface="Sabon Next LT" panose="02000500000000000000" pitchFamily="2" charset="0"/>
+                <a:cs typeface="Sabon Next LT" panose="02000500000000000000" pitchFamily="2" charset="0"/>
+              </a:rPr>
+              <a:t>האם זה מספיק?</a:t>
+            </a:r>
+          </a:p>
+          <a:p>
+            <a:pPr marL="0" indent="0" algn="r" rtl="1">
+              <a:buNone/>
+            </a:pPr>
+            <a:endParaRPr lang="he-IL" dirty="0">
+              <a:latin typeface="Sabon Next LT" panose="02000500000000000000" pitchFamily="2" charset="0"/>
+              <a:cs typeface="Sabon Next LT" panose="02000500000000000000" pitchFamily="2" charset="0"/>
+            </a:endParaRPr>
+          </a:p>
+          <a:p>
+            <a:pPr marL="0" indent="0" algn="r" rtl="1">
+              <a:buNone/>
+            </a:pPr>
+            <a:r>
+              <a:rPr lang="he-IL" dirty="0">
+                <a:latin typeface="Sabon Next LT" panose="02000500000000000000" pitchFamily="2" charset="0"/>
+                <a:cs typeface="Sabon Next LT" panose="02000500000000000000" pitchFamily="2" charset="0"/>
+              </a:rPr>
+              <a:t>קיימת גם אופציה של ספירת צעדים, אך אופציה זאת מאוד פריצה לרמאויות מצד המשתמשים.</a:t>
+            </a:r>
+          </a:p>
+        </p:txBody>
+      </p:sp>
+      <p:sp>
+        <p:nvSpPr>
+          <p:cNvPr id="4" name="TextBox 3">
+            <a:extLst>
+              <a:ext uri="{FF2B5EF4-FFF2-40B4-BE49-F238E27FC236}">
+                <a16:creationId xmlns:a16="http://schemas.microsoft.com/office/drawing/2014/main" id="{AEB6937C-FCF7-EC5D-F2EF-B0F23A28F5DF}"/>
+              </a:ext>
+            </a:extLst>
+          </p:cNvPr>
+          <p:cNvSpPr txBox="1"/>
+          <p:nvPr/>
+        </p:nvSpPr>
+        <p:spPr>
+          <a:xfrm>
+            <a:off x="655320" y="5254687"/>
+            <a:ext cx="1371600" cy="369332"/>
+          </a:xfrm>
+          <a:prstGeom prst="rect">
+            <a:avLst/>
+          </a:prstGeom>
+          <a:noFill/>
+        </p:spPr>
+        <p:txBody>
+          <a:bodyPr wrap="square" rtlCol="0">
+            <a:spAutoFit/>
+          </a:bodyPr>
+          <a:lstStyle/>
+          <a:p>
+            <a:pPr algn="r"/>
+            <a:r>
+              <a:rPr lang="he-IL" dirty="0">
+                <a:solidFill>
+                  <a:srgbClr val="FF0000"/>
+                </a:solidFill>
+                <a:hlinkClick r:id="rId2" action="ppaction://hlinksldjump"/>
+              </a:rPr>
+              <a:t>חזור לנושא 4</a:t>
+            </a:r>
+            <a:endParaRPr lang="en-IL" dirty="0">
+              <a:solidFill>
+                <a:srgbClr val="FF0000"/>
+              </a:solidFill>
+            </a:endParaRPr>
+          </a:p>
+        </p:txBody>
+      </p:sp>
+      <p:sp>
+        <p:nvSpPr>
+          <p:cNvPr id="5" name="TextBox 4">
+            <a:extLst>
+              <a:ext uri="{FF2B5EF4-FFF2-40B4-BE49-F238E27FC236}">
+                <a16:creationId xmlns:a16="http://schemas.microsoft.com/office/drawing/2014/main" id="{06D4E037-6AD0-B1E0-8F52-7CA04149C04D}"/>
+              </a:ext>
+            </a:extLst>
+          </p:cNvPr>
+          <p:cNvSpPr txBox="1"/>
+          <p:nvPr/>
+        </p:nvSpPr>
+        <p:spPr>
+          <a:xfrm>
+            <a:off x="716280" y="5592667"/>
+            <a:ext cx="1249680" cy="646331"/>
+          </a:xfrm>
+          <a:prstGeom prst="rect">
+            <a:avLst/>
+          </a:prstGeom>
+          <a:noFill/>
+        </p:spPr>
+        <p:txBody>
+          <a:bodyPr wrap="square" rtlCol="0">
+            <a:spAutoFit/>
+          </a:bodyPr>
+          <a:lstStyle/>
+          <a:p>
+            <a:pPr algn="r"/>
+            <a:r>
+              <a:rPr lang="he-IL" dirty="0">
+                <a:solidFill>
+                  <a:srgbClr val="FF0000"/>
+                </a:solidFill>
+                <a:hlinkClick r:id="rId3" action="ppaction://hlinksldjump"/>
+              </a:rPr>
+              <a:t>חזור לתוכן עניינים</a:t>
+            </a:r>
+            <a:endParaRPr lang="en-IL" dirty="0">
+              <a:solidFill>
+                <a:srgbClr val="FF0000"/>
+              </a:solidFill>
+            </a:endParaRPr>
+          </a:p>
+        </p:txBody>
+      </p:sp>
+    </p:spTree>
+    <p:extLst>
+      <p:ext uri="{BB962C8B-B14F-4D97-AF65-F5344CB8AC3E}">
+        <p14:creationId xmlns:p14="http://schemas.microsoft.com/office/powerpoint/2010/main" val="1945280162"/>
+      </p:ext>
+    </p:extLst>
+  </p:cSld>
+  <p:clrMapOvr>
+    <a:masterClrMapping/>
+  </p:clrMapOvr>
+</p:sld>
+</file>
+
+<file path=ppt/slides/slide16.xml><?xml version="1.0" encoding="utf-8"?>
+<p:sld xmlns:a="http://schemas.openxmlformats.org/drawingml/2006/main" xmlns:r="http://schemas.openxmlformats.org/officeDocument/2006/relationships" xmlns:p="http://schemas.openxmlformats.org/presentationml/2006/main">
+  <p:cSld>
+    <p:spTree>
+      <p:nvGrpSpPr>
+        <p:cNvPr id="1" name=""/>
+        <p:cNvGrpSpPr/>
+        <p:nvPr/>
+      </p:nvGrpSpPr>
+      <p:grpSpPr>
+        <a:xfrm>
+          <a:off x="0" y="0"/>
+          <a:ext cx="0" cy="0"/>
+          <a:chOff x="0" y="0"/>
+          <a:chExt cx="0" cy="0"/>
+        </a:xfrm>
+      </p:grpSpPr>
+      <p:sp>
+        <p:nvSpPr>
+          <p:cNvPr id="3" name="Text Placeholder 2">
+            <a:extLst>
+              <a:ext uri="{FF2B5EF4-FFF2-40B4-BE49-F238E27FC236}">
+                <a16:creationId xmlns:a16="http://schemas.microsoft.com/office/drawing/2014/main" id="{A2E339BF-E6D7-DD0E-AF02-6813852EE723}"/>
+              </a:ext>
+            </a:extLst>
+          </p:cNvPr>
+          <p:cNvSpPr>
+            <a:spLocks noGrp="1"/>
+          </p:cNvSpPr>
+          <p:nvPr>
+            <p:ph idx="4294967295"/>
+          </p:nvPr>
+        </p:nvSpPr>
+        <p:spPr>
+          <a:xfrm>
+            <a:off x="2575561" y="297180"/>
+            <a:ext cx="9136380" cy="6654360"/>
+          </a:xfrm>
+        </p:spPr>
+        <p:txBody>
+          <a:bodyPr/>
+          <a:lstStyle/>
+          <a:p>
+            <a:pPr marL="0" indent="0" algn="r" rtl="1">
+              <a:buNone/>
+            </a:pPr>
+            <a:r>
+              <a:rPr lang="he-IL" b="1" u="sng" dirty="0">
+                <a:latin typeface="Sabon Next LT" panose="02000500000000000000" pitchFamily="2" charset="0"/>
+                <a:cs typeface="Sabon Next LT" panose="02000500000000000000" pitchFamily="2" charset="0"/>
+              </a:rPr>
+              <a:t>4.4 – כיצד לוודא הליכה</a:t>
+            </a:r>
+          </a:p>
+          <a:p>
+            <a:pPr marL="0" indent="0" algn="r" rtl="1">
+              <a:buNone/>
+            </a:pPr>
+            <a:r>
+              <a:rPr lang="he-IL" dirty="0">
+                <a:latin typeface="Sabon Next LT" panose="02000500000000000000" pitchFamily="2" charset="0"/>
+                <a:cs typeface="Sabon Next LT" panose="02000500000000000000" pitchFamily="2" charset="0"/>
+              </a:rPr>
+              <a:t>לאחר ביצוע התקשרות עם העמותה הובן כי אין אפשרות לגשת לבסיס נתונים של העמותה, בנוסף בשלב זה אין גורם טכנולוגי שנוכל ליצור איתו קשר כלל.</a:t>
+            </a:r>
+          </a:p>
+          <a:p>
+            <a:pPr marL="0" indent="0" algn="r" rtl="1">
+              <a:buNone/>
+            </a:pPr>
+            <a:endParaRPr lang="he-IL" dirty="0">
+              <a:latin typeface="Sabon Next LT" panose="02000500000000000000" pitchFamily="2" charset="0"/>
+              <a:cs typeface="Sabon Next LT" panose="02000500000000000000" pitchFamily="2" charset="0"/>
+            </a:endParaRPr>
+          </a:p>
+          <a:p>
+            <a:pPr marL="0" indent="0" algn="r" rtl="1">
+              <a:buNone/>
+            </a:pPr>
+            <a:r>
+              <a:rPr lang="he-IL" dirty="0">
+                <a:latin typeface="Sabon Next LT" panose="02000500000000000000" pitchFamily="2" charset="0"/>
+                <a:cs typeface="Sabon Next LT" panose="02000500000000000000" pitchFamily="2" charset="0"/>
+              </a:rPr>
+              <a:t>כמו שזה נראה על מנת שנוכל לקיים את דרישות המערכת עלינו לנהל בסיס נתונים, בו נוכל לשמור נתונים שונים שנשמרים בידי המערכת. </a:t>
+            </a:r>
+          </a:p>
+        </p:txBody>
+      </p:sp>
+      <p:sp>
+        <p:nvSpPr>
+          <p:cNvPr id="4" name="TextBox 3">
+            <a:extLst>
+              <a:ext uri="{FF2B5EF4-FFF2-40B4-BE49-F238E27FC236}">
+                <a16:creationId xmlns:a16="http://schemas.microsoft.com/office/drawing/2014/main" id="{AEB6937C-FCF7-EC5D-F2EF-B0F23A28F5DF}"/>
+              </a:ext>
+            </a:extLst>
+          </p:cNvPr>
+          <p:cNvSpPr txBox="1"/>
+          <p:nvPr/>
+        </p:nvSpPr>
+        <p:spPr>
+          <a:xfrm>
+            <a:off x="655320" y="5254687"/>
+            <a:ext cx="1371600" cy="369332"/>
+          </a:xfrm>
+          <a:prstGeom prst="rect">
+            <a:avLst/>
+          </a:prstGeom>
+          <a:noFill/>
+        </p:spPr>
+        <p:txBody>
+          <a:bodyPr wrap="square" rtlCol="0">
+            <a:spAutoFit/>
+          </a:bodyPr>
+          <a:lstStyle/>
+          <a:p>
+            <a:pPr algn="r"/>
+            <a:r>
+              <a:rPr lang="he-IL" dirty="0">
+                <a:solidFill>
+                  <a:srgbClr val="FF0000"/>
+                </a:solidFill>
+                <a:hlinkClick r:id="rId2" action="ppaction://hlinksldjump"/>
+              </a:rPr>
+              <a:t>חזור לנושא 4</a:t>
+            </a:r>
+            <a:endParaRPr lang="en-IL" dirty="0">
+              <a:solidFill>
+                <a:srgbClr val="FF0000"/>
+              </a:solidFill>
+            </a:endParaRPr>
+          </a:p>
+        </p:txBody>
+      </p:sp>
+      <p:sp>
+        <p:nvSpPr>
+          <p:cNvPr id="5" name="TextBox 4">
+            <a:extLst>
+              <a:ext uri="{FF2B5EF4-FFF2-40B4-BE49-F238E27FC236}">
+                <a16:creationId xmlns:a16="http://schemas.microsoft.com/office/drawing/2014/main" id="{06D4E037-6AD0-B1E0-8F52-7CA04149C04D}"/>
+              </a:ext>
+            </a:extLst>
+          </p:cNvPr>
+          <p:cNvSpPr txBox="1"/>
+          <p:nvPr/>
+        </p:nvSpPr>
+        <p:spPr>
+          <a:xfrm>
+            <a:off x="716280" y="5592667"/>
+            <a:ext cx="1249680" cy="646331"/>
+          </a:xfrm>
+          <a:prstGeom prst="rect">
+            <a:avLst/>
+          </a:prstGeom>
+          <a:noFill/>
+        </p:spPr>
+        <p:txBody>
+          <a:bodyPr wrap="square" rtlCol="0">
+            <a:spAutoFit/>
+          </a:bodyPr>
+          <a:lstStyle/>
+          <a:p>
+            <a:pPr algn="r"/>
+            <a:r>
+              <a:rPr lang="he-IL" dirty="0">
+                <a:solidFill>
+                  <a:srgbClr val="FF0000"/>
+                </a:solidFill>
+                <a:hlinkClick r:id="rId3" action="ppaction://hlinksldjump"/>
+              </a:rPr>
+              <a:t>חזור לתוכן עניינים</a:t>
+            </a:r>
+            <a:endParaRPr lang="en-IL" dirty="0">
+              <a:solidFill>
+                <a:srgbClr val="FF0000"/>
+              </a:solidFill>
+            </a:endParaRPr>
+          </a:p>
+        </p:txBody>
+      </p:sp>
+    </p:spTree>
+    <p:extLst>
+      <p:ext uri="{BB962C8B-B14F-4D97-AF65-F5344CB8AC3E}">
+        <p14:creationId xmlns:p14="http://schemas.microsoft.com/office/powerpoint/2010/main" val="1401800161"/>
+      </p:ext>
+    </p:extLst>
+  </p:cSld>
+  <p:clrMapOvr>
+    <a:masterClrMapping/>
+  </p:clrMapOvr>
+</p:sld>
+</file>
+
+<file path=ppt/slides/slide17.xml><?xml version="1.0" encoding="utf-8"?>
+<p:sld xmlns:a="http://schemas.openxmlformats.org/drawingml/2006/main" xmlns:r="http://schemas.openxmlformats.org/officeDocument/2006/relationships" xmlns:p="http://schemas.openxmlformats.org/presentationml/2006/main">
+  <p:cSld>
+    <p:spTree>
+      <p:nvGrpSpPr>
+        <p:cNvPr id="1" name=""/>
+        <p:cNvGrpSpPr/>
+        <p:nvPr/>
+      </p:nvGrpSpPr>
+      <p:grpSpPr>
+        <a:xfrm>
+          <a:off x="0" y="0"/>
+          <a:ext cx="0" cy="0"/>
+          <a:chOff x="0" y="0"/>
+          <a:chExt cx="0" cy="0"/>
+        </a:xfrm>
+      </p:grpSpPr>
+      <p:sp>
+        <p:nvSpPr>
+          <p:cNvPr id="2" name="Title 1">
+            <a:extLst>
+              <a:ext uri="{FF2B5EF4-FFF2-40B4-BE49-F238E27FC236}">
+                <a16:creationId xmlns:a16="http://schemas.microsoft.com/office/drawing/2014/main" id="{D53B219B-7E3A-7E84-6386-37313F0CFB09}"/>
+              </a:ext>
+            </a:extLst>
+          </p:cNvPr>
+          <p:cNvSpPr>
+            <a:spLocks noGrp="1"/>
+          </p:cNvSpPr>
+          <p:nvPr>
+            <p:ph type="title"/>
+          </p:nvPr>
+        </p:nvSpPr>
+        <p:spPr>
+          <a:xfrm>
+            <a:off x="1499616" y="962152"/>
+            <a:ext cx="5693664" cy="768096"/>
+          </a:xfrm>
+        </p:spPr>
+        <p:txBody>
+          <a:bodyPr/>
+          <a:lstStyle/>
+          <a:p>
+            <a:pPr algn="r" rtl="1"/>
+            <a:r>
+              <a:rPr lang="he-IL" dirty="0">
+                <a:latin typeface="Arial Black" panose="020B0604020202020204" pitchFamily="34" charset="0"/>
+                <a:cs typeface="Arial Black" panose="020B0604020202020204" pitchFamily="34" charset="0"/>
+              </a:rPr>
+              <a:t>נושא 5 – רכז תוספות</a:t>
+            </a:r>
+            <a:endParaRPr lang="en-US" sz="4400" b="1" dirty="0">
+              <a:solidFill>
+                <a:schemeClr val="accent6"/>
+              </a:solidFill>
+              <a:latin typeface="Arial Black" panose="020B0604020202020204" pitchFamily="34" charset="0"/>
+              <a:cs typeface="Arial Black" panose="020B0604020202020204" pitchFamily="34" charset="0"/>
+            </a:endParaRPr>
+          </a:p>
+        </p:txBody>
+      </p:sp>
+      <p:sp>
+        <p:nvSpPr>
+          <p:cNvPr id="3" name="Text Placeholder 2">
+            <a:extLst>
+              <a:ext uri="{FF2B5EF4-FFF2-40B4-BE49-F238E27FC236}">
+                <a16:creationId xmlns:a16="http://schemas.microsoft.com/office/drawing/2014/main" id="{A2E339BF-E6D7-DD0E-AF02-6813852EE723}"/>
+              </a:ext>
+            </a:extLst>
+          </p:cNvPr>
+          <p:cNvSpPr>
+            <a:spLocks noGrp="1"/>
+          </p:cNvSpPr>
+          <p:nvPr>
+            <p:ph idx="1"/>
+          </p:nvPr>
+        </p:nvSpPr>
+        <p:spPr>
+          <a:xfrm>
+            <a:off x="1600200" y="1883664"/>
+            <a:ext cx="5693664" cy="4453128"/>
+          </a:xfrm>
+        </p:spPr>
+        <p:txBody>
+          <a:bodyPr/>
+          <a:lstStyle/>
+          <a:p>
+            <a:pPr marL="457200" indent="-457200" algn="r" rtl="1">
+              <a:buFont typeface="Arial" panose="020B0604020202020204" pitchFamily="34" charset="0"/>
+              <a:buChar char="•"/>
+            </a:pPr>
+            <a:r>
+              <a:rPr lang="he-IL" dirty="0">
+                <a:latin typeface="Sabon Next LT" panose="02000500000000000000" pitchFamily="2" charset="0"/>
+                <a:cs typeface="Sabon Next LT" panose="02000500000000000000" pitchFamily="2" charset="0"/>
+              </a:rPr>
+              <a:t>מושא ה</a:t>
+            </a:r>
+            <a:r>
+              <a:rPr lang="he-IL" b="1" dirty="0">
+                <a:latin typeface="Sabon Next LT" panose="02000500000000000000" pitchFamily="2" charset="0"/>
+                <a:cs typeface="Sabon Next LT" panose="02000500000000000000" pitchFamily="2" charset="0"/>
+                <a:hlinkClick r:id="rId2" action="ppaction://hlinksldjump"/>
+              </a:rPr>
+              <a:t>מוטיבציה</a:t>
+            </a:r>
+            <a:r>
+              <a:rPr lang="he-IL" dirty="0">
+                <a:latin typeface="Sabon Next LT" panose="02000500000000000000" pitchFamily="2" charset="0"/>
+                <a:cs typeface="Sabon Next LT" panose="02000500000000000000" pitchFamily="2" charset="0"/>
+              </a:rPr>
+              <a:t> לשימוש באפליקציה</a:t>
+            </a:r>
+          </a:p>
+          <a:p>
+            <a:pPr marL="457200" indent="-457200" algn="r" rtl="1">
+              <a:buFont typeface="Arial" panose="020B0604020202020204" pitchFamily="34" charset="0"/>
+              <a:buChar char="•"/>
+            </a:pPr>
+            <a:r>
+              <a:rPr lang="he-IL" dirty="0">
+                <a:latin typeface="Sabon Next LT" panose="02000500000000000000" pitchFamily="2" charset="0"/>
+                <a:cs typeface="Sabon Next LT" panose="02000500000000000000" pitchFamily="2" charset="0"/>
+              </a:rPr>
+              <a:t>התמודדות עם </a:t>
+            </a:r>
+            <a:r>
+              <a:rPr lang="he-IL" b="1" dirty="0">
+                <a:latin typeface="Sabon Next LT" panose="02000500000000000000" pitchFamily="2" charset="0"/>
+                <a:cs typeface="Sabon Next LT" panose="02000500000000000000" pitchFamily="2" charset="0"/>
+                <a:hlinkClick r:id="rId3" action="ppaction://hlinksldjump"/>
+              </a:rPr>
+              <a:t>מסלולים ארוכים</a:t>
+            </a:r>
+            <a:endParaRPr lang="he-IL" b="1" dirty="0">
+              <a:latin typeface="Sabon Next LT" panose="02000500000000000000" pitchFamily="2" charset="0"/>
+              <a:cs typeface="Sabon Next LT" panose="02000500000000000000" pitchFamily="2" charset="0"/>
+            </a:endParaRPr>
+          </a:p>
+          <a:p>
+            <a:pPr marL="457200" indent="-457200" algn="r" rtl="1">
+              <a:buFont typeface="Arial" panose="020B0604020202020204" pitchFamily="34" charset="0"/>
+              <a:buChar char="•"/>
+            </a:pPr>
+            <a:r>
+              <a:rPr lang="he-IL" dirty="0">
+                <a:latin typeface="Sabon Next LT" panose="02000500000000000000" pitchFamily="2" charset="0"/>
+                <a:cs typeface="Sabon Next LT" panose="02000500000000000000" pitchFamily="2" charset="0"/>
+              </a:rPr>
+              <a:t>הוספת </a:t>
+            </a:r>
+            <a:r>
+              <a:rPr lang="he-IL" b="1" dirty="0">
+                <a:latin typeface="Sabon Next LT" panose="02000500000000000000" pitchFamily="2" charset="0"/>
+                <a:cs typeface="Sabon Next LT" panose="02000500000000000000" pitchFamily="2" charset="0"/>
+                <a:hlinkClick r:id="rId4" action="ppaction://hlinksldjump"/>
+              </a:rPr>
+              <a:t>מלווה לקבוצה</a:t>
+            </a:r>
+            <a:endParaRPr lang="he-IL" b="1" dirty="0">
+              <a:latin typeface="Sabon Next LT" panose="02000500000000000000" pitchFamily="2" charset="0"/>
+              <a:cs typeface="Sabon Next LT" panose="02000500000000000000" pitchFamily="2" charset="0"/>
+            </a:endParaRPr>
+          </a:p>
+          <a:p>
+            <a:pPr marL="457200" indent="-457200" algn="r" rtl="1">
+              <a:buFont typeface="Arial" panose="020B0604020202020204" pitchFamily="34" charset="0"/>
+              <a:buChar char="•"/>
+            </a:pPr>
+            <a:r>
+              <a:rPr lang="he-IL" b="1" dirty="0">
+                <a:latin typeface="Sabon Next LT" panose="02000500000000000000" pitchFamily="2" charset="0"/>
+                <a:cs typeface="Sabon Next LT" panose="02000500000000000000" pitchFamily="2" charset="0"/>
+                <a:hlinkClick r:id="rId5" action="ppaction://hlinksldjump"/>
+              </a:rPr>
+              <a:t>דיווחים</a:t>
+            </a:r>
+            <a:r>
+              <a:rPr lang="he-IL" dirty="0">
+                <a:latin typeface="Sabon Next LT" panose="02000500000000000000" pitchFamily="2" charset="0"/>
+                <a:cs typeface="Sabon Next LT" panose="02000500000000000000" pitchFamily="2" charset="0"/>
+              </a:rPr>
+              <a:t> על מפגעים סביבתיים</a:t>
+            </a:r>
+          </a:p>
+          <a:p>
+            <a:pPr marL="457200" indent="-457200" algn="r" rtl="1">
+              <a:buFont typeface="Arial" panose="020B0604020202020204" pitchFamily="34" charset="0"/>
+              <a:buChar char="•"/>
+            </a:pPr>
+            <a:r>
+              <a:rPr lang="he-IL" b="1" dirty="0">
+                <a:latin typeface="Sabon Next LT" panose="02000500000000000000" pitchFamily="2" charset="0"/>
+                <a:cs typeface="Sabon Next LT" panose="02000500000000000000" pitchFamily="2" charset="0"/>
+                <a:hlinkClick r:id="rId6" action="ppaction://hlinksldjump"/>
+              </a:rPr>
+              <a:t>ניהול צ'אט וארגון לו"ז</a:t>
+            </a:r>
+            <a:endParaRPr lang="he-IL" b="1" dirty="0">
+              <a:latin typeface="Sabon Next LT" panose="02000500000000000000" pitchFamily="2" charset="0"/>
+              <a:cs typeface="Sabon Next LT" panose="02000500000000000000" pitchFamily="2" charset="0"/>
+            </a:endParaRPr>
+          </a:p>
+          <a:p>
+            <a:pPr marL="457200" indent="-457200" algn="r" rtl="1">
+              <a:buFont typeface="Arial" panose="020B0604020202020204" pitchFamily="34" charset="0"/>
+              <a:buChar char="•"/>
+            </a:pPr>
+            <a:endParaRPr lang="he-IL" dirty="0">
+              <a:latin typeface="Sabon Next LT" panose="02000500000000000000" pitchFamily="2" charset="0"/>
+              <a:cs typeface="Sabon Next LT" panose="02000500000000000000" pitchFamily="2" charset="0"/>
+            </a:endParaRPr>
+          </a:p>
+        </p:txBody>
+      </p:sp>
+      <p:sp>
+        <p:nvSpPr>
+          <p:cNvPr id="4" name="TextBox 3">
+            <a:extLst>
+              <a:ext uri="{FF2B5EF4-FFF2-40B4-BE49-F238E27FC236}">
+                <a16:creationId xmlns:a16="http://schemas.microsoft.com/office/drawing/2014/main" id="{24ABCB0D-C5F0-F6B1-CBCF-BAB393E9AB2B}"/>
+              </a:ext>
+            </a:extLst>
+          </p:cNvPr>
+          <p:cNvSpPr txBox="1"/>
+          <p:nvPr/>
+        </p:nvSpPr>
+        <p:spPr>
+          <a:xfrm>
+            <a:off x="350520" y="5895848"/>
+            <a:ext cx="1249680" cy="646331"/>
+          </a:xfrm>
+          <a:prstGeom prst="rect">
+            <a:avLst/>
+          </a:prstGeom>
+          <a:noFill/>
+        </p:spPr>
+        <p:txBody>
+          <a:bodyPr wrap="square" rtlCol="0">
+            <a:spAutoFit/>
+          </a:bodyPr>
+          <a:lstStyle/>
+          <a:p>
+            <a:pPr algn="r"/>
+            <a:r>
+              <a:rPr lang="he-IL" dirty="0">
+                <a:solidFill>
+                  <a:srgbClr val="FF0000"/>
+                </a:solidFill>
+                <a:hlinkClick r:id="rId7" action="ppaction://hlinksldjump"/>
+              </a:rPr>
+              <a:t>חזור לתוכן עניינים</a:t>
+            </a:r>
+            <a:endParaRPr lang="en-IL" dirty="0">
+              <a:solidFill>
+                <a:srgbClr val="FF0000"/>
+              </a:solidFill>
+            </a:endParaRPr>
+          </a:p>
+        </p:txBody>
+      </p:sp>
+    </p:spTree>
+    <p:extLst>
+      <p:ext uri="{BB962C8B-B14F-4D97-AF65-F5344CB8AC3E}">
+        <p14:creationId xmlns:p14="http://schemas.microsoft.com/office/powerpoint/2010/main" val="3786928211"/>
+      </p:ext>
+    </p:extLst>
+  </p:cSld>
+  <p:clrMapOvr>
+    <a:masterClrMapping/>
+  </p:clrMapOvr>
+</p:sld>
+</file>
+
+<file path=ppt/slides/slide18.xml><?xml version="1.0" encoding="utf-8"?>
+<p:sld xmlns:a="http://schemas.openxmlformats.org/drawingml/2006/main" xmlns:r="http://schemas.openxmlformats.org/officeDocument/2006/relationships" xmlns:p="http://schemas.openxmlformats.org/presentationml/2006/main">
+  <p:cSld>
+    <p:spTree>
+      <p:nvGrpSpPr>
+        <p:cNvPr id="1" name=""/>
+        <p:cNvGrpSpPr/>
+        <p:nvPr/>
+      </p:nvGrpSpPr>
+      <p:grpSpPr>
+        <a:xfrm>
+          <a:off x="0" y="0"/>
+          <a:ext cx="0" cy="0"/>
+          <a:chOff x="0" y="0"/>
+          <a:chExt cx="0" cy="0"/>
+        </a:xfrm>
+      </p:grpSpPr>
+      <p:sp>
+        <p:nvSpPr>
+          <p:cNvPr id="3" name="Text Placeholder 2">
+            <a:extLst>
+              <a:ext uri="{FF2B5EF4-FFF2-40B4-BE49-F238E27FC236}">
+                <a16:creationId xmlns:a16="http://schemas.microsoft.com/office/drawing/2014/main" id="{A2E339BF-E6D7-DD0E-AF02-6813852EE723}"/>
+              </a:ext>
+            </a:extLst>
+          </p:cNvPr>
+          <p:cNvSpPr>
+            <a:spLocks noGrp="1"/>
+          </p:cNvSpPr>
+          <p:nvPr>
+            <p:ph idx="4294967295"/>
+          </p:nvPr>
+        </p:nvSpPr>
+        <p:spPr>
+          <a:xfrm>
+            <a:off x="1287780" y="556260"/>
+            <a:ext cx="10050780" cy="5982018"/>
+          </a:xfrm>
+        </p:spPr>
+        <p:txBody>
+          <a:bodyPr/>
+          <a:lstStyle/>
+          <a:p>
+            <a:pPr marL="0" indent="0" algn="r" rtl="1">
+              <a:buNone/>
+            </a:pPr>
+            <a:r>
+              <a:rPr lang="he-IL" b="1" u="sng" dirty="0">
+                <a:latin typeface="Sabon Next LT" panose="02000500000000000000" pitchFamily="2" charset="0"/>
+                <a:cs typeface="Sabon Next LT" panose="02000500000000000000" pitchFamily="2" charset="0"/>
+              </a:rPr>
+              <a:t>5.1 – מוטיבציה לשימוש באפליקציה</a:t>
+            </a:r>
+          </a:p>
+          <a:p>
+            <a:pPr algn="r" rtl="1"/>
+            <a:r>
+              <a:rPr lang="he-IL" sz="2400" dirty="0">
+                <a:latin typeface="Sabon Next LT" panose="02000500000000000000" pitchFamily="2" charset="0"/>
+                <a:cs typeface="Sabon Next LT" panose="02000500000000000000" pitchFamily="2" charset="0"/>
+              </a:rPr>
+              <a:t>נרצה לתת מוטיבציה לתלמידים להוריד ולהשתמש באפליקציה, לשם כך הועלו רעיונות מגוונים של שילוב משחק באפליקציה.</a:t>
+            </a:r>
+          </a:p>
+          <a:p>
+            <a:pPr algn="r" rtl="1"/>
+            <a:r>
+              <a:rPr lang="he-IL" sz="2400" dirty="0">
+                <a:latin typeface="Sabon Next LT" panose="02000500000000000000" pitchFamily="2" charset="0"/>
+                <a:cs typeface="Sabon Next LT" panose="02000500000000000000" pitchFamily="2" charset="0"/>
+              </a:rPr>
+              <a:t>הדרישות מהמשחק זה שהוא ידרוש מהתלמידים לטייל ברגל וכן שלא יכלול שימוש רב מידי בסמארטפון עצמו.</a:t>
+            </a:r>
+          </a:p>
+          <a:p>
+            <a:pPr algn="r" rtl="1"/>
+            <a:r>
+              <a:rPr lang="he-IL" sz="2400" dirty="0">
+                <a:latin typeface="Sabon Next LT" panose="02000500000000000000" pitchFamily="2" charset="0"/>
+                <a:cs typeface="Sabon Next LT" panose="02000500000000000000" pitchFamily="2" charset="0"/>
+              </a:rPr>
+              <a:t>רשימת הרעיונות שהוצגו:</a:t>
+            </a:r>
+          </a:p>
+          <a:p>
+            <a:pPr lvl="2" algn="r" rtl="1"/>
+            <a:r>
+              <a:rPr lang="he-IL" dirty="0">
+                <a:latin typeface="Sabon Next LT" panose="02000500000000000000" pitchFamily="2" charset="0"/>
+                <a:cs typeface="Sabon Next LT" panose="02000500000000000000" pitchFamily="2" charset="0"/>
+              </a:rPr>
+              <a:t>משחק רגיל – סופר צעדים לפי כיתה ומעניק גמול לכיתה שצברה את הניקוד המירבי.</a:t>
+            </a:r>
+          </a:p>
+          <a:p>
+            <a:pPr lvl="2" algn="r" rtl="1"/>
+            <a:r>
+              <a:rPr lang="he-IL" dirty="0">
+                <a:latin typeface="Sabon Next LT" panose="02000500000000000000" pitchFamily="2" charset="0"/>
+                <a:cs typeface="Sabon Next LT" panose="02000500000000000000" pitchFamily="2" charset="0"/>
+              </a:rPr>
+              <a:t>משחק המשלב למידה – צבירת נקודות באמצעות למידה מדברים הנמצאים ברחוב למשל למצוא בשלט של רחוב מי היה אריה אלטמן.</a:t>
+            </a:r>
+          </a:p>
+          <a:p>
+            <a:pPr lvl="2" algn="r" rtl="1"/>
+            <a:r>
+              <a:rPr lang="he-IL" dirty="0">
+                <a:latin typeface="Sabon Next LT" panose="02000500000000000000" pitchFamily="2" charset="0"/>
+                <a:cs typeface="Sabon Next LT" panose="02000500000000000000" pitchFamily="2" charset="0"/>
+              </a:rPr>
+              <a:t>מצא את המטמון – צבירת נקודות בצורה נוספת היא שליחת אתגר מקבוצה אחת לקבוצה אחרת למציאת פתקים או חפצים מסויימים.</a:t>
+            </a:r>
+          </a:p>
+          <a:p>
+            <a:pPr algn="r" rtl="1"/>
+            <a:r>
+              <a:rPr lang="he-IL" sz="2400" dirty="0">
+                <a:latin typeface="Sabon Next LT" panose="02000500000000000000" pitchFamily="2" charset="0"/>
+                <a:cs typeface="Sabon Next LT" panose="02000500000000000000" pitchFamily="2" charset="0"/>
+              </a:rPr>
+              <a:t>נרצה לתת תמריץ למשתמשים פעילים, צורות התמריץ שהוצעו:</a:t>
+            </a:r>
+            <a:endParaRPr lang="he-IL" sz="2000" dirty="0">
+              <a:latin typeface="Sabon Next LT" panose="02000500000000000000" pitchFamily="2" charset="0"/>
+              <a:cs typeface="Sabon Next LT" panose="02000500000000000000" pitchFamily="2" charset="0"/>
+            </a:endParaRPr>
+          </a:p>
+          <a:p>
+            <a:pPr lvl="2" algn="r" rtl="1"/>
+            <a:r>
+              <a:rPr lang="he-IL" dirty="0">
+                <a:latin typeface="Sabon Next LT" panose="02000500000000000000" pitchFamily="2" charset="0"/>
+                <a:cs typeface="Sabon Next LT" panose="02000500000000000000" pitchFamily="2" charset="0"/>
+              </a:rPr>
+              <a:t>הוספת נקודות בונוס לציון בפעילות גופנית (בעוד מקצועות אפשר במשחק המשלב </a:t>
+            </a:r>
+            <a:br>
+              <a:rPr lang="en-US" dirty="0">
+                <a:latin typeface="Sabon Next LT" panose="02000500000000000000" pitchFamily="2" charset="0"/>
+                <a:cs typeface="Sabon Next LT" panose="02000500000000000000" pitchFamily="2" charset="0"/>
+              </a:rPr>
+            </a:br>
+            <a:r>
+              <a:rPr lang="he-IL" dirty="0">
+                <a:latin typeface="Sabon Next LT" panose="02000500000000000000" pitchFamily="2" charset="0"/>
+                <a:cs typeface="Sabon Next LT" panose="02000500000000000000" pitchFamily="2" charset="0"/>
+              </a:rPr>
+              <a:t>למידה) – תמריץ אינדיבידואלי</a:t>
+            </a:r>
+            <a:endParaRPr lang="he-IL" sz="1600" dirty="0">
+              <a:latin typeface="Sabon Next LT" panose="02000500000000000000" pitchFamily="2" charset="0"/>
+              <a:cs typeface="Sabon Next LT" panose="02000500000000000000" pitchFamily="2" charset="0"/>
+            </a:endParaRPr>
+          </a:p>
+          <a:p>
+            <a:pPr lvl="2" algn="r" rtl="1"/>
+            <a:r>
+              <a:rPr lang="he-IL" dirty="0">
+                <a:latin typeface="Sabon Next LT" panose="02000500000000000000" pitchFamily="2" charset="0"/>
+                <a:cs typeface="Sabon Next LT" panose="02000500000000000000" pitchFamily="2" charset="0"/>
+              </a:rPr>
+              <a:t>שיעור חופשי או שיעור שבו יוצג סרט במקום למידה – תמריץ כיתתי</a:t>
+            </a:r>
+            <a:endParaRPr lang="he-IL" sz="2800" dirty="0">
+              <a:latin typeface="Sabon Next LT" panose="02000500000000000000" pitchFamily="2" charset="0"/>
+              <a:cs typeface="Sabon Next LT" panose="02000500000000000000" pitchFamily="2" charset="0"/>
+            </a:endParaRPr>
+          </a:p>
+        </p:txBody>
+      </p:sp>
+      <p:sp>
+        <p:nvSpPr>
+          <p:cNvPr id="4" name="TextBox 3">
+            <a:extLst>
+              <a:ext uri="{FF2B5EF4-FFF2-40B4-BE49-F238E27FC236}">
+                <a16:creationId xmlns:a16="http://schemas.microsoft.com/office/drawing/2014/main" id="{AEB6937C-FCF7-EC5D-F2EF-B0F23A28F5DF}"/>
+              </a:ext>
+            </a:extLst>
+          </p:cNvPr>
+          <p:cNvSpPr txBox="1"/>
+          <p:nvPr/>
+        </p:nvSpPr>
+        <p:spPr>
+          <a:xfrm>
+            <a:off x="655320" y="5254687"/>
+            <a:ext cx="1371600" cy="369332"/>
+          </a:xfrm>
+          <a:prstGeom prst="rect">
+            <a:avLst/>
+          </a:prstGeom>
+          <a:noFill/>
+        </p:spPr>
+        <p:txBody>
+          <a:bodyPr wrap="square" rtlCol="0">
+            <a:spAutoFit/>
+          </a:bodyPr>
+          <a:lstStyle/>
+          <a:p>
+            <a:pPr algn="r"/>
+            <a:r>
+              <a:rPr lang="he-IL" dirty="0">
+                <a:solidFill>
+                  <a:srgbClr val="FF0000"/>
+                </a:solidFill>
+                <a:hlinkClick r:id="rId2" action="ppaction://hlinksldjump"/>
+              </a:rPr>
+              <a:t>חזור לנושא 5</a:t>
+            </a:r>
+            <a:endParaRPr lang="en-IL" dirty="0">
+              <a:solidFill>
+                <a:srgbClr val="FF0000"/>
+              </a:solidFill>
+            </a:endParaRPr>
+          </a:p>
+        </p:txBody>
+      </p:sp>
+      <p:sp>
+        <p:nvSpPr>
+          <p:cNvPr id="5" name="TextBox 4">
+            <a:extLst>
+              <a:ext uri="{FF2B5EF4-FFF2-40B4-BE49-F238E27FC236}">
+                <a16:creationId xmlns:a16="http://schemas.microsoft.com/office/drawing/2014/main" id="{06D4E037-6AD0-B1E0-8F52-7CA04149C04D}"/>
+              </a:ext>
+            </a:extLst>
+          </p:cNvPr>
+          <p:cNvSpPr txBox="1"/>
+          <p:nvPr/>
+        </p:nvSpPr>
+        <p:spPr>
+          <a:xfrm>
+            <a:off x="716280" y="5592667"/>
+            <a:ext cx="1249680" cy="646331"/>
+          </a:xfrm>
+          <a:prstGeom prst="rect">
+            <a:avLst/>
+          </a:prstGeom>
+          <a:noFill/>
+        </p:spPr>
+        <p:txBody>
+          <a:bodyPr wrap="square" rtlCol="0">
+            <a:spAutoFit/>
+          </a:bodyPr>
+          <a:lstStyle/>
+          <a:p>
+            <a:pPr algn="r"/>
+            <a:r>
+              <a:rPr lang="he-IL" dirty="0">
+                <a:solidFill>
+                  <a:srgbClr val="FF0000"/>
+                </a:solidFill>
+                <a:hlinkClick r:id="rId3" action="ppaction://hlinksldjump"/>
+              </a:rPr>
+              <a:t>חזור לתוכן עניינים</a:t>
+            </a:r>
+            <a:endParaRPr lang="en-IL" dirty="0">
+              <a:solidFill>
+                <a:srgbClr val="FF0000"/>
+              </a:solidFill>
+            </a:endParaRPr>
+          </a:p>
+        </p:txBody>
+      </p:sp>
+    </p:spTree>
+    <p:extLst>
+      <p:ext uri="{BB962C8B-B14F-4D97-AF65-F5344CB8AC3E}">
+        <p14:creationId xmlns:p14="http://schemas.microsoft.com/office/powerpoint/2010/main" val="735728314"/>
+      </p:ext>
+    </p:extLst>
+  </p:cSld>
+  <p:clrMapOvr>
+    <a:masterClrMapping/>
+  </p:clrMapOvr>
+</p:sld>
+</file>
+
+<file path=ppt/slides/slide19.xml><?xml version="1.0" encoding="utf-8"?>
+<p:sld xmlns:a="http://schemas.openxmlformats.org/drawingml/2006/main" xmlns:r="http://schemas.openxmlformats.org/officeDocument/2006/relationships" xmlns:p="http://schemas.openxmlformats.org/presentationml/2006/main">
+  <p:cSld>
+    <p:spTree>
+      <p:nvGrpSpPr>
+        <p:cNvPr id="1" name=""/>
+        <p:cNvGrpSpPr/>
+        <p:nvPr/>
+      </p:nvGrpSpPr>
+      <p:grpSpPr>
+        <a:xfrm>
+          <a:off x="0" y="0"/>
+          <a:ext cx="0" cy="0"/>
+          <a:chOff x="0" y="0"/>
+          <a:chExt cx="0" cy="0"/>
+        </a:xfrm>
+      </p:grpSpPr>
+      <p:sp>
+        <p:nvSpPr>
+          <p:cNvPr id="3" name="Text Placeholder 2">
+            <a:extLst>
+              <a:ext uri="{FF2B5EF4-FFF2-40B4-BE49-F238E27FC236}">
+                <a16:creationId xmlns:a16="http://schemas.microsoft.com/office/drawing/2014/main" id="{A2E339BF-E6D7-DD0E-AF02-6813852EE723}"/>
+              </a:ext>
+            </a:extLst>
+          </p:cNvPr>
+          <p:cNvSpPr>
+            <a:spLocks noGrp="1"/>
+          </p:cNvSpPr>
+          <p:nvPr>
+            <p:ph idx="4294967295"/>
+          </p:nvPr>
+        </p:nvSpPr>
+        <p:spPr>
+          <a:xfrm>
+            <a:off x="1287780" y="556260"/>
+            <a:ext cx="10050780" cy="5982018"/>
+          </a:xfrm>
+        </p:spPr>
+        <p:txBody>
+          <a:bodyPr/>
+          <a:lstStyle/>
+          <a:p>
+            <a:pPr marL="0" indent="0" algn="r" rtl="1">
+              <a:buNone/>
+            </a:pPr>
+            <a:r>
+              <a:rPr lang="he-IL" b="1" u="sng" dirty="0">
+                <a:latin typeface="Sabon Next LT" panose="02000500000000000000" pitchFamily="2" charset="0"/>
+                <a:cs typeface="Sabon Next LT" panose="02000500000000000000" pitchFamily="2" charset="0"/>
+              </a:rPr>
+              <a:t>5.2 – מסלולים ארוכים</a:t>
+            </a:r>
+          </a:p>
+          <a:p>
+            <a:pPr marL="0" indent="0" algn="r" rtl="1">
+              <a:buNone/>
+            </a:pPr>
+            <a:r>
+              <a:rPr lang="he-IL" sz="2400" dirty="0">
+                <a:latin typeface="Sabon Next LT" panose="02000500000000000000" pitchFamily="2" charset="0"/>
+                <a:cs typeface="Sabon Next LT" panose="02000500000000000000" pitchFamily="2" charset="0"/>
+              </a:rPr>
+              <a:t>בין הדברים שהועלו, היה גם עניין התלמידים שגרים במקומות מרוחקים.</a:t>
+            </a:r>
+          </a:p>
+          <a:p>
+            <a:pPr marL="0" indent="0" algn="r" rtl="1">
+              <a:buNone/>
+            </a:pPr>
+            <a:r>
+              <a:rPr lang="he-IL" sz="2400" dirty="0">
+                <a:latin typeface="Sabon Next LT" panose="02000500000000000000" pitchFamily="2" charset="0"/>
+                <a:cs typeface="Sabon Next LT" panose="02000500000000000000" pitchFamily="2" charset="0"/>
+              </a:rPr>
+              <a:t>התלמידים הגרים רחוק (מעל 2 ק"מ?) אינם יכולים להגיע באופן רגלי לבית הספר – זה לא ישים כל כך עבורם.</a:t>
+            </a:r>
+          </a:p>
+          <a:p>
+            <a:pPr marL="0" indent="0" algn="r" rtl="1">
+              <a:buNone/>
+            </a:pPr>
+            <a:endParaRPr lang="he-IL" sz="2400" dirty="0">
+              <a:latin typeface="Sabon Next LT" panose="02000500000000000000" pitchFamily="2" charset="0"/>
+              <a:cs typeface="Sabon Next LT" panose="02000500000000000000" pitchFamily="2" charset="0"/>
+            </a:endParaRPr>
+          </a:p>
+          <a:p>
+            <a:pPr marL="0" indent="0" algn="r" rtl="1">
+              <a:buNone/>
+            </a:pPr>
+            <a:r>
+              <a:rPr lang="he-IL" sz="2400" dirty="0">
+                <a:latin typeface="Sabon Next LT" panose="02000500000000000000" pitchFamily="2" charset="0"/>
+                <a:cs typeface="Sabon Next LT" panose="02000500000000000000" pitchFamily="2" charset="0"/>
+              </a:rPr>
+              <a:t>לכן חלק מההרחבות שנרצה לקיים במערכת יהיה אפשרות לשלב עבור תלמידים אלו את האפשרות לנסיעה בתחבורה ציבורית או שירות הסעות כחלק מהמסלול לבית הספר.</a:t>
+            </a:r>
+          </a:p>
+        </p:txBody>
+      </p:sp>
+      <p:sp>
+        <p:nvSpPr>
+          <p:cNvPr id="4" name="TextBox 3">
+            <a:extLst>
+              <a:ext uri="{FF2B5EF4-FFF2-40B4-BE49-F238E27FC236}">
+                <a16:creationId xmlns:a16="http://schemas.microsoft.com/office/drawing/2014/main" id="{AEB6937C-FCF7-EC5D-F2EF-B0F23A28F5DF}"/>
+              </a:ext>
+            </a:extLst>
+          </p:cNvPr>
+          <p:cNvSpPr txBox="1"/>
+          <p:nvPr/>
+        </p:nvSpPr>
+        <p:spPr>
+          <a:xfrm>
+            <a:off x="655320" y="5254687"/>
+            <a:ext cx="1371600" cy="369332"/>
+          </a:xfrm>
+          <a:prstGeom prst="rect">
+            <a:avLst/>
+          </a:prstGeom>
+          <a:noFill/>
+        </p:spPr>
+        <p:txBody>
+          <a:bodyPr wrap="square" rtlCol="0">
+            <a:spAutoFit/>
+          </a:bodyPr>
+          <a:lstStyle/>
+          <a:p>
+            <a:pPr algn="r"/>
+            <a:r>
+              <a:rPr lang="he-IL" dirty="0">
+                <a:solidFill>
+                  <a:srgbClr val="FF0000"/>
+                </a:solidFill>
+                <a:hlinkClick r:id="rId2" action="ppaction://hlinksldjump"/>
+              </a:rPr>
+              <a:t>חזור לנושא 5</a:t>
+            </a:r>
+            <a:endParaRPr lang="en-IL" dirty="0">
+              <a:solidFill>
+                <a:srgbClr val="FF0000"/>
+              </a:solidFill>
+            </a:endParaRPr>
+          </a:p>
+        </p:txBody>
+      </p:sp>
+      <p:sp>
+        <p:nvSpPr>
+          <p:cNvPr id="5" name="TextBox 4">
+            <a:extLst>
+              <a:ext uri="{FF2B5EF4-FFF2-40B4-BE49-F238E27FC236}">
+                <a16:creationId xmlns:a16="http://schemas.microsoft.com/office/drawing/2014/main" id="{06D4E037-6AD0-B1E0-8F52-7CA04149C04D}"/>
+              </a:ext>
+            </a:extLst>
+          </p:cNvPr>
+          <p:cNvSpPr txBox="1"/>
+          <p:nvPr/>
+        </p:nvSpPr>
+        <p:spPr>
+          <a:xfrm>
+            <a:off x="716280" y="5592667"/>
+            <a:ext cx="1249680" cy="646331"/>
+          </a:xfrm>
+          <a:prstGeom prst="rect">
+            <a:avLst/>
+          </a:prstGeom>
+          <a:noFill/>
+        </p:spPr>
+        <p:txBody>
+          <a:bodyPr wrap="square" rtlCol="0">
+            <a:spAutoFit/>
+          </a:bodyPr>
+          <a:lstStyle/>
+          <a:p>
+            <a:pPr algn="r"/>
+            <a:r>
+              <a:rPr lang="he-IL" dirty="0">
+                <a:solidFill>
+                  <a:srgbClr val="FF0000"/>
+                </a:solidFill>
+                <a:hlinkClick r:id="rId3" action="ppaction://hlinksldjump"/>
+              </a:rPr>
+              <a:t>חזור לתוכן עניינים</a:t>
+            </a:r>
+            <a:endParaRPr lang="en-IL" dirty="0">
+              <a:solidFill>
+                <a:srgbClr val="FF0000"/>
+              </a:solidFill>
+            </a:endParaRPr>
+          </a:p>
+        </p:txBody>
+      </p:sp>
+    </p:spTree>
+    <p:extLst>
+      <p:ext uri="{BB962C8B-B14F-4D97-AF65-F5344CB8AC3E}">
+        <p14:creationId xmlns:p14="http://schemas.microsoft.com/office/powerpoint/2010/main" val="3467108644"/>
       </p:ext>
     </p:extLst>
   </p:cSld>
@@ -24116,7 +26376,59 @@
               <a:rPr lang="he-IL" dirty="0">
                 <a:hlinkClick r:id="rId4" action="ppaction://hlinksldjump"/>
               </a:rPr>
+              <a:t>דרישות נוכחיות</a:t>
+            </a:r>
+            <a:endParaRPr lang="he-IL" dirty="0"/>
+          </a:p>
+          <a:p>
+            <a:pPr marL="342900" indent="-342900" algn="r" rtl="1">
+              <a:buFont typeface="Arial" panose="020B0604020202020204" pitchFamily="34" charset="0"/>
+              <a:buChar char="•"/>
+            </a:pPr>
+            <a:r>
+              <a:rPr lang="he-IL" dirty="0">
+                <a:hlinkClick r:id="rId5" action="ppaction://hlinksldjump"/>
+              </a:rPr>
               <a:t>פונקציונאליות עיקרית</a:t>
+            </a:r>
+            <a:endParaRPr lang="he-IL" dirty="0"/>
+          </a:p>
+          <a:p>
+            <a:pPr marL="342900" indent="-342900" algn="r" rtl="1">
+              <a:buFont typeface="Arial" panose="020B0604020202020204" pitchFamily="34" charset="0"/>
+              <a:buChar char="•"/>
+            </a:pPr>
+            <a:r>
+              <a:rPr lang="he-IL" dirty="0">
+                <a:hlinkClick r:id="rId6" action="ppaction://hlinksldjump"/>
+              </a:rPr>
+              <a:t>קשיים</a:t>
+            </a:r>
+            <a:endParaRPr lang="he-IL" dirty="0"/>
+          </a:p>
+          <a:p>
+            <a:pPr marL="342900" indent="-342900" algn="r" rtl="1">
+              <a:buFont typeface="Arial" panose="020B0604020202020204" pitchFamily="34" charset="0"/>
+              <a:buChar char="•"/>
+            </a:pPr>
+            <a:r>
+              <a:rPr lang="he-IL" dirty="0">
+                <a:hlinkClick r:id="rId7" action="ppaction://hlinksldjump"/>
+              </a:rPr>
+              <a:t>תוספות</a:t>
+            </a:r>
+            <a:endParaRPr lang="he-IL" dirty="0"/>
+          </a:p>
+          <a:p>
+            <a:pPr marL="342900" indent="-342900" algn="r" rtl="1">
+              <a:buFont typeface="Arial" panose="020B0604020202020204" pitchFamily="34" charset="0"/>
+              <a:buChar char="•"/>
+            </a:pPr>
+            <a:r>
+              <a:rPr lang="he-IL" dirty="0">
+                <a:hlinkClick r:id="rId8" action="ppaction://hlinksldjump"/>
+              </a:rPr>
+              <a:t>סיכום</a:t>
             </a:r>
             <a:endParaRPr lang="en-US" dirty="0"/>
           </a:p>
@@ -24126,6 +26438,904 @@
     <p:extLst>
       <p:ext uri="{BB962C8B-B14F-4D97-AF65-F5344CB8AC3E}">
         <p14:creationId xmlns:p14="http://schemas.microsoft.com/office/powerpoint/2010/main" val="1036433725"/>
+      </p:ext>
+    </p:extLst>
+  </p:cSld>
+  <p:clrMapOvr>
+    <a:masterClrMapping/>
+  </p:clrMapOvr>
+</p:sld>
+</file>
+
+<file path=ppt/slides/slide20.xml><?xml version="1.0" encoding="utf-8"?>
+<p:sld xmlns:a="http://schemas.openxmlformats.org/drawingml/2006/main" xmlns:r="http://schemas.openxmlformats.org/officeDocument/2006/relationships" xmlns:p="http://schemas.openxmlformats.org/presentationml/2006/main">
+  <p:cSld>
+    <p:spTree>
+      <p:nvGrpSpPr>
+        <p:cNvPr id="1" name=""/>
+        <p:cNvGrpSpPr/>
+        <p:nvPr/>
+      </p:nvGrpSpPr>
+      <p:grpSpPr>
+        <a:xfrm>
+          <a:off x="0" y="0"/>
+          <a:ext cx="0" cy="0"/>
+          <a:chOff x="0" y="0"/>
+          <a:chExt cx="0" cy="0"/>
+        </a:xfrm>
+      </p:grpSpPr>
+      <p:sp>
+        <p:nvSpPr>
+          <p:cNvPr id="3" name="Text Placeholder 2">
+            <a:extLst>
+              <a:ext uri="{FF2B5EF4-FFF2-40B4-BE49-F238E27FC236}">
+                <a16:creationId xmlns:a16="http://schemas.microsoft.com/office/drawing/2014/main" id="{A2E339BF-E6D7-DD0E-AF02-6813852EE723}"/>
+              </a:ext>
+            </a:extLst>
+          </p:cNvPr>
+          <p:cNvSpPr>
+            <a:spLocks noGrp="1"/>
+          </p:cNvSpPr>
+          <p:nvPr>
+            <p:ph idx="4294967295"/>
+          </p:nvPr>
+        </p:nvSpPr>
+        <p:spPr>
+          <a:xfrm>
+            <a:off x="1287780" y="556260"/>
+            <a:ext cx="10050780" cy="5982018"/>
+          </a:xfrm>
+        </p:spPr>
+        <p:txBody>
+          <a:bodyPr/>
+          <a:lstStyle/>
+          <a:p>
+            <a:pPr marL="0" indent="0" algn="r" rtl="1">
+              <a:buNone/>
+            </a:pPr>
+            <a:r>
+              <a:rPr lang="he-IL" b="1" u="sng" dirty="0">
+                <a:latin typeface="Sabon Next LT" panose="02000500000000000000" pitchFamily="2" charset="0"/>
+                <a:cs typeface="Sabon Next LT" panose="02000500000000000000" pitchFamily="2" charset="0"/>
+              </a:rPr>
+              <a:t>5.3 – הוספת מלווה לקבוצה</a:t>
+            </a:r>
+          </a:p>
+          <a:p>
+            <a:pPr marL="0" indent="0" algn="r" rtl="1">
+              <a:buNone/>
+            </a:pPr>
+            <a:r>
+              <a:rPr lang="he-IL" sz="2400" dirty="0">
+                <a:latin typeface="Sabon Next LT" panose="02000500000000000000" pitchFamily="2" charset="0"/>
+                <a:cs typeface="Sabon Next LT" panose="02000500000000000000" pitchFamily="2" charset="0"/>
+              </a:rPr>
+              <a:t>אפשרות הוספה של מלווה לקבוצה של תלמידים (ביסודי).</a:t>
+            </a:r>
+          </a:p>
+          <a:p>
+            <a:pPr marL="0" indent="0" algn="r" rtl="1">
+              <a:buNone/>
+            </a:pPr>
+            <a:r>
+              <a:rPr lang="he-IL" sz="2400" dirty="0">
+                <a:latin typeface="Sabon Next LT" panose="02000500000000000000" pitchFamily="2" charset="0"/>
+                <a:cs typeface="Sabon Next LT" panose="02000500000000000000" pitchFamily="2" charset="0"/>
+              </a:rPr>
+              <a:t>אפשרות זאת מתבוננת על 2 אפשרויות :</a:t>
+            </a:r>
+          </a:p>
+          <a:p>
+            <a:pPr marL="457200" indent="-457200" algn="r" rtl="1">
+              <a:buAutoNum type="arabicPeriod"/>
+            </a:pPr>
+            <a:r>
+              <a:rPr lang="he-IL" sz="2400" dirty="0">
+                <a:latin typeface="Sabon Next LT" panose="02000500000000000000" pitchFamily="2" charset="0"/>
+                <a:cs typeface="Sabon Next LT" panose="02000500000000000000" pitchFamily="2" charset="0"/>
+              </a:rPr>
+              <a:t>אפשרות בה אחד ההורים יהיה המלווה, במקרה  זה האפליקציה תשאל את ההורה אם הוא מעוניין להיות מלווה לקבוצה של תלמידים ואז תדע להציע למי שרלוונטי בהתאם.</a:t>
+            </a:r>
+          </a:p>
+          <a:p>
+            <a:pPr marL="457200" indent="-457200" algn="r" rtl="1">
+              <a:buAutoNum type="arabicPeriod"/>
+            </a:pPr>
+            <a:r>
+              <a:rPr lang="he-IL" sz="2400" dirty="0">
+                <a:latin typeface="Sabon Next LT" panose="02000500000000000000" pitchFamily="2" charset="0"/>
+                <a:cs typeface="Sabon Next LT" panose="02000500000000000000" pitchFamily="2" charset="0"/>
+              </a:rPr>
+              <a:t>אפשרות של ליווי על ידי תלמיד בכיתה גבוהה יותר – במצב זה הוצע להציג תמריץ עבור הילד המלווה.</a:t>
+            </a:r>
+          </a:p>
+          <a:p>
+            <a:pPr marL="0" indent="0" algn="r" rtl="1">
+              <a:buNone/>
+            </a:pPr>
+            <a:endParaRPr lang="he-IL" sz="2400" dirty="0">
+              <a:latin typeface="Sabon Next LT" panose="02000500000000000000" pitchFamily="2" charset="0"/>
+              <a:cs typeface="Sabon Next LT" panose="02000500000000000000" pitchFamily="2" charset="0"/>
+            </a:endParaRPr>
+          </a:p>
+        </p:txBody>
+      </p:sp>
+      <p:sp>
+        <p:nvSpPr>
+          <p:cNvPr id="4" name="TextBox 3">
+            <a:extLst>
+              <a:ext uri="{FF2B5EF4-FFF2-40B4-BE49-F238E27FC236}">
+                <a16:creationId xmlns:a16="http://schemas.microsoft.com/office/drawing/2014/main" id="{AEB6937C-FCF7-EC5D-F2EF-B0F23A28F5DF}"/>
+              </a:ext>
+            </a:extLst>
+          </p:cNvPr>
+          <p:cNvSpPr txBox="1"/>
+          <p:nvPr/>
+        </p:nvSpPr>
+        <p:spPr>
+          <a:xfrm>
+            <a:off x="655320" y="5254687"/>
+            <a:ext cx="1371600" cy="369332"/>
+          </a:xfrm>
+          <a:prstGeom prst="rect">
+            <a:avLst/>
+          </a:prstGeom>
+          <a:noFill/>
+        </p:spPr>
+        <p:txBody>
+          <a:bodyPr wrap="square" rtlCol="0">
+            <a:spAutoFit/>
+          </a:bodyPr>
+          <a:lstStyle/>
+          <a:p>
+            <a:pPr algn="r"/>
+            <a:r>
+              <a:rPr lang="he-IL" dirty="0">
+                <a:solidFill>
+                  <a:srgbClr val="FF0000"/>
+                </a:solidFill>
+                <a:hlinkClick r:id="rId2" action="ppaction://hlinksldjump"/>
+              </a:rPr>
+              <a:t>חזור לנושא 5</a:t>
+            </a:r>
+            <a:endParaRPr lang="en-IL" dirty="0">
+              <a:solidFill>
+                <a:srgbClr val="FF0000"/>
+              </a:solidFill>
+            </a:endParaRPr>
+          </a:p>
+        </p:txBody>
+      </p:sp>
+      <p:sp>
+        <p:nvSpPr>
+          <p:cNvPr id="5" name="TextBox 4">
+            <a:extLst>
+              <a:ext uri="{FF2B5EF4-FFF2-40B4-BE49-F238E27FC236}">
+                <a16:creationId xmlns:a16="http://schemas.microsoft.com/office/drawing/2014/main" id="{06D4E037-6AD0-B1E0-8F52-7CA04149C04D}"/>
+              </a:ext>
+            </a:extLst>
+          </p:cNvPr>
+          <p:cNvSpPr txBox="1"/>
+          <p:nvPr/>
+        </p:nvSpPr>
+        <p:spPr>
+          <a:xfrm>
+            <a:off x="716280" y="5592667"/>
+            <a:ext cx="1249680" cy="646331"/>
+          </a:xfrm>
+          <a:prstGeom prst="rect">
+            <a:avLst/>
+          </a:prstGeom>
+          <a:noFill/>
+        </p:spPr>
+        <p:txBody>
+          <a:bodyPr wrap="square" rtlCol="0">
+            <a:spAutoFit/>
+          </a:bodyPr>
+          <a:lstStyle/>
+          <a:p>
+            <a:pPr algn="r"/>
+            <a:r>
+              <a:rPr lang="he-IL" dirty="0">
+                <a:solidFill>
+                  <a:srgbClr val="FF0000"/>
+                </a:solidFill>
+                <a:hlinkClick r:id="rId3" action="ppaction://hlinksldjump"/>
+              </a:rPr>
+              <a:t>חזור לתוכן עניינים</a:t>
+            </a:r>
+            <a:endParaRPr lang="en-IL" dirty="0">
+              <a:solidFill>
+                <a:srgbClr val="FF0000"/>
+              </a:solidFill>
+            </a:endParaRPr>
+          </a:p>
+        </p:txBody>
+      </p:sp>
+    </p:spTree>
+    <p:extLst>
+      <p:ext uri="{BB962C8B-B14F-4D97-AF65-F5344CB8AC3E}">
+        <p14:creationId xmlns:p14="http://schemas.microsoft.com/office/powerpoint/2010/main" val="1658071313"/>
+      </p:ext>
+    </p:extLst>
+  </p:cSld>
+  <p:clrMapOvr>
+    <a:masterClrMapping/>
+  </p:clrMapOvr>
+</p:sld>
+</file>
+
+<file path=ppt/slides/slide21.xml><?xml version="1.0" encoding="utf-8"?>
+<p:sld xmlns:a="http://schemas.openxmlformats.org/drawingml/2006/main" xmlns:r="http://schemas.openxmlformats.org/officeDocument/2006/relationships" xmlns:p="http://schemas.openxmlformats.org/presentationml/2006/main">
+  <p:cSld>
+    <p:spTree>
+      <p:nvGrpSpPr>
+        <p:cNvPr id="1" name=""/>
+        <p:cNvGrpSpPr/>
+        <p:nvPr/>
+      </p:nvGrpSpPr>
+      <p:grpSpPr>
+        <a:xfrm>
+          <a:off x="0" y="0"/>
+          <a:ext cx="0" cy="0"/>
+          <a:chOff x="0" y="0"/>
+          <a:chExt cx="0" cy="0"/>
+        </a:xfrm>
+      </p:grpSpPr>
+      <p:sp>
+        <p:nvSpPr>
+          <p:cNvPr id="3" name="Text Placeholder 2">
+            <a:extLst>
+              <a:ext uri="{FF2B5EF4-FFF2-40B4-BE49-F238E27FC236}">
+                <a16:creationId xmlns:a16="http://schemas.microsoft.com/office/drawing/2014/main" id="{A2E339BF-E6D7-DD0E-AF02-6813852EE723}"/>
+              </a:ext>
+            </a:extLst>
+          </p:cNvPr>
+          <p:cNvSpPr>
+            <a:spLocks noGrp="1"/>
+          </p:cNvSpPr>
+          <p:nvPr>
+            <p:ph idx="4294967295"/>
+          </p:nvPr>
+        </p:nvSpPr>
+        <p:spPr>
+          <a:xfrm>
+            <a:off x="1287780" y="556260"/>
+            <a:ext cx="10050780" cy="5982018"/>
+          </a:xfrm>
+        </p:spPr>
+        <p:txBody>
+          <a:bodyPr/>
+          <a:lstStyle/>
+          <a:p>
+            <a:pPr marL="0" indent="0" algn="r" rtl="1">
+              <a:buNone/>
+            </a:pPr>
+            <a:r>
+              <a:rPr lang="he-IL" b="1" u="sng" dirty="0">
+                <a:latin typeface="Sabon Next LT" panose="02000500000000000000" pitchFamily="2" charset="0"/>
+                <a:cs typeface="Sabon Next LT" panose="02000500000000000000" pitchFamily="2" charset="0"/>
+              </a:rPr>
+              <a:t>5.3 – דיווחים סביבתיים</a:t>
+            </a:r>
+          </a:p>
+          <a:p>
+            <a:pPr marL="0" indent="0" algn="r" rtl="1">
+              <a:buNone/>
+            </a:pPr>
+            <a:r>
+              <a:rPr lang="he-IL" sz="2400" dirty="0">
+                <a:latin typeface="Sabon Next LT" panose="02000500000000000000" pitchFamily="2" charset="0"/>
+                <a:cs typeface="Sabon Next LT" panose="02000500000000000000" pitchFamily="2" charset="0"/>
+              </a:rPr>
+              <a:t>כמה פעמים הלכתם/ן ברחוב וראיתם/ן מפגע סביבתי, מצינור שהתפוצץ ועד עץ שנפל או מכשול שהוצב באמצע הדרך, אך לא ידעתם למי אתם אמורים לדווח על כך? (ניחוש שהרבה).</a:t>
+            </a:r>
+          </a:p>
+          <a:p>
+            <a:pPr marL="0" indent="0" algn="r" rtl="1">
+              <a:buNone/>
+            </a:pPr>
+            <a:endParaRPr lang="he-IL" sz="2400" dirty="0">
+              <a:latin typeface="Sabon Next LT" panose="02000500000000000000" pitchFamily="2" charset="0"/>
+              <a:cs typeface="Sabon Next LT" panose="02000500000000000000" pitchFamily="2" charset="0"/>
+            </a:endParaRPr>
+          </a:p>
+          <a:p>
+            <a:pPr marL="0" indent="0" algn="r" rtl="1">
+              <a:buNone/>
+            </a:pPr>
+            <a:r>
+              <a:rPr lang="he-IL" sz="2400" dirty="0">
+                <a:latin typeface="Sabon Next LT" panose="02000500000000000000" pitchFamily="2" charset="0"/>
+                <a:cs typeface="Sabon Next LT" panose="02000500000000000000" pitchFamily="2" charset="0"/>
+              </a:rPr>
+              <a:t>התוספת של דיווח סביבתי אמור לתת את הגישה לדווח על כך בקלות רבה יותר כלפי הגורמים הרלוונטיים.</a:t>
+            </a:r>
+          </a:p>
+          <a:p>
+            <a:pPr marL="0" indent="0" algn="r" rtl="1">
+              <a:buNone/>
+            </a:pPr>
+            <a:endParaRPr lang="he-IL" sz="2400" dirty="0">
+              <a:latin typeface="Sabon Next LT" panose="02000500000000000000" pitchFamily="2" charset="0"/>
+              <a:cs typeface="Sabon Next LT" panose="02000500000000000000" pitchFamily="2" charset="0"/>
+            </a:endParaRPr>
+          </a:p>
+          <a:p>
+            <a:pPr marL="0" indent="0" algn="r" rtl="1">
+              <a:buNone/>
+            </a:pPr>
+            <a:r>
+              <a:rPr lang="he-IL" sz="2400" dirty="0">
+                <a:latin typeface="Sabon Next LT" panose="02000500000000000000" pitchFamily="2" charset="0"/>
+                <a:cs typeface="Sabon Next LT" panose="02000500000000000000" pitchFamily="2" charset="0"/>
+              </a:rPr>
+              <a:t>דבר זה משתלב טוב עם מטרות הארגון שמלבד הליכתיות רוצות לקיים גם שמירה על איכות הסביבה.</a:t>
+            </a:r>
+          </a:p>
+          <a:p>
+            <a:pPr marL="0" indent="0" algn="r" rtl="1">
+              <a:buNone/>
+            </a:pPr>
+            <a:endParaRPr lang="he-IL" sz="2400" dirty="0">
+              <a:latin typeface="Sabon Next LT" panose="02000500000000000000" pitchFamily="2" charset="0"/>
+              <a:cs typeface="Sabon Next LT" panose="02000500000000000000" pitchFamily="2" charset="0"/>
+            </a:endParaRPr>
+          </a:p>
+          <a:p>
+            <a:pPr marL="0" indent="0" algn="r" rtl="1">
+              <a:buNone/>
+            </a:pPr>
+            <a:endParaRPr lang="he-IL" sz="2400" dirty="0">
+              <a:latin typeface="Sabon Next LT" panose="02000500000000000000" pitchFamily="2" charset="0"/>
+              <a:cs typeface="Sabon Next LT" panose="02000500000000000000" pitchFamily="2" charset="0"/>
+            </a:endParaRPr>
+          </a:p>
+          <a:p>
+            <a:pPr marL="0" indent="0" algn="r" rtl="1">
+              <a:buNone/>
+            </a:pPr>
+            <a:endParaRPr lang="he-IL" sz="2400" dirty="0">
+              <a:latin typeface="Sabon Next LT" panose="02000500000000000000" pitchFamily="2" charset="0"/>
+              <a:cs typeface="Sabon Next LT" panose="02000500000000000000" pitchFamily="2" charset="0"/>
+            </a:endParaRPr>
+          </a:p>
+          <a:p>
+            <a:pPr marL="0" indent="0" algn="r" rtl="1">
+              <a:buNone/>
+            </a:pPr>
+            <a:endParaRPr lang="he-IL" sz="2400" dirty="0">
+              <a:latin typeface="Sabon Next LT" panose="02000500000000000000" pitchFamily="2" charset="0"/>
+              <a:cs typeface="Sabon Next LT" panose="02000500000000000000" pitchFamily="2" charset="0"/>
+            </a:endParaRPr>
+          </a:p>
+        </p:txBody>
+      </p:sp>
+      <p:sp>
+        <p:nvSpPr>
+          <p:cNvPr id="4" name="TextBox 3">
+            <a:extLst>
+              <a:ext uri="{FF2B5EF4-FFF2-40B4-BE49-F238E27FC236}">
+                <a16:creationId xmlns:a16="http://schemas.microsoft.com/office/drawing/2014/main" id="{AEB6937C-FCF7-EC5D-F2EF-B0F23A28F5DF}"/>
+              </a:ext>
+            </a:extLst>
+          </p:cNvPr>
+          <p:cNvSpPr txBox="1"/>
+          <p:nvPr/>
+        </p:nvSpPr>
+        <p:spPr>
+          <a:xfrm>
+            <a:off x="655320" y="5254687"/>
+            <a:ext cx="1371600" cy="369332"/>
+          </a:xfrm>
+          <a:prstGeom prst="rect">
+            <a:avLst/>
+          </a:prstGeom>
+          <a:noFill/>
+        </p:spPr>
+        <p:txBody>
+          <a:bodyPr wrap="square" rtlCol="0">
+            <a:spAutoFit/>
+          </a:bodyPr>
+          <a:lstStyle/>
+          <a:p>
+            <a:pPr algn="r"/>
+            <a:r>
+              <a:rPr lang="he-IL" dirty="0">
+                <a:solidFill>
+                  <a:srgbClr val="FF0000"/>
+                </a:solidFill>
+                <a:hlinkClick r:id="rId2" action="ppaction://hlinksldjump"/>
+              </a:rPr>
+              <a:t>חזור לנושא 5</a:t>
+            </a:r>
+            <a:endParaRPr lang="en-IL" dirty="0">
+              <a:solidFill>
+                <a:srgbClr val="FF0000"/>
+              </a:solidFill>
+            </a:endParaRPr>
+          </a:p>
+        </p:txBody>
+      </p:sp>
+      <p:sp>
+        <p:nvSpPr>
+          <p:cNvPr id="5" name="TextBox 4">
+            <a:extLst>
+              <a:ext uri="{FF2B5EF4-FFF2-40B4-BE49-F238E27FC236}">
+                <a16:creationId xmlns:a16="http://schemas.microsoft.com/office/drawing/2014/main" id="{06D4E037-6AD0-B1E0-8F52-7CA04149C04D}"/>
+              </a:ext>
+            </a:extLst>
+          </p:cNvPr>
+          <p:cNvSpPr txBox="1"/>
+          <p:nvPr/>
+        </p:nvSpPr>
+        <p:spPr>
+          <a:xfrm>
+            <a:off x="716280" y="5592667"/>
+            <a:ext cx="1249680" cy="646331"/>
+          </a:xfrm>
+          <a:prstGeom prst="rect">
+            <a:avLst/>
+          </a:prstGeom>
+          <a:noFill/>
+        </p:spPr>
+        <p:txBody>
+          <a:bodyPr wrap="square" rtlCol="0">
+            <a:spAutoFit/>
+          </a:bodyPr>
+          <a:lstStyle/>
+          <a:p>
+            <a:pPr algn="r"/>
+            <a:r>
+              <a:rPr lang="he-IL" dirty="0">
+                <a:solidFill>
+                  <a:srgbClr val="FF0000"/>
+                </a:solidFill>
+                <a:hlinkClick r:id="rId3" action="ppaction://hlinksldjump"/>
+              </a:rPr>
+              <a:t>חזור לתוכן עניינים</a:t>
+            </a:r>
+            <a:endParaRPr lang="en-IL" dirty="0">
+              <a:solidFill>
+                <a:srgbClr val="FF0000"/>
+              </a:solidFill>
+            </a:endParaRPr>
+          </a:p>
+        </p:txBody>
+      </p:sp>
+    </p:spTree>
+    <p:extLst>
+      <p:ext uri="{BB962C8B-B14F-4D97-AF65-F5344CB8AC3E}">
+        <p14:creationId xmlns:p14="http://schemas.microsoft.com/office/powerpoint/2010/main" val="4124249273"/>
+      </p:ext>
+    </p:extLst>
+  </p:cSld>
+  <p:clrMapOvr>
+    <a:masterClrMapping/>
+  </p:clrMapOvr>
+</p:sld>
+</file>
+
+<file path=ppt/slides/slide22.xml><?xml version="1.0" encoding="utf-8"?>
+<p:sld xmlns:a="http://schemas.openxmlformats.org/drawingml/2006/main" xmlns:r="http://schemas.openxmlformats.org/officeDocument/2006/relationships" xmlns:p="http://schemas.openxmlformats.org/presentationml/2006/main">
+  <p:cSld>
+    <p:spTree>
+      <p:nvGrpSpPr>
+        <p:cNvPr id="1" name=""/>
+        <p:cNvGrpSpPr/>
+        <p:nvPr/>
+      </p:nvGrpSpPr>
+      <p:grpSpPr>
+        <a:xfrm>
+          <a:off x="0" y="0"/>
+          <a:ext cx="0" cy="0"/>
+          <a:chOff x="0" y="0"/>
+          <a:chExt cx="0" cy="0"/>
+        </a:xfrm>
+      </p:grpSpPr>
+      <p:sp>
+        <p:nvSpPr>
+          <p:cNvPr id="3" name="Text Placeholder 2">
+            <a:extLst>
+              <a:ext uri="{FF2B5EF4-FFF2-40B4-BE49-F238E27FC236}">
+                <a16:creationId xmlns:a16="http://schemas.microsoft.com/office/drawing/2014/main" id="{A2E339BF-E6D7-DD0E-AF02-6813852EE723}"/>
+              </a:ext>
+            </a:extLst>
+          </p:cNvPr>
+          <p:cNvSpPr>
+            <a:spLocks noGrp="1"/>
+          </p:cNvSpPr>
+          <p:nvPr>
+            <p:ph idx="4294967295"/>
+          </p:nvPr>
+        </p:nvSpPr>
+        <p:spPr>
+          <a:xfrm>
+            <a:off x="1287780" y="556260"/>
+            <a:ext cx="10050780" cy="5982018"/>
+          </a:xfrm>
+        </p:spPr>
+        <p:txBody>
+          <a:bodyPr/>
+          <a:lstStyle/>
+          <a:p>
+            <a:pPr marL="0" indent="0" algn="r" rtl="1">
+              <a:buNone/>
+            </a:pPr>
+            <a:r>
+              <a:rPr lang="he-IL" b="1" u="sng" dirty="0">
+                <a:latin typeface="Sabon Next LT" panose="02000500000000000000" pitchFamily="2" charset="0"/>
+                <a:cs typeface="Sabon Next LT" panose="02000500000000000000" pitchFamily="2" charset="0"/>
+              </a:rPr>
+              <a:t>5.4 – ניהול צ'אט וארגון לו"ז</a:t>
+            </a:r>
+          </a:p>
+          <a:p>
+            <a:pPr marL="0" indent="0" algn="r" rtl="1">
+              <a:buNone/>
+            </a:pPr>
+            <a:r>
+              <a:rPr lang="he-IL" sz="2400" dirty="0">
+                <a:latin typeface="Sabon Next LT" panose="02000500000000000000" pitchFamily="2" charset="0"/>
+                <a:cs typeface="Sabon Next LT" panose="02000500000000000000" pitchFamily="2" charset="0"/>
+              </a:rPr>
+              <a:t>התוסף הזה נועד ע"מ ליצור קשר בנוחות בין חברים באותה קבוצה.</a:t>
+            </a:r>
+          </a:p>
+          <a:p>
+            <a:pPr marL="0" indent="0" algn="r" rtl="1">
+              <a:buNone/>
+            </a:pPr>
+            <a:endParaRPr lang="he-IL" sz="2400" dirty="0">
+              <a:latin typeface="Sabon Next LT" panose="02000500000000000000" pitchFamily="2" charset="0"/>
+              <a:cs typeface="Sabon Next LT" panose="02000500000000000000" pitchFamily="2" charset="0"/>
+            </a:endParaRPr>
+          </a:p>
+          <a:p>
+            <a:pPr marL="0" indent="0" algn="r" rtl="1">
+              <a:buNone/>
+            </a:pPr>
+            <a:r>
+              <a:rPr lang="he-IL" sz="2400" dirty="0">
+                <a:latin typeface="Sabon Next LT" panose="02000500000000000000" pitchFamily="2" charset="0"/>
+                <a:cs typeface="Sabon Next LT" panose="02000500000000000000" pitchFamily="2" charset="0"/>
+              </a:rPr>
+              <a:t>ברמה המנוונת אפשר להוסיף מספר פלאפון בפרטי התלמיד (במידה ונוכל לעמוד באבטחת המידע הנדרשת) אך תוסף זה בא להקל על רעיון זה.</a:t>
+            </a:r>
+          </a:p>
+          <a:p>
+            <a:pPr marL="0" indent="0" algn="r" rtl="1">
+              <a:buNone/>
+            </a:pPr>
+            <a:endParaRPr lang="he-IL" sz="2400" dirty="0">
+              <a:latin typeface="Sabon Next LT" panose="02000500000000000000" pitchFamily="2" charset="0"/>
+              <a:cs typeface="Sabon Next LT" panose="02000500000000000000" pitchFamily="2" charset="0"/>
+            </a:endParaRPr>
+          </a:p>
+          <a:p>
+            <a:pPr marL="0" indent="0" algn="r" rtl="1">
+              <a:buNone/>
+            </a:pPr>
+            <a:r>
+              <a:rPr lang="he-IL" sz="2400" dirty="0">
+                <a:latin typeface="Sabon Next LT" panose="02000500000000000000" pitchFamily="2" charset="0"/>
+                <a:cs typeface="Sabon Next LT" panose="02000500000000000000" pitchFamily="2" charset="0"/>
+              </a:rPr>
+              <a:t>נרצה שהתלמידים הנמצאים באותה קבוצה יוכלו לנהל דו-שיח על מנת לקבוע שעת יציאה של הקבוצה להליכה.</a:t>
+            </a:r>
+          </a:p>
+          <a:p>
+            <a:pPr marL="0" indent="0" algn="r" rtl="1">
+              <a:buNone/>
+            </a:pPr>
+            <a:endParaRPr lang="he-IL" sz="2400" dirty="0">
+              <a:latin typeface="Sabon Next LT" panose="02000500000000000000" pitchFamily="2" charset="0"/>
+              <a:cs typeface="Sabon Next LT" panose="02000500000000000000" pitchFamily="2" charset="0"/>
+            </a:endParaRPr>
+          </a:p>
+          <a:p>
+            <a:pPr marL="0" indent="0" algn="r" rtl="1">
+              <a:buNone/>
+            </a:pPr>
+            <a:r>
+              <a:rPr lang="he-IL" sz="2400" dirty="0">
+                <a:latin typeface="Sabon Next LT" panose="02000500000000000000" pitchFamily="2" charset="0"/>
+                <a:cs typeface="Sabon Next LT" panose="02000500000000000000" pitchFamily="2" charset="0"/>
+              </a:rPr>
+              <a:t>הועלתה גם ההצעה להשתמש בקישור לקבוצת </a:t>
+            </a:r>
+            <a:r>
+              <a:rPr lang="en-US" sz="2400" dirty="0" err="1">
+                <a:latin typeface="Sabon Next LT" panose="02000500000000000000" pitchFamily="2" charset="0"/>
+                <a:cs typeface="Sabon Next LT" panose="02000500000000000000" pitchFamily="2" charset="0"/>
+              </a:rPr>
+              <a:t>whatsapp</a:t>
+            </a:r>
+            <a:r>
+              <a:rPr lang="he-IL" sz="2400" dirty="0">
+                <a:latin typeface="Sabon Next LT" panose="02000500000000000000" pitchFamily="2" charset="0"/>
+                <a:cs typeface="Sabon Next LT" panose="02000500000000000000" pitchFamily="2" charset="0"/>
+              </a:rPr>
+              <a:t> שבה הם יוכלו להשתמש במקום ניהול צ'אט באפליקציה עצמה.</a:t>
+            </a:r>
+          </a:p>
+          <a:p>
+            <a:pPr marL="0" indent="0" algn="r" rtl="1">
+              <a:buNone/>
+            </a:pPr>
+            <a:endParaRPr lang="he-IL" sz="2400" dirty="0">
+              <a:latin typeface="Sabon Next LT" panose="02000500000000000000" pitchFamily="2" charset="0"/>
+              <a:cs typeface="Sabon Next LT" panose="02000500000000000000" pitchFamily="2" charset="0"/>
+            </a:endParaRPr>
+          </a:p>
+          <a:p>
+            <a:pPr marL="0" indent="0" algn="r" rtl="1">
+              <a:buNone/>
+            </a:pPr>
+            <a:endParaRPr lang="he-IL" sz="2400" dirty="0">
+              <a:latin typeface="Sabon Next LT" panose="02000500000000000000" pitchFamily="2" charset="0"/>
+              <a:cs typeface="Sabon Next LT" panose="02000500000000000000" pitchFamily="2" charset="0"/>
+            </a:endParaRPr>
+          </a:p>
+          <a:p>
+            <a:pPr marL="0" indent="0" algn="r" rtl="1">
+              <a:buNone/>
+            </a:pPr>
+            <a:endParaRPr lang="he-IL" sz="2400" dirty="0">
+              <a:latin typeface="Sabon Next LT" panose="02000500000000000000" pitchFamily="2" charset="0"/>
+              <a:cs typeface="Sabon Next LT" panose="02000500000000000000" pitchFamily="2" charset="0"/>
+            </a:endParaRPr>
+          </a:p>
+          <a:p>
+            <a:pPr marL="0" indent="0" algn="r" rtl="1">
+              <a:buNone/>
+            </a:pPr>
+            <a:endParaRPr lang="he-IL" sz="2400" dirty="0">
+              <a:latin typeface="Sabon Next LT" panose="02000500000000000000" pitchFamily="2" charset="0"/>
+              <a:cs typeface="Sabon Next LT" panose="02000500000000000000" pitchFamily="2" charset="0"/>
+            </a:endParaRPr>
+          </a:p>
+        </p:txBody>
+      </p:sp>
+      <p:sp>
+        <p:nvSpPr>
+          <p:cNvPr id="4" name="TextBox 3">
+            <a:extLst>
+              <a:ext uri="{FF2B5EF4-FFF2-40B4-BE49-F238E27FC236}">
+                <a16:creationId xmlns:a16="http://schemas.microsoft.com/office/drawing/2014/main" id="{AEB6937C-FCF7-EC5D-F2EF-B0F23A28F5DF}"/>
+              </a:ext>
+            </a:extLst>
+          </p:cNvPr>
+          <p:cNvSpPr txBox="1"/>
+          <p:nvPr/>
+        </p:nvSpPr>
+        <p:spPr>
+          <a:xfrm>
+            <a:off x="655320" y="5254687"/>
+            <a:ext cx="1371600" cy="369332"/>
+          </a:xfrm>
+          <a:prstGeom prst="rect">
+            <a:avLst/>
+          </a:prstGeom>
+          <a:noFill/>
+        </p:spPr>
+        <p:txBody>
+          <a:bodyPr wrap="square" rtlCol="0">
+            <a:spAutoFit/>
+          </a:bodyPr>
+          <a:lstStyle/>
+          <a:p>
+            <a:pPr algn="r"/>
+            <a:r>
+              <a:rPr lang="he-IL" dirty="0">
+                <a:solidFill>
+                  <a:srgbClr val="FF0000"/>
+                </a:solidFill>
+                <a:hlinkClick r:id="rId2" action="ppaction://hlinksldjump"/>
+              </a:rPr>
+              <a:t>חזור לנושא 5</a:t>
+            </a:r>
+            <a:endParaRPr lang="en-IL" dirty="0">
+              <a:solidFill>
+                <a:srgbClr val="FF0000"/>
+              </a:solidFill>
+            </a:endParaRPr>
+          </a:p>
+        </p:txBody>
+      </p:sp>
+      <p:sp>
+        <p:nvSpPr>
+          <p:cNvPr id="5" name="TextBox 4">
+            <a:extLst>
+              <a:ext uri="{FF2B5EF4-FFF2-40B4-BE49-F238E27FC236}">
+                <a16:creationId xmlns:a16="http://schemas.microsoft.com/office/drawing/2014/main" id="{06D4E037-6AD0-B1E0-8F52-7CA04149C04D}"/>
+              </a:ext>
+            </a:extLst>
+          </p:cNvPr>
+          <p:cNvSpPr txBox="1"/>
+          <p:nvPr/>
+        </p:nvSpPr>
+        <p:spPr>
+          <a:xfrm>
+            <a:off x="716280" y="5592667"/>
+            <a:ext cx="1249680" cy="646331"/>
+          </a:xfrm>
+          <a:prstGeom prst="rect">
+            <a:avLst/>
+          </a:prstGeom>
+          <a:noFill/>
+        </p:spPr>
+        <p:txBody>
+          <a:bodyPr wrap="square" rtlCol="0">
+            <a:spAutoFit/>
+          </a:bodyPr>
+          <a:lstStyle/>
+          <a:p>
+            <a:pPr algn="r"/>
+            <a:r>
+              <a:rPr lang="he-IL" dirty="0">
+                <a:solidFill>
+                  <a:srgbClr val="FF0000"/>
+                </a:solidFill>
+                <a:hlinkClick r:id="rId3" action="ppaction://hlinksldjump"/>
+              </a:rPr>
+              <a:t>חזור לתוכן עניינים</a:t>
+            </a:r>
+            <a:endParaRPr lang="en-IL" dirty="0">
+              <a:solidFill>
+                <a:srgbClr val="FF0000"/>
+              </a:solidFill>
+            </a:endParaRPr>
+          </a:p>
+        </p:txBody>
+      </p:sp>
+    </p:spTree>
+    <p:extLst>
+      <p:ext uri="{BB962C8B-B14F-4D97-AF65-F5344CB8AC3E}">
+        <p14:creationId xmlns:p14="http://schemas.microsoft.com/office/powerpoint/2010/main" val="2181116205"/>
+      </p:ext>
+    </p:extLst>
+  </p:cSld>
+  <p:clrMapOvr>
+    <a:masterClrMapping/>
+  </p:clrMapOvr>
+</p:sld>
+</file>
+
+<file path=ppt/slides/slide23.xml><?xml version="1.0" encoding="utf-8"?>
+<p:sld xmlns:a="http://schemas.openxmlformats.org/drawingml/2006/main" xmlns:r="http://schemas.openxmlformats.org/officeDocument/2006/relationships" xmlns:p="http://schemas.openxmlformats.org/presentationml/2006/main">
+  <p:cSld>
+    <p:spTree>
+      <p:nvGrpSpPr>
+        <p:cNvPr id="1" name=""/>
+        <p:cNvGrpSpPr/>
+        <p:nvPr/>
+      </p:nvGrpSpPr>
+      <p:grpSpPr>
+        <a:xfrm>
+          <a:off x="0" y="0"/>
+          <a:ext cx="0" cy="0"/>
+          <a:chOff x="0" y="0"/>
+          <a:chExt cx="0" cy="0"/>
+        </a:xfrm>
+      </p:grpSpPr>
+      <p:sp>
+        <p:nvSpPr>
+          <p:cNvPr id="2" name="Title 1">
+            <a:extLst>
+              <a:ext uri="{FF2B5EF4-FFF2-40B4-BE49-F238E27FC236}">
+                <a16:creationId xmlns:a16="http://schemas.microsoft.com/office/drawing/2014/main" id="{B83F7D2E-080D-DBDD-73C4-3C38A2B77908}"/>
+              </a:ext>
+            </a:extLst>
+          </p:cNvPr>
+          <p:cNvSpPr>
+            <a:spLocks noGrp="1"/>
+          </p:cNvSpPr>
+          <p:nvPr>
+            <p:ph type="title"/>
+          </p:nvPr>
+        </p:nvSpPr>
+        <p:spPr/>
+        <p:txBody>
+          <a:bodyPr/>
+          <a:lstStyle/>
+          <a:p>
+            <a:pPr algn="r"/>
+            <a:r>
+              <a:rPr lang="he-IL" dirty="0"/>
+              <a:t>סיכום</a:t>
+            </a:r>
+            <a:r>
+              <a:rPr lang="en-US" dirty="0"/>
+              <a:t> </a:t>
+            </a:r>
+          </a:p>
+        </p:txBody>
+      </p:sp>
+      <p:sp>
+        <p:nvSpPr>
+          <p:cNvPr id="3" name="Content Placeholder 2">
+            <a:extLst>
+              <a:ext uri="{FF2B5EF4-FFF2-40B4-BE49-F238E27FC236}">
+                <a16:creationId xmlns:a16="http://schemas.microsoft.com/office/drawing/2014/main" id="{2BE8FDE3-DBA4-6A04-C75D-E56FE92EF368}"/>
+              </a:ext>
+            </a:extLst>
+          </p:cNvPr>
+          <p:cNvSpPr>
+            <a:spLocks noGrp="1"/>
+          </p:cNvSpPr>
+          <p:nvPr>
+            <p:ph idx="1"/>
+          </p:nvPr>
+        </p:nvSpPr>
+        <p:spPr>
+          <a:xfrm>
+            <a:off x="1508760" y="2837688"/>
+            <a:ext cx="6880860" cy="2700528"/>
+          </a:xfrm>
+        </p:spPr>
+        <p:txBody>
+          <a:bodyPr/>
+          <a:lstStyle/>
+          <a:p>
+            <a:pPr algn="r"/>
+            <a:r>
+              <a:rPr lang="he-IL" sz="2400" dirty="0"/>
+              <a:t>נשמח לכל הערות טענות ומענות בנושא.</a:t>
+            </a:r>
+          </a:p>
+        </p:txBody>
+      </p:sp>
+      <p:sp>
+        <p:nvSpPr>
+          <p:cNvPr id="4" name="TextBox 3">
+            <a:extLst>
+              <a:ext uri="{FF2B5EF4-FFF2-40B4-BE49-F238E27FC236}">
+                <a16:creationId xmlns:a16="http://schemas.microsoft.com/office/drawing/2014/main" id="{547140F8-272C-1106-0F88-9C8C3F4D7705}"/>
+              </a:ext>
+            </a:extLst>
+          </p:cNvPr>
+          <p:cNvSpPr txBox="1"/>
+          <p:nvPr/>
+        </p:nvSpPr>
+        <p:spPr>
+          <a:xfrm>
+            <a:off x="1143000" y="4487767"/>
+            <a:ext cx="1249680" cy="646331"/>
+          </a:xfrm>
+          <a:prstGeom prst="rect">
+            <a:avLst/>
+          </a:prstGeom>
+          <a:noFill/>
+        </p:spPr>
+        <p:txBody>
+          <a:bodyPr wrap="square" rtlCol="0">
+            <a:spAutoFit/>
+          </a:bodyPr>
+          <a:lstStyle/>
+          <a:p>
+            <a:pPr algn="r"/>
+            <a:r>
+              <a:rPr lang="he-IL" dirty="0">
+                <a:solidFill>
+                  <a:srgbClr val="FF0000"/>
+                </a:solidFill>
+                <a:hlinkClick r:id="rId2" action="ppaction://hlinksldjump"/>
+              </a:rPr>
+              <a:t>חזור לתוכן עניינים</a:t>
+            </a:r>
+            <a:endParaRPr lang="en-IL" dirty="0">
+              <a:solidFill>
+                <a:srgbClr val="FF0000"/>
+              </a:solidFill>
+            </a:endParaRPr>
+          </a:p>
+        </p:txBody>
+      </p:sp>
+    </p:spTree>
+    <p:extLst>
+      <p:ext uri="{BB962C8B-B14F-4D97-AF65-F5344CB8AC3E}">
+        <p14:creationId xmlns:p14="http://schemas.microsoft.com/office/powerpoint/2010/main" val="94818171"/>
       </p:ext>
     </p:extLst>
   </p:cSld>
@@ -24185,7 +27395,7 @@
                 <a:ea typeface="Arial Regular" pitchFamily="34" charset="-122"/>
                 <a:cs typeface="Arial Black" panose="020B0604020202020204" pitchFamily="34" charset="0"/>
               </a:rPr>
-              <a:t>נושא 1 - משתתפים בפרוייקט</a:t>
+              <a:t>משתתפים בפרוייקט</a:t>
             </a:r>
             <a:endParaRPr lang="en-US" sz="4400" b="1" dirty="0">
               <a:solidFill>
@@ -24368,7 +27578,7 @@
                 <a:latin typeface="Arial Black" panose="020B0604020202020204" pitchFamily="34" charset="0"/>
                 <a:cs typeface="Arial Black" panose="020B0604020202020204" pitchFamily="34" charset="0"/>
               </a:rPr>
-              <a:t>נושא 2 - מטרות עיקריות בפרוייקט</a:t>
+              <a:t>נושא 1 - מטרות עיקריות בפרוייקט</a:t>
             </a:r>
             <a:endParaRPr lang="en-US" dirty="0"/>
           </a:p>
@@ -24403,7 +27613,7 @@
             <a:pPr algn="r"/>
             <a:r>
               <a:rPr lang="he-IL" dirty="0"/>
-              <a:t>יצירת אפליקציה המעודדת תלמידי בית ספר יסודי ותיכון (כרגע מיועד ליסודי אבל צריך לתמוך בתיכון) ללכת בצורה רגלית לבית ספר ובחזרה, ובכך לשמור על כושר, בריאות וכן על הסביבה משחרור של פד"ח לאוויר. </a:t>
+              <a:t>יצירת אפליקציה המעודדת תלמידי בית ספר יסודי ותיכון (כרגע מיועד ליסודי) ללכת בצורה רגלית לבית ספר ובחזרה, ובכך לשמור על כושר, בריאות וכן על הסביבה משחרור של פד"ח לאוויר. </a:t>
             </a:r>
           </a:p>
         </p:txBody>
@@ -24468,6 +27678,179 @@
 </file>
 
 <file path=ppt/slides/slide5.xml><?xml version="1.0" encoding="utf-8"?>
+<p:sld xmlns:a="http://schemas.openxmlformats.org/drawingml/2006/main" xmlns:r="http://schemas.openxmlformats.org/officeDocument/2006/relationships" xmlns:p="http://schemas.openxmlformats.org/presentationml/2006/main">
+  <p:cSld>
+    <p:spTree>
+      <p:nvGrpSpPr>
+        <p:cNvPr id="1" name=""/>
+        <p:cNvGrpSpPr/>
+        <p:nvPr/>
+      </p:nvGrpSpPr>
+      <p:grpSpPr>
+        <a:xfrm>
+          <a:off x="0" y="0"/>
+          <a:ext cx="0" cy="0"/>
+          <a:chOff x="0" y="0"/>
+          <a:chExt cx="0" cy="0"/>
+        </a:xfrm>
+      </p:grpSpPr>
+      <p:sp>
+        <p:nvSpPr>
+          <p:cNvPr id="2" name="Title 1">
+            <a:extLst>
+              <a:ext uri="{FF2B5EF4-FFF2-40B4-BE49-F238E27FC236}">
+                <a16:creationId xmlns:a16="http://schemas.microsoft.com/office/drawing/2014/main" id="{4A940BC6-9DA0-FB4D-8879-DC8B3958C07C}"/>
+              </a:ext>
+            </a:extLst>
+          </p:cNvPr>
+          <p:cNvSpPr>
+            <a:spLocks noGrp="1"/>
+          </p:cNvSpPr>
+          <p:nvPr>
+            <p:ph type="title"/>
+          </p:nvPr>
+        </p:nvSpPr>
+        <p:spPr>
+          <a:xfrm>
+            <a:off x="493776" y="965200"/>
+            <a:ext cx="6996684" cy="1415288"/>
+          </a:xfrm>
+        </p:spPr>
+        <p:txBody>
+          <a:bodyPr/>
+          <a:lstStyle/>
+          <a:p>
+            <a:pPr algn="r"/>
+            <a:r>
+              <a:rPr lang="he-IL" dirty="0">
+                <a:latin typeface="Arial Black" panose="020B0604020202020204" pitchFamily="34" charset="0"/>
+                <a:cs typeface="Arial Black" panose="020B0604020202020204" pitchFamily="34" charset="0"/>
+              </a:rPr>
+              <a:t>נושא 2 – דרישות נוכחיות</a:t>
+            </a:r>
+            <a:endParaRPr lang="en-US" dirty="0"/>
+          </a:p>
+        </p:txBody>
+      </p:sp>
+      <p:sp>
+        <p:nvSpPr>
+          <p:cNvPr id="3" name="Content Placeholder 2">
+            <a:extLst>
+              <a:ext uri="{FF2B5EF4-FFF2-40B4-BE49-F238E27FC236}">
+                <a16:creationId xmlns:a16="http://schemas.microsoft.com/office/drawing/2014/main" id="{1E0B8C4B-3A3C-9FD1-59FB-1666C1F09376}"/>
+              </a:ext>
+            </a:extLst>
+          </p:cNvPr>
+          <p:cNvSpPr>
+            <a:spLocks noGrp="1"/>
+          </p:cNvSpPr>
+          <p:nvPr>
+            <p:ph idx="1"/>
+          </p:nvPr>
+        </p:nvSpPr>
+        <p:spPr>
+          <a:xfrm>
+            <a:off x="585216" y="1867916"/>
+            <a:ext cx="6996684" cy="3122168"/>
+          </a:xfrm>
+        </p:spPr>
+        <p:txBody>
+          <a:bodyPr/>
+          <a:lstStyle/>
+          <a:p>
+            <a:pPr marL="342900" indent="-342900" algn="r" rtl="1">
+              <a:buFont typeface="Arial" panose="020B0604020202020204" pitchFamily="34" charset="0"/>
+              <a:buChar char="•"/>
+            </a:pPr>
+            <a:r>
+              <a:rPr lang="he-IL" sz="2000" dirty="0"/>
+              <a:t>האפליקציה המיועדת אמורה להיות מסויימת על גבי הסמארטפונים ולכן מיועדת לתמוך במערכות הפעלה </a:t>
+            </a:r>
+            <a:r>
+              <a:rPr lang="en-US" sz="2000" dirty="0"/>
+              <a:t>ANDROID</a:t>
+            </a:r>
+            <a:r>
+              <a:rPr lang="he-IL" sz="2000" dirty="0"/>
+              <a:t> ו </a:t>
+            </a:r>
+            <a:r>
+              <a:rPr lang="en-US" sz="2000" dirty="0"/>
+              <a:t>IOS</a:t>
+            </a:r>
+          </a:p>
+          <a:p>
+            <a:pPr marL="342900" indent="-342900" algn="r" rtl="1">
+              <a:buFont typeface="Arial" panose="020B0604020202020204" pitchFamily="34" charset="0"/>
+              <a:buChar char="•"/>
+            </a:pPr>
+            <a:r>
+              <a:rPr lang="he-IL" sz="2000" dirty="0"/>
+              <a:t>על האפליקציה להיות בנויה בצורה שתהיה מובנת לשימוש עבור ילדים בגילאים 6-7</a:t>
+            </a:r>
+          </a:p>
+        </p:txBody>
+      </p:sp>
+      <p:sp>
+        <p:nvSpPr>
+          <p:cNvPr id="8" name="TextBox 7">
+            <a:extLst>
+              <a:ext uri="{FF2B5EF4-FFF2-40B4-BE49-F238E27FC236}">
+                <a16:creationId xmlns:a16="http://schemas.microsoft.com/office/drawing/2014/main" id="{35D236B5-7266-A407-F639-20F0B53BF944}"/>
+              </a:ext>
+            </a:extLst>
+          </p:cNvPr>
+          <p:cNvSpPr txBox="1"/>
+          <p:nvPr/>
+        </p:nvSpPr>
+        <p:spPr>
+          <a:xfrm>
+            <a:off x="891540" y="5269043"/>
+            <a:ext cx="1249680" cy="646331"/>
+          </a:xfrm>
+          <a:prstGeom prst="rect">
+            <a:avLst/>
+          </a:prstGeom>
+          <a:noFill/>
+        </p:spPr>
+        <p:txBody>
+          <a:bodyPr wrap="square" rtlCol="0">
+            <a:spAutoFit/>
+          </a:bodyPr>
+          <a:lstStyle/>
+          <a:p>
+            <a:pPr algn="r"/>
+            <a:r>
+              <a:rPr lang="he-IL" dirty="0">
+                <a:solidFill>
+                  <a:srgbClr val="FF0000"/>
+                </a:solidFill>
+                <a:hlinkClick r:id="rId2" action="ppaction://hlinksldjump"/>
+              </a:rPr>
+              <a:t>חזור לתוכן עניינים</a:t>
+            </a:r>
+            <a:endParaRPr lang="en-IL" dirty="0">
+              <a:solidFill>
+                <a:srgbClr val="FF0000"/>
+              </a:solidFill>
+            </a:endParaRPr>
+          </a:p>
+        </p:txBody>
+      </p:sp>
+    </p:spTree>
+    <p:extLst>
+      <p:ext uri="{BB962C8B-B14F-4D97-AF65-F5344CB8AC3E}">
+        <p14:creationId xmlns:p14="http://schemas.microsoft.com/office/powerpoint/2010/main" val="266929864"/>
+      </p:ext>
+    </p:extLst>
+  </p:cSld>
+  <p:clrMapOvr>
+    <a:masterClrMapping/>
+  </p:clrMapOvr>
+</p:sld>
+</file>
+
+<file path=ppt/slides/slide6.xml><?xml version="1.0" encoding="utf-8"?>
 <p:sld xmlns:a="http://schemas.openxmlformats.org/drawingml/2006/main" xmlns:r="http://schemas.openxmlformats.org/officeDocument/2006/relationships" xmlns:p="http://schemas.openxmlformats.org/presentationml/2006/main">
   <p:cSld>
     <p:spTree>
@@ -24546,7 +27929,7 @@
         </p:nvSpPr>
         <p:spPr>
           <a:xfrm>
-            <a:off x="1499616" y="2122932"/>
+            <a:off x="1499616" y="2386584"/>
             <a:ext cx="5693664" cy="4453128"/>
           </a:xfrm>
         </p:spPr>
@@ -24719,216 +28102,6 @@
     <p:extLst>
       <p:ext uri="{BB962C8B-B14F-4D97-AF65-F5344CB8AC3E}">
         <p14:creationId xmlns:p14="http://schemas.microsoft.com/office/powerpoint/2010/main" val="641375081"/>
-      </p:ext>
-    </p:extLst>
-  </p:cSld>
-  <p:clrMapOvr>
-    <a:masterClrMapping/>
-  </p:clrMapOvr>
-</p:sld>
-</file>
-
-<file path=ppt/slides/slide6.xml><?xml version="1.0" encoding="utf-8"?>
-<p:sld xmlns:a="http://schemas.openxmlformats.org/drawingml/2006/main" xmlns:r="http://schemas.openxmlformats.org/officeDocument/2006/relationships" xmlns:p="http://schemas.openxmlformats.org/presentationml/2006/main">
-  <p:cSld>
-    <p:spTree>
-      <p:nvGrpSpPr>
-        <p:cNvPr id="1" name=""/>
-        <p:cNvGrpSpPr/>
-        <p:nvPr/>
-      </p:nvGrpSpPr>
-      <p:grpSpPr>
-        <a:xfrm>
-          <a:off x="0" y="0"/>
-          <a:ext cx="0" cy="0"/>
-          <a:chOff x="0" y="0"/>
-          <a:chExt cx="0" cy="0"/>
-        </a:xfrm>
-      </p:grpSpPr>
-      <p:sp>
-        <p:nvSpPr>
-          <p:cNvPr id="3" name="Text Placeholder 2">
-            <a:extLst>
-              <a:ext uri="{FF2B5EF4-FFF2-40B4-BE49-F238E27FC236}">
-                <a16:creationId xmlns:a16="http://schemas.microsoft.com/office/drawing/2014/main" id="{A2E339BF-E6D7-DD0E-AF02-6813852EE723}"/>
-              </a:ext>
-            </a:extLst>
-          </p:cNvPr>
-          <p:cNvSpPr>
-            <a:spLocks noGrp="1"/>
-          </p:cNvSpPr>
-          <p:nvPr>
-            <p:ph idx="1"/>
-          </p:nvPr>
-        </p:nvSpPr>
-        <p:spPr>
-          <a:xfrm>
-            <a:off x="1499616" y="777240"/>
-            <a:ext cx="6219444" cy="5798820"/>
-          </a:xfrm>
-        </p:spPr>
-        <p:txBody>
-          <a:bodyPr/>
-          <a:lstStyle/>
-          <a:p>
-            <a:pPr algn="r" rtl="1"/>
-            <a:r>
-              <a:rPr lang="he-IL" b="1" u="sng" dirty="0">
-                <a:latin typeface="Sabon Next LT" panose="02000500000000000000" pitchFamily="2" charset="0"/>
-                <a:cs typeface="Sabon Next LT" panose="02000500000000000000" pitchFamily="2" charset="0"/>
-              </a:rPr>
-              <a:t>3.1 – הצגת מפה</a:t>
-            </a:r>
-          </a:p>
-          <a:p>
-            <a:pPr algn="r" rtl="1"/>
-            <a:r>
-              <a:rPr lang="he-IL" dirty="0">
-                <a:latin typeface="Sabon Next LT" panose="02000500000000000000" pitchFamily="2" charset="0"/>
-                <a:cs typeface="Sabon Next LT" panose="02000500000000000000" pitchFamily="2" charset="0"/>
-              </a:rPr>
-              <a:t>על המפה להיות מותאמת לאזור הנוכחי בו נמצא הפלאפון, על המפה לכלול סימונים על מקום מגוריהם של תלמידים נוספים מבית הספר.</a:t>
-            </a:r>
-          </a:p>
-          <a:p>
-            <a:pPr algn="r" rtl="1"/>
-            <a:r>
-              <a:rPr lang="he-IL" dirty="0">
-                <a:latin typeface="Sabon Next LT" panose="02000500000000000000" pitchFamily="2" charset="0"/>
-                <a:cs typeface="Sabon Next LT" panose="02000500000000000000" pitchFamily="2" charset="0"/>
-              </a:rPr>
-              <a:t>נדרש שניתן יהיה לבנות מסלולים על המפה.</a:t>
-            </a:r>
-          </a:p>
-          <a:p>
-            <a:pPr algn="r" rtl="1"/>
-            <a:endParaRPr lang="he-IL" dirty="0">
-              <a:latin typeface="Sabon Next LT" panose="02000500000000000000" pitchFamily="2" charset="0"/>
-              <a:cs typeface="Sabon Next LT" panose="02000500000000000000" pitchFamily="2" charset="0"/>
-            </a:endParaRPr>
-          </a:p>
-          <a:p>
-            <a:pPr algn="r" rtl="1"/>
-            <a:r>
-              <a:rPr lang="he-IL" dirty="0">
-                <a:latin typeface="Sabon Next LT" panose="02000500000000000000" pitchFamily="2" charset="0"/>
-                <a:cs typeface="Sabon Next LT" panose="02000500000000000000" pitchFamily="2" charset="0"/>
-              </a:rPr>
-              <a:t>מבחינת פיתוח לא נדרש לייצר מפה אך נדרש למצוא דרך לעשות שימוש במפה קיימת (למשל </a:t>
-            </a:r>
-            <a:r>
-              <a:rPr lang="en-US" dirty="0">
-                <a:latin typeface="Sabon Next LT" panose="02000500000000000000" pitchFamily="2" charset="0"/>
-                <a:cs typeface="Sabon Next LT" panose="02000500000000000000" pitchFamily="2" charset="0"/>
-              </a:rPr>
-              <a:t>Google Maps</a:t>
-            </a:r>
-            <a:r>
-              <a:rPr lang="he-IL" dirty="0">
-                <a:latin typeface="Sabon Next LT" panose="02000500000000000000" pitchFamily="2" charset="0"/>
-                <a:cs typeface="Sabon Next LT" panose="02000500000000000000" pitchFamily="2" charset="0"/>
-              </a:rPr>
-              <a:t>)</a:t>
-            </a:r>
-          </a:p>
-        </p:txBody>
-      </p:sp>
-      <p:sp>
-        <p:nvSpPr>
-          <p:cNvPr id="4" name="TextBox 3">
-            <a:extLst>
-              <a:ext uri="{FF2B5EF4-FFF2-40B4-BE49-F238E27FC236}">
-                <a16:creationId xmlns:a16="http://schemas.microsoft.com/office/drawing/2014/main" id="{AEB6937C-FCF7-EC5D-F2EF-B0F23A28F5DF}"/>
-              </a:ext>
-            </a:extLst>
-          </p:cNvPr>
-          <p:cNvSpPr txBox="1"/>
-          <p:nvPr/>
-        </p:nvSpPr>
-        <p:spPr>
-          <a:xfrm>
-            <a:off x="891540" y="5242186"/>
-            <a:ext cx="1371600" cy="369332"/>
-          </a:xfrm>
-          <a:prstGeom prst="rect">
-            <a:avLst/>
-          </a:prstGeom>
-          <a:noFill/>
-        </p:spPr>
-        <p:txBody>
-          <a:bodyPr wrap="square" rtlCol="0">
-            <a:spAutoFit/>
-          </a:bodyPr>
-          <a:lstStyle/>
-          <a:p>
-            <a:pPr algn="r"/>
-            <a:r>
-              <a:rPr lang="he-IL" dirty="0">
-                <a:solidFill>
-                  <a:srgbClr val="FF0000"/>
-                </a:solidFill>
-                <a:hlinkClick r:id="rId2" action="ppaction://hlinksldjump"/>
-              </a:rPr>
-              <a:t>חזור לנושא 3</a:t>
-            </a:r>
-            <a:endParaRPr lang="en-IL" dirty="0">
-              <a:solidFill>
-                <a:srgbClr val="FF0000"/>
-              </a:solidFill>
-            </a:endParaRPr>
-          </a:p>
-        </p:txBody>
-      </p:sp>
-      <p:sp>
-        <p:nvSpPr>
-          <p:cNvPr id="5" name="TextBox 4">
-            <a:extLst>
-              <a:ext uri="{FF2B5EF4-FFF2-40B4-BE49-F238E27FC236}">
-                <a16:creationId xmlns:a16="http://schemas.microsoft.com/office/drawing/2014/main" id="{06D4E037-6AD0-B1E0-8F52-7CA04149C04D}"/>
-              </a:ext>
-            </a:extLst>
-          </p:cNvPr>
-          <p:cNvSpPr txBox="1"/>
-          <p:nvPr/>
-        </p:nvSpPr>
-        <p:spPr>
-          <a:xfrm>
-            <a:off x="874776" y="5592208"/>
-            <a:ext cx="1249680" cy="646331"/>
-          </a:xfrm>
-          <a:prstGeom prst="rect">
-            <a:avLst/>
-          </a:prstGeom>
-          <a:noFill/>
-        </p:spPr>
-        <p:txBody>
-          <a:bodyPr wrap="square" rtlCol="0">
-            <a:spAutoFit/>
-          </a:bodyPr>
-          <a:lstStyle/>
-          <a:p>
-            <a:pPr algn="r"/>
-            <a:r>
-              <a:rPr lang="he-IL" dirty="0">
-                <a:solidFill>
-                  <a:srgbClr val="FF0000"/>
-                </a:solidFill>
-                <a:hlinkClick r:id="rId3" action="ppaction://hlinksldjump"/>
-              </a:rPr>
-              <a:t>חזור לתוכן עניינים</a:t>
-            </a:r>
-            <a:endParaRPr lang="en-IL" dirty="0">
-              <a:solidFill>
-                <a:srgbClr val="FF0000"/>
-              </a:solidFill>
-            </a:endParaRPr>
-          </a:p>
-        </p:txBody>
-      </p:sp>
-    </p:spTree>
-    <p:extLst>
-      <p:ext uri="{BB962C8B-B14F-4D97-AF65-F5344CB8AC3E}">
-        <p14:creationId xmlns:p14="http://schemas.microsoft.com/office/powerpoint/2010/main" val="2952923800"/>
       </p:ext>
     </p:extLst>
   </p:cSld>
@@ -24968,26 +28141,28 @@
             <a:spLocks noGrp="1"/>
           </p:cNvSpPr>
           <p:nvPr>
-            <p:ph idx="1"/>
+            <p:ph idx="4294967295"/>
           </p:nvPr>
         </p:nvSpPr>
         <p:spPr>
           <a:xfrm>
-            <a:off x="1499616" y="777240"/>
-            <a:ext cx="6219444" cy="5798820"/>
+            <a:off x="1722120" y="716281"/>
+            <a:ext cx="10027920" cy="5859144"/>
           </a:xfrm>
         </p:spPr>
         <p:txBody>
           <a:bodyPr/>
           <a:lstStyle/>
           <a:p>
-            <a:pPr algn="r" rtl="1"/>
+            <a:pPr marL="0" indent="0" algn="r" rtl="1">
+              <a:buNone/>
+            </a:pPr>
             <a:r>
               <a:rPr lang="he-IL" b="1" u="sng" dirty="0">
                 <a:latin typeface="Sabon Next LT" panose="02000500000000000000" pitchFamily="2" charset="0"/>
                 <a:cs typeface="Sabon Next LT" panose="02000500000000000000" pitchFamily="2" charset="0"/>
               </a:rPr>
-              <a:t>3.2 – ספירת קילומטרים</a:t>
+              <a:t>3.1 – הצגת מפה</a:t>
             </a:r>
           </a:p>
           <a:p>
@@ -24997,7 +28172,7 @@
                 <a:latin typeface="Sabon Next LT" panose="02000500000000000000" pitchFamily="2" charset="0"/>
                 <a:cs typeface="Sabon Next LT" panose="02000500000000000000" pitchFamily="2" charset="0"/>
               </a:rPr>
-              <a:t>ספירת הקילומטרים היא דרך אחת לביצוע, המטרה האמיתית היא לזהות אם התלמיד אכן הולך בצורה מיטבית, וכן תיעוד המרחק שהוא הלך בקילומטרים.</a:t>
+              <a:t>על המפה להיות מותאמת לאזור הנוכחי בו נמצא הפלאפון, על המפה לכלול סימונים על מקום מגוריהם של תלמידים נוספים מבית הספר.</a:t>
             </a:r>
           </a:p>
           <a:p>
@@ -25007,8 +28182,15 @@
                 <a:latin typeface="Sabon Next LT" panose="02000500000000000000" pitchFamily="2" charset="0"/>
                 <a:cs typeface="Sabon Next LT" panose="02000500000000000000" pitchFamily="2" charset="0"/>
               </a:rPr>
-              <a:t>נדרש גם יכולת לוודא שהתלמיד לא נסע בזמן זה ע"י בדיקת המהירות שלו.</a:t>
-            </a:r>
+              <a:t>נדרש שניתן יהיה לבנות מסלולים על המפה.</a:t>
+            </a:r>
+          </a:p>
+          <a:p>
+            <a:pPr algn="r" rtl="1"/>
+            <a:endParaRPr lang="he-IL" dirty="0">
+              <a:latin typeface="Sabon Next LT" panose="02000500000000000000" pitchFamily="2" charset="0"/>
+              <a:cs typeface="Sabon Next LT" panose="02000500000000000000" pitchFamily="2" charset="0"/>
+            </a:endParaRPr>
           </a:p>
           <a:p>
             <a:pPr algn="r" rtl="1"/>
@@ -25017,7 +28199,21 @@
                 <a:latin typeface="Sabon Next LT" panose="02000500000000000000" pitchFamily="2" charset="0"/>
                 <a:cs typeface="Sabon Next LT" panose="02000500000000000000" pitchFamily="2" charset="0"/>
               </a:rPr>
-              <a:t>גם כאן נשאלת השאלה האם ניתן להשתמש במשהו קיים.</a:t>
+              <a:t>מבחינת פיתוח לא נדרש לייצר מפה אך נדרש למצוא דרך לעשות שימוש במפה קיימת (למשל </a:t>
+            </a:r>
+            <a:r>
+              <a:rPr lang="en-US" dirty="0">
+                <a:latin typeface="Sabon Next LT" panose="02000500000000000000" pitchFamily="2" charset="0"/>
+                <a:cs typeface="Sabon Next LT" panose="02000500000000000000" pitchFamily="2" charset="0"/>
+              </a:rPr>
+              <a:t>Google Maps</a:t>
+            </a:r>
+            <a:r>
+              <a:rPr lang="he-IL" dirty="0">
+                <a:latin typeface="Sabon Next LT" panose="02000500000000000000" pitchFamily="2" charset="0"/>
+                <a:cs typeface="Sabon Next LT" panose="02000500000000000000" pitchFamily="2" charset="0"/>
+              </a:rPr>
+              <a:t>)</a:t>
             </a:r>
           </a:p>
         </p:txBody>
@@ -25117,7 +28313,7 @@
     </p:spTree>
     <p:extLst>
       <p:ext uri="{BB962C8B-B14F-4D97-AF65-F5344CB8AC3E}">
-        <p14:creationId xmlns:p14="http://schemas.microsoft.com/office/powerpoint/2010/main" val="3407969357"/>
+        <p14:creationId xmlns:p14="http://schemas.microsoft.com/office/powerpoint/2010/main" val="2952923800"/>
       </p:ext>
     </p:extLst>
   </p:cSld>
@@ -25157,26 +28353,28 @@
             <a:spLocks noGrp="1"/>
           </p:cNvSpPr>
           <p:nvPr>
-            <p:ph idx="1"/>
+            <p:ph idx="4294967295"/>
           </p:nvPr>
         </p:nvSpPr>
         <p:spPr>
           <a:xfrm>
-            <a:off x="1499616" y="297180"/>
-            <a:ext cx="6219444" cy="5798820"/>
+            <a:off x="1866900" y="619461"/>
+            <a:ext cx="9616440" cy="5797550"/>
           </a:xfrm>
         </p:spPr>
         <p:txBody>
           <a:bodyPr/>
           <a:lstStyle/>
           <a:p>
-            <a:pPr algn="r" rtl="1"/>
+            <a:pPr marL="0" indent="0" algn="r" rtl="1">
+              <a:buNone/>
+            </a:pPr>
             <a:r>
               <a:rPr lang="he-IL" b="1" u="sng" dirty="0">
                 <a:latin typeface="Sabon Next LT" panose="02000500000000000000" pitchFamily="2" charset="0"/>
                 <a:cs typeface="Sabon Next LT" panose="02000500000000000000" pitchFamily="2" charset="0"/>
               </a:rPr>
-              <a:t>3.3 – רישום בית ספר</a:t>
+              <a:t>3.2 – ספירת קילומטרים</a:t>
             </a:r>
           </a:p>
           <a:p>
@@ -25186,7 +28384,7 @@
                 <a:latin typeface="Sabon Next LT" panose="02000500000000000000" pitchFamily="2" charset="0"/>
                 <a:cs typeface="Sabon Next LT" panose="02000500000000000000" pitchFamily="2" charset="0"/>
               </a:rPr>
-              <a:t>רישום בית הספר מתנהל באופן הבא:</a:t>
+              <a:t>ספירת הקילומטרים היא דרך אחת לביצוע, המטרה האמיתית היא לזהות אם התלמיד אכן הולך בצורה מיטבית, וכן תיעוד המרחק שהוא הלך בקילומטרים.</a:t>
             </a:r>
           </a:p>
           <a:p>
@@ -25196,7 +28394,7 @@
                 <a:latin typeface="Sabon Next LT" panose="02000500000000000000" pitchFamily="2" charset="0"/>
                 <a:cs typeface="Sabon Next LT" panose="02000500000000000000" pitchFamily="2" charset="0"/>
               </a:rPr>
-              <a:t>ראשית על גורם צוותי מתוך בית הספר (מורה\מנהל) ליצור קשר עם העירייה בכדי לרשום את בית הספר להשתתפות.</a:t>
+              <a:t>נדרש גם יכולת לוודא שהתלמיד לא נסע בזמן זה ע"י בדיקת המהירות שלו.</a:t>
             </a:r>
           </a:p>
           <a:p>
@@ -25206,50 +28404,7 @@
                 <a:latin typeface="Sabon Next LT" panose="02000500000000000000" pitchFamily="2" charset="0"/>
                 <a:cs typeface="Sabon Next LT" panose="02000500000000000000" pitchFamily="2" charset="0"/>
               </a:rPr>
-              <a:t>לאחר שהעירייה מאשרת את איש הצוות היא תשלח לינק לאפליקציה בו ניתן יהיה לרשום את בית הספר ע"י הזנת הפרטים הבאים :</a:t>
-            </a:r>
-          </a:p>
-          <a:p>
-            <a:pPr marL="1028700" lvl="2" indent="-342900" algn="r" rtl="1"/>
-            <a:r>
-              <a:rPr lang="he-IL" sz="2000" dirty="0">
-                <a:latin typeface="Sabon Next LT" panose="02000500000000000000" pitchFamily="2" charset="0"/>
-                <a:cs typeface="Sabon Next LT" panose="02000500000000000000" pitchFamily="2" charset="0"/>
-              </a:rPr>
-              <a:t>שם בית הספר וכתובת להגעה רגלית</a:t>
-            </a:r>
-          </a:p>
-          <a:p>
-            <a:pPr marL="1028700" lvl="2" indent="-342900" algn="r" rtl="1"/>
-            <a:r>
-              <a:rPr lang="he-IL" sz="2000" dirty="0">
-                <a:latin typeface="Sabon Next LT" panose="02000500000000000000" pitchFamily="2" charset="0"/>
-                <a:cs typeface="Sabon Next LT" panose="02000500000000000000" pitchFamily="2" charset="0"/>
-              </a:rPr>
-              <a:t>פרטי איש הקשר של בית הספר</a:t>
-            </a:r>
-          </a:p>
-          <a:p>
-            <a:pPr marL="1028700" lvl="2" indent="-342900" algn="r" rtl="1"/>
-            <a:r>
-              <a:rPr lang="he-IL" sz="2000" dirty="0">
-                <a:latin typeface="Sabon Next LT" panose="02000500000000000000" pitchFamily="2" charset="0"/>
-                <a:cs typeface="Sabon Next LT" panose="02000500000000000000" pitchFamily="2" charset="0"/>
-              </a:rPr>
-              <a:t>הגדרת הכיתות בבית הספר</a:t>
-            </a:r>
-          </a:p>
-          <a:p>
-            <a:pPr marL="1028700" lvl="2" indent="-342900" algn="r" rtl="1"/>
-            <a:r>
-              <a:rPr lang="he-IL" sz="2000" dirty="0">
-                <a:solidFill>
-                  <a:srgbClr val="FF0000"/>
-                </a:solidFill>
-                <a:latin typeface="Sabon Next LT" panose="02000500000000000000" pitchFamily="2" charset="0"/>
-                <a:cs typeface="Sabon Next LT" panose="02000500000000000000" pitchFamily="2" charset="0"/>
-              </a:rPr>
-              <a:t>אופציונאלי – הגדרת פרס לכיתה מנצחת.</a:t>
+              <a:t>גם כאן נשאלת השאלה האם ניתן להשתמש במשהו קיים.</a:t>
             </a:r>
           </a:p>
         </p:txBody>
@@ -25349,7 +28504,7 @@
     </p:spTree>
     <p:extLst>
       <p:ext uri="{BB962C8B-B14F-4D97-AF65-F5344CB8AC3E}">
-        <p14:creationId xmlns:p14="http://schemas.microsoft.com/office/powerpoint/2010/main" val="1157700990"/>
+        <p14:creationId xmlns:p14="http://schemas.microsoft.com/office/powerpoint/2010/main" val="3407969357"/>
       </p:ext>
     </p:extLst>
   </p:cSld>
@@ -25389,26 +28544,28 @@
             <a:spLocks noGrp="1"/>
           </p:cNvSpPr>
           <p:nvPr>
-            <p:ph idx="1"/>
+            <p:ph idx="4294967295"/>
           </p:nvPr>
         </p:nvSpPr>
         <p:spPr>
           <a:xfrm>
-            <a:off x="1453896" y="0"/>
-            <a:ext cx="6219444" cy="6469380"/>
+            <a:off x="1470660" y="439402"/>
+            <a:ext cx="9846564" cy="5799137"/>
           </a:xfrm>
         </p:spPr>
         <p:txBody>
           <a:bodyPr/>
           <a:lstStyle/>
           <a:p>
-            <a:pPr algn="r" rtl="1"/>
+            <a:pPr marL="0" indent="0" algn="r" rtl="1">
+              <a:buNone/>
+            </a:pPr>
             <a:r>
               <a:rPr lang="he-IL" b="1" u="sng" dirty="0">
                 <a:latin typeface="Sabon Next LT" panose="02000500000000000000" pitchFamily="2" charset="0"/>
                 <a:cs typeface="Sabon Next LT" panose="02000500000000000000" pitchFamily="2" charset="0"/>
               </a:rPr>
-              <a:t>3.4 – אפשרות רישום</a:t>
+              <a:t>3.3 – רישום בית ספר</a:t>
             </a:r>
           </a:p>
           <a:p>
@@ -25418,7 +28575,27 @@
                 <a:latin typeface="Sabon Next LT" panose="02000500000000000000" pitchFamily="2" charset="0"/>
                 <a:cs typeface="Sabon Next LT" panose="02000500000000000000" pitchFamily="2" charset="0"/>
               </a:rPr>
-              <a:t>על ההורה/התלמיד להתחבר לקהילת בית הספר שלהם ולמלא את הפרטים הבאים:</a:t>
+              <a:t>רישום בית הספר מתנהל באופן הבא:</a:t>
+            </a:r>
+          </a:p>
+          <a:p>
+            <a:pPr algn="r" rtl="1"/>
+            <a:r>
+              <a:rPr lang="he-IL" dirty="0">
+                <a:latin typeface="Sabon Next LT" panose="02000500000000000000" pitchFamily="2" charset="0"/>
+                <a:cs typeface="Sabon Next LT" panose="02000500000000000000" pitchFamily="2" charset="0"/>
+              </a:rPr>
+              <a:t>ראשית על גורם צוותי מתוך בית הספר (מורה\מנהל) ליצור קשר עם העירייה בכדי לרשום את בית הספר להשתתפות.</a:t>
+            </a:r>
+          </a:p>
+          <a:p>
+            <a:pPr algn="r" rtl="1"/>
+            <a:r>
+              <a:rPr lang="he-IL" dirty="0">
+                <a:latin typeface="Sabon Next LT" panose="02000500000000000000" pitchFamily="2" charset="0"/>
+                <a:cs typeface="Sabon Next LT" panose="02000500000000000000" pitchFamily="2" charset="0"/>
+              </a:rPr>
+              <a:t>לאחר שהעירייה מאשרת את איש הצוות היא תשלח לינק לאפליקציה בו ניתן יהיה לרשום את בית הספר ע"י הזנת הפרטים הבאים :</a:t>
             </a:r>
           </a:p>
           <a:p>
@@ -25428,7 +28605,27 @@
                 <a:latin typeface="Sabon Next LT" panose="02000500000000000000" pitchFamily="2" charset="0"/>
                 <a:cs typeface="Sabon Next LT" panose="02000500000000000000" pitchFamily="2" charset="0"/>
               </a:rPr>
-              <a:t>שם/כינוי</a:t>
+              <a:t>שם בית הספר וכתובת להגעה רגלית</a:t>
+            </a:r>
+          </a:p>
+          <a:p>
+            <a:pPr marL="1028700" lvl="2" indent="-342900" algn="r" rtl="1"/>
+            <a:r>
+              <a:rPr lang="he-IL" sz="2000" dirty="0">
+                <a:latin typeface="Sabon Next LT" panose="02000500000000000000" pitchFamily="2" charset="0"/>
+                <a:cs typeface="Sabon Next LT" panose="02000500000000000000" pitchFamily="2" charset="0"/>
+              </a:rPr>
+              <a:t>פרטי איש הקשר של בית הספר</a:t>
+            </a:r>
+          </a:p>
+          <a:p>
+            <a:pPr marL="1028700" lvl="2" indent="-342900" algn="r" rtl="1"/>
+            <a:r>
+              <a:rPr lang="he-IL" sz="2000" dirty="0">
+                <a:latin typeface="Sabon Next LT" panose="02000500000000000000" pitchFamily="2" charset="0"/>
+                <a:cs typeface="Sabon Next LT" panose="02000500000000000000" pitchFamily="2" charset="0"/>
+              </a:rPr>
+              <a:t>הגדרת הכיתות בבית הספר</a:t>
             </a:r>
           </a:p>
           <a:p>
@@ -25441,44 +28638,7 @@
                 <a:latin typeface="Sabon Next LT" panose="02000500000000000000" pitchFamily="2" charset="0"/>
                 <a:cs typeface="Sabon Next LT" panose="02000500000000000000" pitchFamily="2" charset="0"/>
               </a:rPr>
-              <a:t>כתובת המגורים </a:t>
-            </a:r>
-            <a:r>
-              <a:rPr lang="he-IL" sz="2000" dirty="0">
-                <a:latin typeface="Sabon Next LT" panose="02000500000000000000" pitchFamily="2" charset="0"/>
-                <a:cs typeface="Sabon Next LT" panose="02000500000000000000" pitchFamily="2" charset="0"/>
-              </a:rPr>
-              <a:t>ממנה מגיעים לבית הספר – (אבטחת מידע?)</a:t>
-            </a:r>
-          </a:p>
-          <a:p>
-            <a:pPr marL="1028700" lvl="2" indent="-342900" algn="r" rtl="1"/>
-            <a:r>
-              <a:rPr lang="he-IL" sz="2000" dirty="0">
-                <a:latin typeface="Sabon Next LT" panose="02000500000000000000" pitchFamily="2" charset="0"/>
-                <a:cs typeface="Sabon Next LT" panose="02000500000000000000" pitchFamily="2" charset="0"/>
-              </a:rPr>
-              <a:t>כיתה – מבין האופציות שמולאו על ידי נציג בית הספר. (ראה 3.3 – רישום בית ספר)</a:t>
-            </a:r>
-          </a:p>
-          <a:p>
-            <a:pPr algn="r" rtl="1"/>
-            <a:r>
-              <a:rPr lang="he-IL" dirty="0">
-                <a:latin typeface="Sabon Next LT" panose="02000500000000000000" pitchFamily="2" charset="0"/>
-                <a:cs typeface="Sabon Next LT" panose="02000500000000000000" pitchFamily="2" charset="0"/>
-              </a:rPr>
-              <a:t>צריך לדאוג שלהורה יהיה אפשרות לרשום יותר מילד אחד</a:t>
-            </a:r>
-          </a:p>
-          <a:p>
-            <a:pPr algn="r" rtl="1"/>
-            <a:r>
-              <a:rPr lang="he-IL" dirty="0">
-                <a:latin typeface="Sabon Next LT" panose="02000500000000000000" pitchFamily="2" charset="0"/>
-                <a:cs typeface="Sabon Next LT" panose="02000500000000000000" pitchFamily="2" charset="0"/>
-              </a:rPr>
-              <a:t>על ההרשמה להיות מאושרת על ידי איש הקשר מטעם בית הספר.</a:t>
+              <a:t>אופציונאלי – הגדרת פרס לכיתה מנצחת.</a:t>
             </a:r>
           </a:p>
         </p:txBody>
@@ -25497,7 +28657,7 @@
         </p:nvSpPr>
         <p:spPr>
           <a:xfrm>
-            <a:off x="655320" y="5254687"/>
+            <a:off x="891540" y="5242186"/>
             <a:ext cx="1371600" cy="369332"/>
           </a:xfrm>
           <a:prstGeom prst="rect">
@@ -25543,7 +28703,7 @@
         </p:nvSpPr>
         <p:spPr>
           <a:xfrm>
-            <a:off x="716280" y="5592667"/>
+            <a:off x="874776" y="5592208"/>
             <a:ext cx="1249680" cy="646331"/>
           </a:xfrm>
           <a:prstGeom prst="rect">
@@ -25578,7 +28738,7 @@
     </p:spTree>
     <p:extLst>
       <p:ext uri="{BB962C8B-B14F-4D97-AF65-F5344CB8AC3E}">
-        <p14:creationId xmlns:p14="http://schemas.microsoft.com/office/powerpoint/2010/main" val="2057766082"/>
+        <p14:creationId xmlns:p14="http://schemas.microsoft.com/office/powerpoint/2010/main" val="1157700990"/>
       </p:ext>
     </p:extLst>
   </p:cSld>

</xml_diff>